<commit_message>
Optimizations, proper emotions, color cycle
</commit_message>
<xml_diff>
--- a/assets/FaceMaps.pptx
+++ b/assets/FaceMaps.pptx
@@ -5,16 +5,17 @@
     <p:sldMasterId id="2147483648" r:id="rId1"/>
   </p:sldMasterIdLst>
   <p:sldIdLst>
-    <p:sldId id="256" r:id="rId2"/>
-    <p:sldId id="257" r:id="rId3"/>
-    <p:sldId id="258" r:id="rId4"/>
-    <p:sldId id="259" r:id="rId5"/>
-    <p:sldId id="260" r:id="rId6"/>
-    <p:sldId id="261" r:id="rId7"/>
-    <p:sldId id="262" r:id="rId8"/>
-    <p:sldId id="263" r:id="rId9"/>
-    <p:sldId id="264" r:id="rId10"/>
-    <p:sldId id="265" r:id="rId11"/>
+    <p:sldId id="266" r:id="rId2"/>
+    <p:sldId id="256" r:id="rId3"/>
+    <p:sldId id="257" r:id="rId4"/>
+    <p:sldId id="258" r:id="rId5"/>
+    <p:sldId id="259" r:id="rId6"/>
+    <p:sldId id="260" r:id="rId7"/>
+    <p:sldId id="261" r:id="rId8"/>
+    <p:sldId id="262" r:id="rId9"/>
+    <p:sldId id="263" r:id="rId10"/>
+    <p:sldId id="264" r:id="rId11"/>
+    <p:sldId id="265" r:id="rId12"/>
   </p:sldIdLst>
   <p:sldSz cx="12192000" cy="6858000"/>
   <p:notesSz cx="6858000" cy="9144000"/>
@@ -677,8 +678,8 @@
   </pc:docChgLst>
   <pc:docChgLst>
     <pc:chgData name="Tyler Place" userId="ea307159bb280439" providerId="LiveId" clId="{09E72B4C-2191-4659-97A9-43CF591626FA}"/>
-    <pc:docChg chg="undo redo custSel addSld modSld">
-      <pc:chgData name="Tyler Place" userId="ea307159bb280439" providerId="LiveId" clId="{09E72B4C-2191-4659-97A9-43CF591626FA}" dt="2024-05-30T04:50:25.469" v="170" actId="14100"/>
+    <pc:docChg chg="undo redo custSel addSld modSld sldOrd">
+      <pc:chgData name="Tyler Place" userId="ea307159bb280439" providerId="LiveId" clId="{09E72B4C-2191-4659-97A9-43CF591626FA}" dt="2024-06-01T04:25:10.951" v="344" actId="20577"/>
       <pc:docMkLst>
         <pc:docMk/>
       </pc:docMkLst>
@@ -880,13 +881,13 @@
         </pc:cxnChg>
       </pc:sldChg>
       <pc:sldChg chg="modSp add mod">
-        <pc:chgData name="Tyler Place" userId="ea307159bb280439" providerId="LiveId" clId="{09E72B4C-2191-4659-97A9-43CF591626FA}" dt="2024-05-30T04:50:25.469" v="170" actId="14100"/>
+        <pc:chgData name="Tyler Place" userId="ea307159bb280439" providerId="LiveId" clId="{09E72B4C-2191-4659-97A9-43CF591626FA}" dt="2024-06-01T03:56:49.270" v="337" actId="20577"/>
         <pc:sldMkLst>
           <pc:docMk/>
           <pc:sldMk cId="1007413632" sldId="265"/>
         </pc:sldMkLst>
         <pc:spChg chg="mod">
-          <ac:chgData name="Tyler Place" userId="ea307159bb280439" providerId="LiveId" clId="{09E72B4C-2191-4659-97A9-43CF591626FA}" dt="2024-05-30T04:48:34.883" v="157" actId="403"/>
+          <ac:chgData name="Tyler Place" userId="ea307159bb280439" providerId="LiveId" clId="{09E72B4C-2191-4659-97A9-43CF591626FA}" dt="2024-06-01T03:56:49.270" v="337" actId="20577"/>
           <ac:spMkLst>
             <pc:docMk/>
             <pc:sldMk cId="1007413632" sldId="265"/>
@@ -949,6 +950,37 @@
             <ac:cxnSpMk id="31" creationId="{C85AAB79-D294-47D3-6E02-04CA7C85ADF4}"/>
           </ac:cxnSpMkLst>
         </pc:cxnChg>
+      </pc:sldChg>
+      <pc:sldChg chg="addSp delSp modSp new mod ord">
+        <pc:chgData name="Tyler Place" userId="ea307159bb280439" providerId="LiveId" clId="{09E72B4C-2191-4659-97A9-43CF591626FA}" dt="2024-06-01T04:25:10.951" v="344" actId="20577"/>
+        <pc:sldMkLst>
+          <pc:docMk/>
+          <pc:sldMk cId="624876100" sldId="266"/>
+        </pc:sldMkLst>
+        <pc:spChg chg="mod">
+          <ac:chgData name="Tyler Place" userId="ea307159bb280439" providerId="LiveId" clId="{09E72B4C-2191-4659-97A9-43CF591626FA}" dt="2024-06-01T04:14:05.685" v="340" actId="1076"/>
+          <ac:spMkLst>
+            <pc:docMk/>
+            <pc:sldMk cId="624876100" sldId="266"/>
+            <ac:spMk id="2" creationId="{54BDD459-3467-7DD4-729A-001B8B7F906E}"/>
+          </ac:spMkLst>
+        </pc:spChg>
+        <pc:spChg chg="del">
+          <ac:chgData name="Tyler Place" userId="ea307159bb280439" providerId="LiveId" clId="{09E72B4C-2191-4659-97A9-43CF591626FA}" dt="2024-06-01T03:53:36.946" v="189" actId="3680"/>
+          <ac:spMkLst>
+            <pc:docMk/>
+            <pc:sldMk cId="624876100" sldId="266"/>
+            <ac:spMk id="3" creationId="{68D179A7-CA91-25C6-E12F-E4E5A52257A1}"/>
+          </ac:spMkLst>
+        </pc:spChg>
+        <pc:graphicFrameChg chg="add mod ord modGraphic">
+          <ac:chgData name="Tyler Place" userId="ea307159bb280439" providerId="LiveId" clId="{09E72B4C-2191-4659-97A9-43CF591626FA}" dt="2024-06-01T04:25:10.951" v="344" actId="20577"/>
+          <ac:graphicFrameMkLst>
+            <pc:docMk/>
+            <pc:sldMk cId="624876100" sldId="266"/>
+            <ac:graphicFrameMk id="4" creationId="{9EFB89CA-303C-55AC-74A7-EF5C57FBB44D}"/>
+          </ac:graphicFrameMkLst>
+        </pc:graphicFrameChg>
       </pc:sldChg>
     </pc:docChg>
   </pc:docChgLst>
@@ -1102,7 +1134,7 @@
           <a:p>
             <a:fld id="{2F8BC3AA-0B2A-4816-B48E-A936338D1737}" type="datetimeFigureOut">
               <a:rPr lang="en-US" smtClean="0"/>
-              <a:t>5/29/2024</a:t>
+              <a:t>5/31/2024</a:t>
             </a:fld>
             <a:endParaRPr lang="en-US"/>
           </a:p>
@@ -1300,7 +1332,7 @@
           <a:p>
             <a:fld id="{2F8BC3AA-0B2A-4816-B48E-A936338D1737}" type="datetimeFigureOut">
               <a:rPr lang="en-US" smtClean="0"/>
-              <a:t>5/29/2024</a:t>
+              <a:t>5/31/2024</a:t>
             </a:fld>
             <a:endParaRPr lang="en-US"/>
           </a:p>
@@ -1508,7 +1540,7 @@
           <a:p>
             <a:fld id="{2F8BC3AA-0B2A-4816-B48E-A936338D1737}" type="datetimeFigureOut">
               <a:rPr lang="en-US" smtClean="0"/>
-              <a:t>5/29/2024</a:t>
+              <a:t>5/31/2024</a:t>
             </a:fld>
             <a:endParaRPr lang="en-US"/>
           </a:p>
@@ -1706,7 +1738,7 @@
           <a:p>
             <a:fld id="{2F8BC3AA-0B2A-4816-B48E-A936338D1737}" type="datetimeFigureOut">
               <a:rPr lang="en-US" smtClean="0"/>
-              <a:t>5/29/2024</a:t>
+              <a:t>5/31/2024</a:t>
             </a:fld>
             <a:endParaRPr lang="en-US"/>
           </a:p>
@@ -1981,7 +2013,7 @@
           <a:p>
             <a:fld id="{2F8BC3AA-0B2A-4816-B48E-A936338D1737}" type="datetimeFigureOut">
               <a:rPr lang="en-US" smtClean="0"/>
-              <a:t>5/29/2024</a:t>
+              <a:t>5/31/2024</a:t>
             </a:fld>
             <a:endParaRPr lang="en-US"/>
           </a:p>
@@ -2246,7 +2278,7 @@
           <a:p>
             <a:fld id="{2F8BC3AA-0B2A-4816-B48E-A936338D1737}" type="datetimeFigureOut">
               <a:rPr lang="en-US" smtClean="0"/>
-              <a:t>5/29/2024</a:t>
+              <a:t>5/31/2024</a:t>
             </a:fld>
             <a:endParaRPr lang="en-US"/>
           </a:p>
@@ -2658,7 +2690,7 @@
           <a:p>
             <a:fld id="{2F8BC3AA-0B2A-4816-B48E-A936338D1737}" type="datetimeFigureOut">
               <a:rPr lang="en-US" smtClean="0"/>
-              <a:t>5/29/2024</a:t>
+              <a:t>5/31/2024</a:t>
             </a:fld>
             <a:endParaRPr lang="en-US"/>
           </a:p>
@@ -2799,7 +2831,7 @@
           <a:p>
             <a:fld id="{2F8BC3AA-0B2A-4816-B48E-A936338D1737}" type="datetimeFigureOut">
               <a:rPr lang="en-US" smtClean="0"/>
-              <a:t>5/29/2024</a:t>
+              <a:t>5/31/2024</a:t>
             </a:fld>
             <a:endParaRPr lang="en-US"/>
           </a:p>
@@ -2912,7 +2944,7 @@
           <a:p>
             <a:fld id="{2F8BC3AA-0B2A-4816-B48E-A936338D1737}" type="datetimeFigureOut">
               <a:rPr lang="en-US" smtClean="0"/>
-              <a:t>5/29/2024</a:t>
+              <a:t>5/31/2024</a:t>
             </a:fld>
             <a:endParaRPr lang="en-US"/>
           </a:p>
@@ -3223,7 +3255,7 @@
           <a:p>
             <a:fld id="{2F8BC3AA-0B2A-4816-B48E-A936338D1737}" type="datetimeFigureOut">
               <a:rPr lang="en-US" smtClean="0"/>
-              <a:t>5/29/2024</a:t>
+              <a:t>5/31/2024</a:t>
             </a:fld>
             <a:endParaRPr lang="en-US"/>
           </a:p>
@@ -3511,7 +3543,7 @@
           <a:p>
             <a:fld id="{2F8BC3AA-0B2A-4816-B48E-A936338D1737}" type="datetimeFigureOut">
               <a:rPr lang="en-US" smtClean="0"/>
-              <a:t>5/29/2024</a:t>
+              <a:t>5/31/2024</a:t>
             </a:fld>
             <a:endParaRPr lang="en-US"/>
           </a:p>
@@ -3752,7 +3784,7 @@
           <a:p>
             <a:fld id="{2F8BC3AA-0B2A-4816-B48E-A936338D1737}" type="datetimeFigureOut">
               <a:rPr lang="en-US" smtClean="0"/>
-              <a:t>5/29/2024</a:t>
+              <a:t>5/31/2024</a:t>
             </a:fld>
             <a:endParaRPr lang="en-US"/>
           </a:p>
@@ -4174,7 +4206,7 @@
           <p:cNvPr id="2" name="Title 1">
             <a:extLst>
               <a:ext uri="{FF2B5EF4-FFF2-40B4-BE49-F238E27FC236}">
-                <a16:creationId xmlns:a16="http://schemas.microsoft.com/office/drawing/2014/main" id="{B0C8829D-D281-56A3-C45B-873B13B2C53C}"/>
+                <a16:creationId xmlns:a16="http://schemas.microsoft.com/office/drawing/2014/main" id="{54BDD459-3467-7DD4-729A-001B8B7F906E}"/>
               </a:ext>
             </a:extLst>
           </p:cNvPr>
@@ -4182,25 +4214,508 @@
             <a:spLocks noGrp="1"/>
           </p:cNvSpPr>
           <p:nvPr>
-            <p:ph type="ctrTitle"/>
+            <p:ph type="title"/>
           </p:nvPr>
         </p:nvSpPr>
-        <p:spPr/>
+        <p:spPr>
+          <a:xfrm>
+            <a:off x="838200" y="208230"/>
+            <a:ext cx="10515600" cy="1325563"/>
+          </a:xfrm>
+        </p:spPr>
         <p:txBody>
           <a:bodyPr/>
           <a:lstStyle/>
           <a:p>
             <a:r>
               <a:rPr lang="en-US" dirty="0"/>
-              <a:t>Eye Points</a:t>
+              <a:t>Emotion Registry</a:t>
             </a:r>
           </a:p>
         </p:txBody>
       </p:sp>
+      <p:graphicFrame>
+        <p:nvGraphicFramePr>
+          <p:cNvPr id="4" name="Content Placeholder 3">
+            <a:extLst>
+              <a:ext uri="{FF2B5EF4-FFF2-40B4-BE49-F238E27FC236}">
+                <a16:creationId xmlns:a16="http://schemas.microsoft.com/office/drawing/2014/main" id="{9EFB89CA-303C-55AC-74A7-EF5C57FBB44D}"/>
+              </a:ext>
+            </a:extLst>
+          </p:cNvPr>
+          <p:cNvGraphicFramePr>
+            <a:graphicFrameLocks noGrp="1"/>
+          </p:cNvGraphicFramePr>
+          <p:nvPr>
+            <p:ph idx="1"/>
+            <p:extLst>
+              <p:ext uri="{D42A27DB-BD31-4B8C-83A1-F6EECF244321}">
+                <p14:modId xmlns:p14="http://schemas.microsoft.com/office/powerpoint/2010/main" val="4041942375"/>
+              </p:ext>
+            </p:extLst>
+          </p:nvPr>
+        </p:nvGraphicFramePr>
+        <p:xfrm>
+          <a:off x="838200" y="1825625"/>
+          <a:ext cx="10515600" cy="2595880"/>
+        </p:xfrm>
+        <a:graphic>
+          <a:graphicData uri="http://schemas.openxmlformats.org/drawingml/2006/table">
+            <a:tbl>
+              <a:tblPr firstRow="1" bandRow="1">
+                <a:tableStyleId>{5C22544A-7EE6-4342-B048-85BDC9FD1C3A}</a:tableStyleId>
+              </a:tblPr>
+              <a:tblGrid>
+                <a:gridCol w="1090188">
+                  <a:extLst>
+                    <a:ext uri="{9D8B030D-6E8A-4147-A177-3AD203B41FA5}">
+                      <a16:colId xmlns:a16="http://schemas.microsoft.com/office/drawing/2014/main" val="3880552805"/>
+                    </a:ext>
+                  </a:extLst>
+                </a:gridCol>
+                <a:gridCol w="4167612">
+                  <a:extLst>
+                    <a:ext uri="{9D8B030D-6E8A-4147-A177-3AD203B41FA5}">
+                      <a16:colId xmlns:a16="http://schemas.microsoft.com/office/drawing/2014/main" val="2572704271"/>
+                    </a:ext>
+                  </a:extLst>
+                </a:gridCol>
+                <a:gridCol w="2628900">
+                  <a:extLst>
+                    <a:ext uri="{9D8B030D-6E8A-4147-A177-3AD203B41FA5}">
+                      <a16:colId xmlns:a16="http://schemas.microsoft.com/office/drawing/2014/main" val="3106397073"/>
+                    </a:ext>
+                  </a:extLst>
+                </a:gridCol>
+                <a:gridCol w="2628900">
+                  <a:extLst>
+                    <a:ext uri="{9D8B030D-6E8A-4147-A177-3AD203B41FA5}">
+                      <a16:colId xmlns:a16="http://schemas.microsoft.com/office/drawing/2014/main" val="1641967168"/>
+                    </a:ext>
+                  </a:extLst>
+                </a:gridCol>
+              </a:tblGrid>
+              <a:tr h="370840">
+                <a:tc>
+                  <a:txBody>
+                    <a:bodyPr/>
+                    <a:lstStyle/>
+                    <a:p>
+                      <a:r>
+                        <a:rPr lang="en-US" dirty="0"/>
+                        <a:t>Index</a:t>
+                      </a:r>
+                    </a:p>
+                  </a:txBody>
+                  <a:tcPr/>
+                </a:tc>
+                <a:tc>
+                  <a:txBody>
+                    <a:bodyPr/>
+                    <a:lstStyle/>
+                    <a:p>
+                      <a:r>
+                        <a:rPr lang="en-US" dirty="0"/>
+                        <a:t>Desc</a:t>
+                      </a:r>
+                    </a:p>
+                  </a:txBody>
+                  <a:tcPr/>
+                </a:tc>
+                <a:tc>
+                  <a:txBody>
+                    <a:bodyPr/>
+                    <a:lstStyle/>
+                    <a:p>
+                      <a:r>
+                        <a:rPr lang="en-US" dirty="0"/>
+                        <a:t>Eye #</a:t>
+                      </a:r>
+                    </a:p>
+                  </a:txBody>
+                  <a:tcPr/>
+                </a:tc>
+                <a:tc>
+                  <a:txBody>
+                    <a:bodyPr/>
+                    <a:lstStyle/>
+                    <a:p>
+                      <a:r>
+                        <a:rPr lang="en-US" dirty="0"/>
+                        <a:t>Face #</a:t>
+                      </a:r>
+                    </a:p>
+                  </a:txBody>
+                  <a:tcPr/>
+                </a:tc>
+                <a:extLst>
+                  <a:ext uri="{0D108BD9-81ED-4DB2-BD59-A6C34878D82A}">
+                    <a16:rowId xmlns:a16="http://schemas.microsoft.com/office/drawing/2014/main" val="3910942675"/>
+                  </a:ext>
+                </a:extLst>
+              </a:tr>
+              <a:tr h="370840">
+                <a:tc>
+                  <a:txBody>
+                    <a:bodyPr/>
+                    <a:lstStyle/>
+                    <a:p>
+                      <a:r>
+                        <a:rPr lang="en-US" dirty="0"/>
+                        <a:t>0</a:t>
+                      </a:r>
+                    </a:p>
+                  </a:txBody>
+                  <a:tcPr/>
+                </a:tc>
+                <a:tc>
+                  <a:txBody>
+                    <a:bodyPr/>
+                    <a:lstStyle/>
+                    <a:p>
+                      <a:r>
+                        <a:rPr lang="en-US" dirty="0"/>
+                        <a:t>Happy</a:t>
+                      </a:r>
+                    </a:p>
+                  </a:txBody>
+                  <a:tcPr/>
+                </a:tc>
+                <a:tc>
+                  <a:txBody>
+                    <a:bodyPr/>
+                    <a:lstStyle/>
+                    <a:p>
+                      <a:r>
+                        <a:rPr lang="en-US" dirty="0"/>
+                        <a:t>1</a:t>
+                      </a:r>
+                    </a:p>
+                  </a:txBody>
+                  <a:tcPr/>
+                </a:tc>
+                <a:tc>
+                  <a:txBody>
+                    <a:bodyPr/>
+                    <a:lstStyle/>
+                    <a:p>
+                      <a:r>
+                        <a:rPr lang="en-US" dirty="0"/>
+                        <a:t>1</a:t>
+                      </a:r>
+                    </a:p>
+                  </a:txBody>
+                  <a:tcPr/>
+                </a:tc>
+                <a:extLst>
+                  <a:ext uri="{0D108BD9-81ED-4DB2-BD59-A6C34878D82A}">
+                    <a16:rowId xmlns:a16="http://schemas.microsoft.com/office/drawing/2014/main" val="575626054"/>
+                  </a:ext>
+                </a:extLst>
+              </a:tr>
+              <a:tr h="370840">
+                <a:tc>
+                  <a:txBody>
+                    <a:bodyPr/>
+                    <a:lstStyle/>
+                    <a:p>
+                      <a:r>
+                        <a:rPr lang="en-US" dirty="0"/>
+                        <a:t>1</a:t>
+                      </a:r>
+                    </a:p>
+                  </a:txBody>
+                  <a:tcPr/>
+                </a:tc>
+                <a:tc>
+                  <a:txBody>
+                    <a:bodyPr/>
+                    <a:lstStyle/>
+                    <a:p>
+                      <a:r>
+                        <a:rPr lang="en-US" dirty="0"/>
+                        <a:t>Neutral</a:t>
+                      </a:r>
+                    </a:p>
+                  </a:txBody>
+                  <a:tcPr/>
+                </a:tc>
+                <a:tc>
+                  <a:txBody>
+                    <a:bodyPr/>
+                    <a:lstStyle/>
+                    <a:p>
+                      <a:r>
+                        <a:rPr lang="en-US" dirty="0"/>
+                        <a:t>2</a:t>
+                      </a:r>
+                    </a:p>
+                  </a:txBody>
+                  <a:tcPr/>
+                </a:tc>
+                <a:tc>
+                  <a:txBody>
+                    <a:bodyPr/>
+                    <a:lstStyle/>
+                    <a:p>
+                      <a:r>
+                        <a:rPr lang="en-US" dirty="0"/>
+                        <a:t>2</a:t>
+                      </a:r>
+                    </a:p>
+                  </a:txBody>
+                  <a:tcPr/>
+                </a:tc>
+                <a:extLst>
+                  <a:ext uri="{0D108BD9-81ED-4DB2-BD59-A6C34878D82A}">
+                    <a16:rowId xmlns:a16="http://schemas.microsoft.com/office/drawing/2014/main" val="803391554"/>
+                  </a:ext>
+                </a:extLst>
+              </a:tr>
+              <a:tr h="370840">
+                <a:tc>
+                  <a:txBody>
+                    <a:bodyPr/>
+                    <a:lstStyle/>
+                    <a:p>
+                      <a:r>
+                        <a:rPr lang="en-US" dirty="0"/>
+                        <a:t>2</a:t>
+                      </a:r>
+                    </a:p>
+                  </a:txBody>
+                  <a:tcPr/>
+                </a:tc>
+                <a:tc>
+                  <a:txBody>
+                    <a:bodyPr/>
+                    <a:lstStyle/>
+                    <a:p>
+                      <a:r>
+                        <a:rPr lang="en-US" dirty="0"/>
+                        <a:t>Sad</a:t>
+                      </a:r>
+                    </a:p>
+                  </a:txBody>
+                  <a:tcPr/>
+                </a:tc>
+                <a:tc>
+                  <a:txBody>
+                    <a:bodyPr/>
+                    <a:lstStyle/>
+                    <a:p>
+                      <a:r>
+                        <a:rPr lang="en-US" dirty="0"/>
+                        <a:t>3</a:t>
+                      </a:r>
+                    </a:p>
+                  </a:txBody>
+                  <a:tcPr/>
+                </a:tc>
+                <a:tc>
+                  <a:txBody>
+                    <a:bodyPr/>
+                    <a:lstStyle/>
+                    <a:p>
+                      <a:r>
+                        <a:rPr lang="en-US" dirty="0"/>
+                        <a:t>3</a:t>
+                      </a:r>
+                    </a:p>
+                  </a:txBody>
+                  <a:tcPr/>
+                </a:tc>
+                <a:extLst>
+                  <a:ext uri="{0D108BD9-81ED-4DB2-BD59-A6C34878D82A}">
+                    <a16:rowId xmlns:a16="http://schemas.microsoft.com/office/drawing/2014/main" val="3843688193"/>
+                  </a:ext>
+                </a:extLst>
+              </a:tr>
+              <a:tr h="370840">
+                <a:tc>
+                  <a:txBody>
+                    <a:bodyPr/>
+                    <a:lstStyle/>
+                    <a:p>
+                      <a:r>
+                        <a:rPr lang="en-US" dirty="0"/>
+                        <a:t>3</a:t>
+                      </a:r>
+                    </a:p>
+                  </a:txBody>
+                  <a:tcPr/>
+                </a:tc>
+                <a:tc>
+                  <a:txBody>
+                    <a:bodyPr/>
+                    <a:lstStyle/>
+                    <a:p>
+                      <a:r>
+                        <a:rPr lang="en-US" dirty="0"/>
+                        <a:t>Determined</a:t>
+                      </a:r>
+                    </a:p>
+                  </a:txBody>
+                  <a:tcPr/>
+                </a:tc>
+                <a:tc>
+                  <a:txBody>
+                    <a:bodyPr/>
+                    <a:lstStyle/>
+                    <a:p>
+                      <a:r>
+                        <a:rPr lang="en-US" dirty="0"/>
+                        <a:t>4</a:t>
+                      </a:r>
+                    </a:p>
+                  </a:txBody>
+                  <a:tcPr/>
+                </a:tc>
+                <a:tc>
+                  <a:txBody>
+                    <a:bodyPr/>
+                    <a:lstStyle/>
+                    <a:p>
+                      <a:r>
+                        <a:rPr lang="en-US" dirty="0"/>
+                        <a:t>1</a:t>
+                      </a:r>
+                    </a:p>
+                  </a:txBody>
+                  <a:tcPr/>
+                </a:tc>
+                <a:extLst>
+                  <a:ext uri="{0D108BD9-81ED-4DB2-BD59-A6C34878D82A}">
+                    <a16:rowId xmlns:a16="http://schemas.microsoft.com/office/drawing/2014/main" val="3792206115"/>
+                  </a:ext>
+                </a:extLst>
+              </a:tr>
+              <a:tr h="370840">
+                <a:tc>
+                  <a:txBody>
+                    <a:bodyPr/>
+                    <a:lstStyle/>
+                    <a:p>
+                      <a:r>
+                        <a:rPr lang="en-US" dirty="0"/>
+                        <a:t>4</a:t>
+                      </a:r>
+                    </a:p>
+                  </a:txBody>
+                  <a:tcPr/>
+                </a:tc>
+                <a:tc>
+                  <a:txBody>
+                    <a:bodyPr/>
+                    <a:lstStyle/>
+                    <a:p>
+                      <a:r>
+                        <a:rPr lang="en-US" dirty="0"/>
+                        <a:t>Mad</a:t>
+                      </a:r>
+                    </a:p>
+                  </a:txBody>
+                  <a:tcPr/>
+                </a:tc>
+                <a:tc>
+                  <a:txBody>
+                    <a:bodyPr/>
+                    <a:lstStyle/>
+                    <a:p>
+                      <a:r>
+                        <a:rPr lang="en-US" dirty="0"/>
+                        <a:t>4</a:t>
+                      </a:r>
+                    </a:p>
+                  </a:txBody>
+                  <a:tcPr/>
+                </a:tc>
+                <a:tc>
+                  <a:txBody>
+                    <a:bodyPr/>
+                    <a:lstStyle/>
+                    <a:p>
+                      <a:r>
+                        <a:rPr lang="en-US" dirty="0"/>
+                        <a:t>3</a:t>
+                      </a:r>
+                    </a:p>
+                  </a:txBody>
+                  <a:tcPr/>
+                </a:tc>
+                <a:extLst>
+                  <a:ext uri="{0D108BD9-81ED-4DB2-BD59-A6C34878D82A}">
+                    <a16:rowId xmlns:a16="http://schemas.microsoft.com/office/drawing/2014/main" val="247557808"/>
+                  </a:ext>
+                </a:extLst>
+              </a:tr>
+              <a:tr h="370840">
+                <a:tc>
+                  <a:txBody>
+                    <a:bodyPr/>
+                    <a:lstStyle/>
+                    <a:p>
+                      <a:r>
+                        <a:rPr lang="en-US" dirty="0"/>
+                        <a:t>5</a:t>
+                      </a:r>
+                    </a:p>
+                  </a:txBody>
+                  <a:tcPr/>
+                </a:tc>
+                <a:tc>
+                  <a:txBody>
+                    <a:bodyPr/>
+                    <a:lstStyle/>
+                    <a:p>
+                      <a:r>
+                        <a:rPr lang="en-US" dirty="0"/>
+                        <a:t>Embarrassed</a:t>
+                      </a:r>
+                    </a:p>
+                  </a:txBody>
+                  <a:tcPr/>
+                </a:tc>
+                <a:tc>
+                  <a:txBody>
+                    <a:bodyPr/>
+                    <a:lstStyle/>
+                    <a:p>
+                      <a:r>
+                        <a:rPr lang="en-US" dirty="0"/>
+                        <a:t>5</a:t>
+                      </a:r>
+                    </a:p>
+                  </a:txBody>
+                  <a:tcPr/>
+                </a:tc>
+                <a:tc>
+                  <a:txBody>
+                    <a:bodyPr/>
+                    <a:lstStyle/>
+                    <a:p>
+                      <a:r>
+                        <a:rPr lang="en-US" dirty="0"/>
+                        <a:t>3</a:t>
+                      </a:r>
+                    </a:p>
+                  </a:txBody>
+                  <a:tcPr/>
+                </a:tc>
+                <a:extLst>
+                  <a:ext uri="{0D108BD9-81ED-4DB2-BD59-A6C34878D82A}">
+                    <a16:rowId xmlns:a16="http://schemas.microsoft.com/office/drawing/2014/main" val="2033947433"/>
+                  </a:ext>
+                </a:extLst>
+              </a:tr>
+            </a:tbl>
+          </a:graphicData>
+        </a:graphic>
+      </p:graphicFrame>
     </p:spTree>
     <p:extLst>
       <p:ext uri="{BB962C8B-B14F-4D97-AF65-F5344CB8AC3E}">
-        <p14:creationId xmlns:p14="http://schemas.microsoft.com/office/powerpoint/2010/main" val="2177959751"/>
+        <p14:creationId xmlns:p14="http://schemas.microsoft.com/office/powerpoint/2010/main" val="624876100"/>
       </p:ext>
     </p:extLst>
   </p:cSld>
@@ -4385,6 +4900,519 @@
         <p:spPr>
           <a:xfrm flipH="1">
             <a:off x="5396589" y="4544839"/>
+            <a:ext cx="2246045" cy="374932"/>
+          </a:xfrm>
+          <a:prstGeom prst="line">
+            <a:avLst/>
+          </a:prstGeom>
+        </p:spPr>
+        <p:style>
+          <a:lnRef idx="2">
+            <a:schemeClr val="accent1"/>
+          </a:lnRef>
+          <a:fillRef idx="0">
+            <a:schemeClr val="accent1"/>
+          </a:fillRef>
+          <a:effectRef idx="1">
+            <a:schemeClr val="accent1"/>
+          </a:effectRef>
+          <a:fontRef idx="minor">
+            <a:schemeClr val="tx1"/>
+          </a:fontRef>
+        </p:style>
+      </p:cxnSp>
+      <p:cxnSp>
+        <p:nvCxnSpPr>
+          <p:cNvPr id="21" name="Straight Connector 20">
+            <a:extLst>
+              <a:ext uri="{FF2B5EF4-FFF2-40B4-BE49-F238E27FC236}">
+                <a16:creationId xmlns:a16="http://schemas.microsoft.com/office/drawing/2014/main" id="{9ECAE667-05EC-D218-F92D-031D1CC71844}"/>
+              </a:ext>
+            </a:extLst>
+          </p:cNvPr>
+          <p:cNvCxnSpPr>
+            <a:cxnSpLocks/>
+          </p:cNvCxnSpPr>
+          <p:nvPr/>
+        </p:nvCxnSpPr>
+        <p:spPr>
+          <a:xfrm flipH="1">
+            <a:off x="3862058" y="4904482"/>
+            <a:ext cx="1534531" cy="15289"/>
+          </a:xfrm>
+          <a:prstGeom prst="line">
+            <a:avLst/>
+          </a:prstGeom>
+        </p:spPr>
+        <p:style>
+          <a:lnRef idx="2">
+            <a:schemeClr val="accent1"/>
+          </a:lnRef>
+          <a:fillRef idx="0">
+            <a:schemeClr val="accent1"/>
+          </a:fillRef>
+          <a:effectRef idx="1">
+            <a:schemeClr val="accent1"/>
+          </a:effectRef>
+          <a:fontRef idx="minor">
+            <a:schemeClr val="tx1"/>
+          </a:fontRef>
+        </p:style>
+      </p:cxnSp>
+      <p:cxnSp>
+        <p:nvCxnSpPr>
+          <p:cNvPr id="23" name="Straight Connector 22">
+            <a:extLst>
+              <a:ext uri="{FF2B5EF4-FFF2-40B4-BE49-F238E27FC236}">
+                <a16:creationId xmlns:a16="http://schemas.microsoft.com/office/drawing/2014/main" id="{E530229F-89CE-FE75-CA19-B7E654087376}"/>
+              </a:ext>
+            </a:extLst>
+          </p:cNvPr>
+          <p:cNvCxnSpPr>
+            <a:cxnSpLocks/>
+          </p:cNvCxnSpPr>
+          <p:nvPr/>
+        </p:nvCxnSpPr>
+        <p:spPr>
+          <a:xfrm flipH="1" flipV="1">
+            <a:off x="2353901" y="4544839"/>
+            <a:ext cx="1508157" cy="374932"/>
+          </a:xfrm>
+          <a:prstGeom prst="line">
+            <a:avLst/>
+          </a:prstGeom>
+        </p:spPr>
+        <p:style>
+          <a:lnRef idx="2">
+            <a:schemeClr val="accent1"/>
+          </a:lnRef>
+          <a:fillRef idx="0">
+            <a:schemeClr val="accent1"/>
+          </a:fillRef>
+          <a:effectRef idx="1">
+            <a:schemeClr val="accent1"/>
+          </a:effectRef>
+          <a:fontRef idx="minor">
+            <a:schemeClr val="tx1"/>
+          </a:fontRef>
+        </p:style>
+      </p:cxnSp>
+      <p:cxnSp>
+        <p:nvCxnSpPr>
+          <p:cNvPr id="25" name="Straight Connector 24">
+            <a:extLst>
+              <a:ext uri="{FF2B5EF4-FFF2-40B4-BE49-F238E27FC236}">
+                <a16:creationId xmlns:a16="http://schemas.microsoft.com/office/drawing/2014/main" id="{15298556-20C9-DE82-AD3D-2640DEF38799}"/>
+              </a:ext>
+            </a:extLst>
+          </p:cNvPr>
+          <p:cNvCxnSpPr>
+            <a:cxnSpLocks/>
+          </p:cNvCxnSpPr>
+          <p:nvPr/>
+        </p:nvCxnSpPr>
+        <p:spPr>
+          <a:xfrm>
+            <a:off x="2353901" y="4544839"/>
+            <a:ext cx="371193" cy="751438"/>
+          </a:xfrm>
+          <a:prstGeom prst="line">
+            <a:avLst/>
+          </a:prstGeom>
+        </p:spPr>
+        <p:style>
+          <a:lnRef idx="2">
+            <a:schemeClr val="accent1"/>
+          </a:lnRef>
+          <a:fillRef idx="0">
+            <a:schemeClr val="accent1"/>
+          </a:fillRef>
+          <a:effectRef idx="1">
+            <a:schemeClr val="accent1"/>
+          </a:effectRef>
+          <a:fontRef idx="minor">
+            <a:schemeClr val="tx1"/>
+          </a:fontRef>
+        </p:style>
+      </p:cxnSp>
+      <p:cxnSp>
+        <p:nvCxnSpPr>
+          <p:cNvPr id="27" name="Straight Connector 26">
+            <a:extLst>
+              <a:ext uri="{FF2B5EF4-FFF2-40B4-BE49-F238E27FC236}">
+                <a16:creationId xmlns:a16="http://schemas.microsoft.com/office/drawing/2014/main" id="{3DA3FC97-A09F-0D76-E7DF-CA0E4A514D0E}"/>
+              </a:ext>
+            </a:extLst>
+          </p:cNvPr>
+          <p:cNvCxnSpPr>
+            <a:cxnSpLocks/>
+          </p:cNvCxnSpPr>
+          <p:nvPr/>
+        </p:nvCxnSpPr>
+        <p:spPr>
+          <a:xfrm>
+            <a:off x="2725094" y="5296277"/>
+            <a:ext cx="1136964" cy="398353"/>
+          </a:xfrm>
+          <a:prstGeom prst="line">
+            <a:avLst/>
+          </a:prstGeom>
+        </p:spPr>
+        <p:style>
+          <a:lnRef idx="2">
+            <a:schemeClr val="accent1"/>
+          </a:lnRef>
+          <a:fillRef idx="0">
+            <a:schemeClr val="accent1"/>
+          </a:fillRef>
+          <a:effectRef idx="1">
+            <a:schemeClr val="accent1"/>
+          </a:effectRef>
+          <a:fontRef idx="minor">
+            <a:schemeClr val="tx1"/>
+          </a:fontRef>
+        </p:style>
+      </p:cxnSp>
+      <p:cxnSp>
+        <p:nvCxnSpPr>
+          <p:cNvPr id="29" name="Straight Connector 28">
+            <a:extLst>
+              <a:ext uri="{FF2B5EF4-FFF2-40B4-BE49-F238E27FC236}">
+                <a16:creationId xmlns:a16="http://schemas.microsoft.com/office/drawing/2014/main" id="{60F19470-C38F-16CC-A72B-C1CA3DCC0C16}"/>
+              </a:ext>
+            </a:extLst>
+          </p:cNvPr>
+          <p:cNvCxnSpPr>
+            <a:cxnSpLocks/>
+          </p:cNvCxnSpPr>
+          <p:nvPr/>
+        </p:nvCxnSpPr>
+        <p:spPr>
+          <a:xfrm>
+            <a:off x="3862058" y="5694630"/>
+            <a:ext cx="1536825" cy="337515"/>
+          </a:xfrm>
+          <a:prstGeom prst="line">
+            <a:avLst/>
+          </a:prstGeom>
+        </p:spPr>
+        <p:style>
+          <a:lnRef idx="2">
+            <a:schemeClr val="accent1"/>
+          </a:lnRef>
+          <a:fillRef idx="0">
+            <a:schemeClr val="accent1"/>
+          </a:fillRef>
+          <a:effectRef idx="1">
+            <a:schemeClr val="accent1"/>
+          </a:effectRef>
+          <a:fontRef idx="minor">
+            <a:schemeClr val="tx1"/>
+          </a:fontRef>
+        </p:style>
+      </p:cxnSp>
+      <p:cxnSp>
+        <p:nvCxnSpPr>
+          <p:cNvPr id="31" name="Straight Connector 30">
+            <a:extLst>
+              <a:ext uri="{FF2B5EF4-FFF2-40B4-BE49-F238E27FC236}">
+                <a16:creationId xmlns:a16="http://schemas.microsoft.com/office/drawing/2014/main" id="{C85AAB79-D294-47D3-6E02-04CA7C85ADF4}"/>
+              </a:ext>
+            </a:extLst>
+          </p:cNvPr>
+          <p:cNvCxnSpPr>
+            <a:cxnSpLocks/>
+          </p:cNvCxnSpPr>
+          <p:nvPr/>
+        </p:nvCxnSpPr>
+        <p:spPr>
+          <a:xfrm flipV="1">
+            <a:off x="5373232" y="5644371"/>
+            <a:ext cx="2286000" cy="403173"/>
+          </a:xfrm>
+          <a:prstGeom prst="line">
+            <a:avLst/>
+          </a:prstGeom>
+        </p:spPr>
+        <p:style>
+          <a:lnRef idx="2">
+            <a:schemeClr val="accent1"/>
+          </a:lnRef>
+          <a:fillRef idx="0">
+            <a:schemeClr val="accent1"/>
+          </a:fillRef>
+          <a:effectRef idx="1">
+            <a:schemeClr val="accent1"/>
+          </a:effectRef>
+          <a:fontRef idx="minor">
+            <a:schemeClr val="tx1"/>
+          </a:fontRef>
+        </p:style>
+      </p:cxnSp>
+      <p:cxnSp>
+        <p:nvCxnSpPr>
+          <p:cNvPr id="33" name="Straight Connector 32">
+            <a:extLst>
+              <a:ext uri="{FF2B5EF4-FFF2-40B4-BE49-F238E27FC236}">
+                <a16:creationId xmlns:a16="http://schemas.microsoft.com/office/drawing/2014/main" id="{9DEC60CB-6830-F13C-6243-D560580965E6}"/>
+              </a:ext>
+            </a:extLst>
+          </p:cNvPr>
+          <p:cNvCxnSpPr>
+            <a:cxnSpLocks/>
+          </p:cNvCxnSpPr>
+          <p:nvPr/>
+        </p:nvCxnSpPr>
+        <p:spPr>
+          <a:xfrm>
+            <a:off x="7642634" y="5659770"/>
+            <a:ext cx="2279964" cy="372375"/>
+          </a:xfrm>
+          <a:prstGeom prst="line">
+            <a:avLst/>
+          </a:prstGeom>
+        </p:spPr>
+        <p:style>
+          <a:lnRef idx="2">
+            <a:schemeClr val="accent1"/>
+          </a:lnRef>
+          <a:fillRef idx="0">
+            <a:schemeClr val="accent1"/>
+          </a:fillRef>
+          <a:effectRef idx="1">
+            <a:schemeClr val="accent1"/>
+          </a:effectRef>
+          <a:fontRef idx="minor">
+            <a:schemeClr val="tx1"/>
+          </a:fontRef>
+        </p:style>
+      </p:cxnSp>
+      <p:cxnSp>
+        <p:nvCxnSpPr>
+          <p:cNvPr id="35" name="Straight Connector 34">
+            <a:extLst>
+              <a:ext uri="{FF2B5EF4-FFF2-40B4-BE49-F238E27FC236}">
+                <a16:creationId xmlns:a16="http://schemas.microsoft.com/office/drawing/2014/main" id="{19E10E76-5328-5659-9998-EC565662200B}"/>
+              </a:ext>
+            </a:extLst>
+          </p:cNvPr>
+          <p:cNvCxnSpPr>
+            <a:cxnSpLocks/>
+          </p:cNvCxnSpPr>
+          <p:nvPr/>
+        </p:nvCxnSpPr>
+        <p:spPr>
+          <a:xfrm flipV="1">
+            <a:off x="9922598" y="5676523"/>
+            <a:ext cx="2266384" cy="371021"/>
+          </a:xfrm>
+          <a:prstGeom prst="line">
+            <a:avLst/>
+          </a:prstGeom>
+        </p:spPr>
+        <p:style>
+          <a:lnRef idx="2">
+            <a:schemeClr val="accent1"/>
+          </a:lnRef>
+          <a:fillRef idx="0">
+            <a:schemeClr val="accent1"/>
+          </a:fillRef>
+          <a:effectRef idx="1">
+            <a:schemeClr val="accent1"/>
+          </a:effectRef>
+          <a:fontRef idx="minor">
+            <a:schemeClr val="tx1"/>
+          </a:fontRef>
+        </p:style>
+      </p:cxnSp>
+    </p:spTree>
+    <p:extLst>
+      <p:ext uri="{BB962C8B-B14F-4D97-AF65-F5344CB8AC3E}">
+        <p14:creationId xmlns:p14="http://schemas.microsoft.com/office/powerpoint/2010/main" val="2517153691"/>
+      </p:ext>
+    </p:extLst>
+  </p:cSld>
+  <p:clrMapOvr>
+    <a:masterClrMapping/>
+  </p:clrMapOvr>
+</p:sld>
+</file>
+
+<file path=ppt/slides/slide11.xml><?xml version="1.0" encoding="utf-8"?>
+<p:sld xmlns:a="http://schemas.openxmlformats.org/drawingml/2006/main" xmlns:r="http://schemas.openxmlformats.org/officeDocument/2006/relationships" xmlns:p="http://schemas.openxmlformats.org/presentationml/2006/main">
+  <p:cSld>
+    <p:spTree>
+      <p:nvGrpSpPr>
+        <p:cNvPr id="1" name=""/>
+        <p:cNvGrpSpPr/>
+        <p:nvPr/>
+      </p:nvGrpSpPr>
+      <p:grpSpPr>
+        <a:xfrm>
+          <a:off x="0" y="0"/>
+          <a:ext cx="0" cy="0"/>
+          <a:chOff x="0" y="0"/>
+          <a:chExt cx="0" cy="0"/>
+        </a:xfrm>
+      </p:grpSpPr>
+      <p:sp>
+        <p:nvSpPr>
+          <p:cNvPr id="2" name="Title 1">
+            <a:extLst>
+              <a:ext uri="{FF2B5EF4-FFF2-40B4-BE49-F238E27FC236}">
+                <a16:creationId xmlns:a16="http://schemas.microsoft.com/office/drawing/2014/main" id="{78E3A12E-67E9-7B6E-6E67-64645EE8AA0A}"/>
+              </a:ext>
+            </a:extLst>
+          </p:cNvPr>
+          <p:cNvSpPr>
+            <a:spLocks noGrp="1"/>
+          </p:cNvSpPr>
+          <p:nvPr>
+            <p:ph type="title"/>
+          </p:nvPr>
+        </p:nvSpPr>
+        <p:spPr>
+          <a:xfrm>
+            <a:off x="175727" y="83976"/>
+            <a:ext cx="10515600" cy="474630"/>
+          </a:xfrm>
+        </p:spPr>
+        <p:txBody>
+          <a:bodyPr>
+            <a:noAutofit/>
+          </a:bodyPr>
+          <a:lstStyle/>
+          <a:p>
+            <a:r>
+              <a:rPr lang="en-US" sz="4800" dirty="0"/>
+              <a:t>Face #3</a:t>
+            </a:r>
+          </a:p>
+        </p:txBody>
+      </p:sp>
+      <p:pic>
+        <p:nvPicPr>
+          <p:cNvPr id="5" name="Picture 4">
+            <a:extLst>
+              <a:ext uri="{FF2B5EF4-FFF2-40B4-BE49-F238E27FC236}">
+                <a16:creationId xmlns:a16="http://schemas.microsoft.com/office/drawing/2014/main" id="{482151EE-733A-DC5F-EF0F-B4F7976E8966}"/>
+              </a:ext>
+            </a:extLst>
+          </p:cNvPr>
+          <p:cNvPicPr>
+            <a:picLocks noChangeAspect="1"/>
+          </p:cNvPicPr>
+          <p:nvPr/>
+        </p:nvPicPr>
+        <p:blipFill>
+          <a:blip r:embed="rId2"/>
+          <a:stretch>
+            <a:fillRect/>
+          </a:stretch>
+        </p:blipFill>
+        <p:spPr>
+          <a:xfrm>
+            <a:off x="0" y="652020"/>
+            <a:ext cx="12192000" cy="5553959"/>
+          </a:xfrm>
+          <a:prstGeom prst="rect">
+            <a:avLst/>
+          </a:prstGeom>
+        </p:spPr>
+      </p:pic>
+      <p:cxnSp>
+        <p:nvCxnSpPr>
+          <p:cNvPr id="9" name="Straight Connector 8">
+            <a:extLst>
+              <a:ext uri="{FF2B5EF4-FFF2-40B4-BE49-F238E27FC236}">
+                <a16:creationId xmlns:a16="http://schemas.microsoft.com/office/drawing/2014/main" id="{6DC65E9D-6E4E-4982-B830-4CEA68316194}"/>
+              </a:ext>
+            </a:extLst>
+          </p:cNvPr>
+          <p:cNvCxnSpPr>
+            <a:cxnSpLocks/>
+          </p:cNvCxnSpPr>
+          <p:nvPr/>
+        </p:nvCxnSpPr>
+        <p:spPr>
+          <a:xfrm flipH="1">
+            <a:off x="9884937" y="4544839"/>
+            <a:ext cx="2307063" cy="375000"/>
+          </a:xfrm>
+          <a:prstGeom prst="line">
+            <a:avLst/>
+          </a:prstGeom>
+        </p:spPr>
+        <p:style>
+          <a:lnRef idx="2">
+            <a:schemeClr val="accent1"/>
+          </a:lnRef>
+          <a:fillRef idx="0">
+            <a:schemeClr val="accent1"/>
+          </a:fillRef>
+          <a:effectRef idx="1">
+            <a:schemeClr val="accent1"/>
+          </a:effectRef>
+          <a:fontRef idx="minor">
+            <a:schemeClr val="tx1"/>
+          </a:fontRef>
+        </p:style>
+      </p:cxnSp>
+      <p:cxnSp>
+        <p:nvCxnSpPr>
+          <p:cNvPr id="11" name="Straight Connector 10">
+            <a:extLst>
+              <a:ext uri="{FF2B5EF4-FFF2-40B4-BE49-F238E27FC236}">
+                <a16:creationId xmlns:a16="http://schemas.microsoft.com/office/drawing/2014/main" id="{F38BEC55-8E77-818A-E49C-F7E8420EBB7B}"/>
+              </a:ext>
+            </a:extLst>
+          </p:cNvPr>
+          <p:cNvCxnSpPr>
+            <a:cxnSpLocks/>
+          </p:cNvCxnSpPr>
+          <p:nvPr/>
+        </p:nvCxnSpPr>
+        <p:spPr>
+          <a:xfrm flipH="1" flipV="1">
+            <a:off x="7659232" y="4544839"/>
+            <a:ext cx="2263366" cy="380246"/>
+          </a:xfrm>
+          <a:prstGeom prst="line">
+            <a:avLst/>
+          </a:prstGeom>
+        </p:spPr>
+        <p:style>
+          <a:lnRef idx="2">
+            <a:schemeClr val="accent1"/>
+          </a:lnRef>
+          <a:fillRef idx="0">
+            <a:schemeClr val="accent1"/>
+          </a:fillRef>
+          <a:effectRef idx="1">
+            <a:schemeClr val="accent1"/>
+          </a:effectRef>
+          <a:fontRef idx="minor">
+            <a:schemeClr val="tx1"/>
+          </a:fontRef>
+        </p:style>
+      </p:cxnSp>
+      <p:cxnSp>
+        <p:nvCxnSpPr>
+          <p:cNvPr id="13" name="Straight Connector 12">
+            <a:extLst>
+              <a:ext uri="{FF2B5EF4-FFF2-40B4-BE49-F238E27FC236}">
+                <a16:creationId xmlns:a16="http://schemas.microsoft.com/office/drawing/2014/main" id="{2D79115C-B29B-E661-B047-9AFE9EE44AB7}"/>
+              </a:ext>
+            </a:extLst>
+          </p:cNvPr>
+          <p:cNvCxnSpPr>
+            <a:cxnSpLocks/>
+          </p:cNvCxnSpPr>
+          <p:nvPr/>
+        </p:nvCxnSpPr>
+        <p:spPr>
+          <a:xfrm flipH="1">
+            <a:off x="5396589" y="4544839"/>
             <a:ext cx="2246045" cy="0"/>
           </a:xfrm>
           <a:prstGeom prst="line">
@@ -4726,14 +5754,6 @@
 <file path=ppt/slides/slide2.xml><?xml version="1.0" encoding="utf-8"?>
 <p:sld xmlns:a="http://schemas.openxmlformats.org/drawingml/2006/main" xmlns:r="http://schemas.openxmlformats.org/officeDocument/2006/relationships" xmlns:p="http://schemas.openxmlformats.org/presentationml/2006/main">
   <p:cSld>
-    <p:bg>
-      <p:bgPr>
-        <a:solidFill>
-          <a:schemeClr val="bg1"/>
-        </a:solidFill>
-        <a:effectLst/>
-      </p:bgPr>
-    </p:bg>
     <p:spTree>
       <p:nvGrpSpPr>
         <p:cNvPr id="1" name=""/>
@@ -4750,76 +5770,10 @@
       </p:grpSpPr>
       <p:sp>
         <p:nvSpPr>
-          <p:cNvPr id="10" name="Down Arrow 7">
-            <a:extLst>
-              <a:ext uri="{FF2B5EF4-FFF2-40B4-BE49-F238E27FC236}">
-                <a16:creationId xmlns:a16="http://schemas.microsoft.com/office/drawing/2014/main" id="{D4771268-CB57-404A-9271-370EB28F6090}"/>
-              </a:ext>
-              <a:ext uri="{C183D7F6-B498-43B3-948B-1728B52AA6E4}">
-                <adec:decorative xmlns:adec="http://schemas.microsoft.com/office/drawing/2017/decorative" val="1"/>
-              </a:ext>
-            </a:extLst>
-          </p:cNvPr>
-          <p:cNvSpPr>
-            <a:spLocks noGrp="1" noRot="1" noChangeAspect="1" noMove="1" noResize="1" noEditPoints="1" noAdjustHandles="1" noChangeArrowheads="1" noChangeShapeType="1" noTextEdit="1"/>
-          </p:cNvSpPr>
-          <p:nvPr>
-            <p:extLst>
-              <p:ext uri="{386F3935-93C4-4BCD-93E2-E3B085C9AB24}">
-                <p16:designElem xmlns:p16="http://schemas.microsoft.com/office/powerpoint/2015/main" val="1"/>
-              </p:ext>
-            </p:extLst>
-          </p:nvPr>
-        </p:nvSpPr>
-        <p:spPr>
-          <a:xfrm rot="16200000">
-            <a:off x="800100" y="1491343"/>
-            <a:ext cx="3333749" cy="3499103"/>
-          </a:xfrm>
-          <a:prstGeom prst="downArrow">
-            <a:avLst>
-              <a:gd name="adj1" fmla="val 100000"/>
-              <a:gd name="adj2" fmla="val 15788"/>
-            </a:avLst>
-          </a:prstGeom>
-          <a:solidFill>
-            <a:srgbClr val="404040"/>
-          </a:solidFill>
-          <a:ln w="53975">
-            <a:noFill/>
-          </a:ln>
-        </p:spPr>
-        <p:style>
-          <a:lnRef idx="2">
-            <a:schemeClr val="accent1">
-              <a:shade val="50000"/>
-            </a:schemeClr>
-          </a:lnRef>
-          <a:fillRef idx="1">
-            <a:schemeClr val="accent1"/>
-          </a:fillRef>
-          <a:effectRef idx="0">
-            <a:schemeClr val="accent1"/>
-          </a:effectRef>
-          <a:fontRef idx="minor">
-            <a:schemeClr val="lt1"/>
-          </a:fontRef>
-        </p:style>
-        <p:txBody>
-          <a:bodyPr rtlCol="0" anchor="ctr"/>
-          <a:lstStyle/>
-          <a:p>
-            <a:pPr algn="ctr"/>
-            <a:endParaRPr lang="en-US"/>
-          </a:p>
-        </p:txBody>
-      </p:sp>
-      <p:sp>
-        <p:nvSpPr>
           <p:cNvPr id="2" name="Title 1">
             <a:extLst>
               <a:ext uri="{FF2B5EF4-FFF2-40B4-BE49-F238E27FC236}">
-                <a16:creationId xmlns:a16="http://schemas.microsoft.com/office/drawing/2014/main" id="{C2BE60EB-67A6-F172-6373-FF311ED5CD57}"/>
+                <a16:creationId xmlns:a16="http://schemas.microsoft.com/office/drawing/2014/main" id="{B0C8829D-D281-56A3-C45B-873B13B2C53C}"/>
               </a:ext>
             </a:extLst>
           </p:cNvPr>
@@ -4827,325 +5781,25 @@
             <a:spLocks noGrp="1"/>
           </p:cNvSpPr>
           <p:nvPr>
-            <p:ph type="title"/>
+            <p:ph type="ctrTitle"/>
           </p:nvPr>
         </p:nvSpPr>
-        <p:spPr>
-          <a:xfrm>
-            <a:off x="1028700" y="1967266"/>
-            <a:ext cx="2628900" cy="2547257"/>
-          </a:xfrm>
-          <a:noFill/>
-        </p:spPr>
+        <p:spPr/>
         <p:txBody>
-          <a:bodyPr vert="horz" lIns="91440" tIns="45720" rIns="91440" bIns="45720" rtlCol="0" anchor="ctr">
-            <a:normAutofit/>
-          </a:bodyPr>
+          <a:bodyPr/>
           <a:lstStyle/>
           <a:p>
-            <a:pPr algn="ctr"/>
             <a:r>
-              <a:rPr lang="en-US" sz="3600" kern="1200" dirty="0">
-                <a:solidFill>
-                  <a:srgbClr val="FFFFFF"/>
-                </a:solidFill>
-                <a:latin typeface="+mj-lt"/>
-                <a:ea typeface="+mj-ea"/>
-                <a:cs typeface="+mj-cs"/>
-              </a:rPr>
-              <a:t>Eye #1</a:t>
+              <a:rPr lang="en-US" dirty="0"/>
+              <a:t>Eye Points</a:t>
             </a:r>
           </a:p>
         </p:txBody>
       </p:sp>
-      <p:pic>
-        <p:nvPicPr>
-          <p:cNvPr id="16" name="Picture 15">
-            <a:extLst>
-              <a:ext uri="{FF2B5EF4-FFF2-40B4-BE49-F238E27FC236}">
-                <a16:creationId xmlns:a16="http://schemas.microsoft.com/office/drawing/2014/main" id="{4EEDA010-1746-8BDE-1ED2-D101C940B45B}"/>
-              </a:ext>
-            </a:extLst>
-          </p:cNvPr>
-          <p:cNvPicPr>
-            <a:picLocks noChangeAspect="1"/>
-          </p:cNvPicPr>
-          <p:nvPr/>
-        </p:nvPicPr>
-        <p:blipFill>
-          <a:blip r:embed="rId2"/>
-          <a:stretch>
-            <a:fillRect/>
-          </a:stretch>
-        </p:blipFill>
-        <p:spPr>
-          <a:xfrm>
-            <a:off x="5231204" y="0"/>
-            <a:ext cx="6960796" cy="6858000"/>
-          </a:xfrm>
-          <a:prstGeom prst="rect">
-            <a:avLst/>
-          </a:prstGeom>
-        </p:spPr>
-      </p:pic>
-      <p:cxnSp>
-        <p:nvCxnSpPr>
-          <p:cNvPr id="20" name="Straight Connector 19">
-            <a:extLst>
-              <a:ext uri="{FF2B5EF4-FFF2-40B4-BE49-F238E27FC236}">
-                <a16:creationId xmlns:a16="http://schemas.microsoft.com/office/drawing/2014/main" id="{6773BAFF-677F-8FA1-E4F1-BDE9443FB9EE}"/>
-              </a:ext>
-            </a:extLst>
-          </p:cNvPr>
-          <p:cNvCxnSpPr/>
-          <p:nvPr/>
-        </p:nvCxnSpPr>
-        <p:spPr>
-          <a:xfrm flipV="1">
-            <a:off x="5367867" y="1286933"/>
-            <a:ext cx="2540000" cy="4250267"/>
-          </a:xfrm>
-          <a:prstGeom prst="line">
-            <a:avLst/>
-          </a:prstGeom>
-        </p:spPr>
-        <p:style>
-          <a:lnRef idx="2">
-            <a:schemeClr val="accent1"/>
-          </a:lnRef>
-          <a:fillRef idx="0">
-            <a:schemeClr val="accent1"/>
-          </a:fillRef>
-          <a:effectRef idx="1">
-            <a:schemeClr val="accent1"/>
-          </a:effectRef>
-          <a:fontRef idx="minor">
-            <a:schemeClr val="tx1"/>
-          </a:fontRef>
-        </p:style>
-      </p:cxnSp>
-      <p:cxnSp>
-        <p:nvCxnSpPr>
-          <p:cNvPr id="22" name="Straight Connector 21">
-            <a:extLst>
-              <a:ext uri="{FF2B5EF4-FFF2-40B4-BE49-F238E27FC236}">
-                <a16:creationId xmlns:a16="http://schemas.microsoft.com/office/drawing/2014/main" id="{9F875B2E-E19A-9A5F-AE17-373EC8FFD782}"/>
-              </a:ext>
-            </a:extLst>
-          </p:cNvPr>
-          <p:cNvCxnSpPr>
-            <a:cxnSpLocks/>
-          </p:cNvCxnSpPr>
-          <p:nvPr/>
-        </p:nvCxnSpPr>
-        <p:spPr>
-          <a:xfrm>
-            <a:off x="7907867" y="1286933"/>
-            <a:ext cx="1703061" cy="0"/>
-          </a:xfrm>
-          <a:prstGeom prst="line">
-            <a:avLst/>
-          </a:prstGeom>
-        </p:spPr>
-        <p:style>
-          <a:lnRef idx="2">
-            <a:schemeClr val="accent1"/>
-          </a:lnRef>
-          <a:fillRef idx="0">
-            <a:schemeClr val="accent1"/>
-          </a:fillRef>
-          <a:effectRef idx="1">
-            <a:schemeClr val="accent1"/>
-          </a:effectRef>
-          <a:fontRef idx="minor">
-            <a:schemeClr val="tx1"/>
-          </a:fontRef>
-        </p:style>
-      </p:cxnSp>
-      <p:cxnSp>
-        <p:nvCxnSpPr>
-          <p:cNvPr id="25" name="Straight Connector 24">
-            <a:extLst>
-              <a:ext uri="{FF2B5EF4-FFF2-40B4-BE49-F238E27FC236}">
-                <a16:creationId xmlns:a16="http://schemas.microsoft.com/office/drawing/2014/main" id="{8A3B97BD-1924-C6E1-84C0-C33DA4C35FF2}"/>
-              </a:ext>
-            </a:extLst>
-          </p:cNvPr>
-          <p:cNvCxnSpPr/>
-          <p:nvPr/>
-        </p:nvCxnSpPr>
-        <p:spPr>
-          <a:xfrm>
-            <a:off x="9601200" y="1286933"/>
-            <a:ext cx="2509736" cy="4250267"/>
-          </a:xfrm>
-          <a:prstGeom prst="line">
-            <a:avLst/>
-          </a:prstGeom>
-        </p:spPr>
-        <p:style>
-          <a:lnRef idx="2">
-            <a:schemeClr val="accent1"/>
-          </a:lnRef>
-          <a:fillRef idx="0">
-            <a:schemeClr val="accent1"/>
-          </a:fillRef>
-          <a:effectRef idx="1">
-            <a:schemeClr val="accent1"/>
-          </a:effectRef>
-          <a:fontRef idx="minor">
-            <a:schemeClr val="tx1"/>
-          </a:fontRef>
-        </p:style>
-      </p:cxnSp>
-      <p:cxnSp>
-        <p:nvCxnSpPr>
-          <p:cNvPr id="27" name="Straight Connector 26">
-            <a:extLst>
-              <a:ext uri="{FF2B5EF4-FFF2-40B4-BE49-F238E27FC236}">
-                <a16:creationId xmlns:a16="http://schemas.microsoft.com/office/drawing/2014/main" id="{24F9B259-E673-9874-8FB0-A9ABE023209B}"/>
-              </a:ext>
-            </a:extLst>
-          </p:cNvPr>
-          <p:cNvCxnSpPr/>
-          <p:nvPr/>
-        </p:nvCxnSpPr>
-        <p:spPr>
-          <a:xfrm flipH="1">
-            <a:off x="10476689" y="5537200"/>
-            <a:ext cx="1634247" cy="0"/>
-          </a:xfrm>
-          <a:prstGeom prst="line">
-            <a:avLst/>
-          </a:prstGeom>
-        </p:spPr>
-        <p:style>
-          <a:lnRef idx="2">
-            <a:schemeClr val="accent1"/>
-          </a:lnRef>
-          <a:fillRef idx="0">
-            <a:schemeClr val="accent1"/>
-          </a:fillRef>
-          <a:effectRef idx="1">
-            <a:schemeClr val="accent1"/>
-          </a:effectRef>
-          <a:fontRef idx="minor">
-            <a:schemeClr val="tx1"/>
-          </a:fontRef>
-        </p:style>
-      </p:cxnSp>
-      <p:cxnSp>
-        <p:nvCxnSpPr>
-          <p:cNvPr id="29" name="Straight Connector 28">
-            <a:extLst>
-              <a:ext uri="{FF2B5EF4-FFF2-40B4-BE49-F238E27FC236}">
-                <a16:creationId xmlns:a16="http://schemas.microsoft.com/office/drawing/2014/main" id="{F21C2797-DA5D-7146-AD52-108E5AFE646A}"/>
-              </a:ext>
-            </a:extLst>
-          </p:cNvPr>
-          <p:cNvCxnSpPr/>
-          <p:nvPr/>
-        </p:nvCxnSpPr>
-        <p:spPr>
-          <a:xfrm flipH="1" flipV="1">
-            <a:off x="8759397" y="3429000"/>
-            <a:ext cx="1746475" cy="2108200"/>
-          </a:xfrm>
-          <a:prstGeom prst="line">
-            <a:avLst/>
-          </a:prstGeom>
-        </p:spPr>
-        <p:style>
-          <a:lnRef idx="2">
-            <a:schemeClr val="accent1"/>
-          </a:lnRef>
-          <a:fillRef idx="0">
-            <a:schemeClr val="accent1"/>
-          </a:fillRef>
-          <a:effectRef idx="1">
-            <a:schemeClr val="accent1"/>
-          </a:effectRef>
-          <a:fontRef idx="minor">
-            <a:schemeClr val="tx1"/>
-          </a:fontRef>
-        </p:style>
-      </p:cxnSp>
-      <p:cxnSp>
-        <p:nvCxnSpPr>
-          <p:cNvPr id="31" name="Straight Connector 30">
-            <a:extLst>
-              <a:ext uri="{FF2B5EF4-FFF2-40B4-BE49-F238E27FC236}">
-                <a16:creationId xmlns:a16="http://schemas.microsoft.com/office/drawing/2014/main" id="{8BDF00CB-E64D-9BB6-3773-2F0460836E6F}"/>
-              </a:ext>
-            </a:extLst>
-          </p:cNvPr>
-          <p:cNvCxnSpPr/>
-          <p:nvPr/>
-        </p:nvCxnSpPr>
-        <p:spPr>
-          <a:xfrm flipH="1">
-            <a:off x="7075162" y="3429000"/>
-            <a:ext cx="1708194" cy="2142067"/>
-          </a:xfrm>
-          <a:prstGeom prst="line">
-            <a:avLst/>
-          </a:prstGeom>
-        </p:spPr>
-        <p:style>
-          <a:lnRef idx="2">
-            <a:schemeClr val="accent1"/>
-          </a:lnRef>
-          <a:fillRef idx="0">
-            <a:schemeClr val="accent1"/>
-          </a:fillRef>
-          <a:effectRef idx="1">
-            <a:schemeClr val="accent1"/>
-          </a:effectRef>
-          <a:fontRef idx="minor">
-            <a:schemeClr val="tx1"/>
-          </a:fontRef>
-        </p:style>
-      </p:cxnSp>
-      <p:cxnSp>
-        <p:nvCxnSpPr>
-          <p:cNvPr id="33" name="Straight Connector 32">
-            <a:extLst>
-              <a:ext uri="{FF2B5EF4-FFF2-40B4-BE49-F238E27FC236}">
-                <a16:creationId xmlns:a16="http://schemas.microsoft.com/office/drawing/2014/main" id="{C470E4D4-663E-C2D9-0A69-1FC661B97DA9}"/>
-              </a:ext>
-            </a:extLst>
-          </p:cNvPr>
-          <p:cNvCxnSpPr/>
-          <p:nvPr/>
-        </p:nvCxnSpPr>
-        <p:spPr>
-          <a:xfrm flipH="1">
-            <a:off x="5367867" y="5571067"/>
-            <a:ext cx="1707295" cy="0"/>
-          </a:xfrm>
-          <a:prstGeom prst="line">
-            <a:avLst/>
-          </a:prstGeom>
-        </p:spPr>
-        <p:style>
-          <a:lnRef idx="2">
-            <a:schemeClr val="accent1"/>
-          </a:lnRef>
-          <a:fillRef idx="0">
-            <a:schemeClr val="accent1"/>
-          </a:fillRef>
-          <a:effectRef idx="1">
-            <a:schemeClr val="accent1"/>
-          </a:effectRef>
-          <a:fontRef idx="minor">
-            <a:schemeClr val="tx1"/>
-          </a:fontRef>
-        </p:style>
-      </p:cxnSp>
     </p:spTree>
     <p:extLst>
       <p:ext uri="{BB962C8B-B14F-4D97-AF65-F5344CB8AC3E}">
-        <p14:creationId xmlns:p14="http://schemas.microsoft.com/office/powerpoint/2010/main" val="4210613587"/>
+        <p14:creationId xmlns:p14="http://schemas.microsoft.com/office/powerpoint/2010/main" val="2177959751"/>
       </p:ext>
     </p:extLst>
   </p:cSld>
@@ -5285,24 +5939,8 @@
                 <a:ea typeface="+mj-ea"/>
                 <a:cs typeface="+mj-cs"/>
               </a:rPr>
-              <a:t>Eye #</a:t>
+              <a:t>Eye #1</a:t>
             </a:r>
-            <a:r>
-              <a:rPr lang="en-US" sz="3600" dirty="0">
-                <a:solidFill>
-                  <a:srgbClr val="FFFFFF"/>
-                </a:solidFill>
-              </a:rPr>
-              <a:t>2</a:t>
-            </a:r>
-            <a:endParaRPr lang="en-US" sz="3600" kern="1200" dirty="0">
-              <a:solidFill>
-                <a:srgbClr val="FFFFFF"/>
-              </a:solidFill>
-              <a:latin typeface="+mj-lt"/>
-              <a:ea typeface="+mj-ea"/>
-              <a:cs typeface="+mj-cs"/>
-            </a:endParaRPr>
           </a:p>
         </p:txBody>
       </p:sp>
@@ -5345,15 +5983,13 @@
               </a:ext>
             </a:extLst>
           </p:cNvPr>
-          <p:cNvCxnSpPr>
-            <a:cxnSpLocks/>
-          </p:cNvCxnSpPr>
+          <p:cNvCxnSpPr/>
           <p:nvPr/>
         </p:nvCxnSpPr>
         <p:spPr>
           <a:xfrm flipV="1">
-            <a:off x="5367867" y="2647950"/>
-            <a:ext cx="877520" cy="2441575"/>
+            <a:off x="5367867" y="1286933"/>
+            <a:ext cx="2540000" cy="4250267"/>
           </a:xfrm>
           <a:prstGeom prst="line">
             <a:avLst/>
@@ -5389,9 +6025,9 @@
           <p:nvPr/>
         </p:nvCxnSpPr>
         <p:spPr>
-          <a:xfrm flipV="1">
-            <a:off x="6239567" y="1743075"/>
-            <a:ext cx="2521858" cy="904875"/>
+          <a:xfrm>
+            <a:off x="7907867" y="1286933"/>
+            <a:ext cx="1703061" cy="0"/>
           </a:xfrm>
           <a:prstGeom prst="line">
             <a:avLst/>
@@ -5421,15 +6057,13 @@
               </a:ext>
             </a:extLst>
           </p:cNvPr>
-          <p:cNvCxnSpPr>
-            <a:cxnSpLocks/>
-          </p:cNvCxnSpPr>
+          <p:cNvCxnSpPr/>
           <p:nvPr/>
         </p:nvCxnSpPr>
         <p:spPr>
           <a:xfrm>
-            <a:off x="8761425" y="1741122"/>
-            <a:ext cx="2586513" cy="814509"/>
+            <a:off x="9601200" y="1286933"/>
+            <a:ext cx="2509736" cy="4250267"/>
           </a:xfrm>
           <a:prstGeom prst="line">
             <a:avLst/>
@@ -5459,15 +6093,13 @@
               </a:ext>
             </a:extLst>
           </p:cNvPr>
-          <p:cNvCxnSpPr>
-            <a:cxnSpLocks/>
-          </p:cNvCxnSpPr>
+          <p:cNvCxnSpPr/>
           <p:nvPr/>
         </p:nvCxnSpPr>
         <p:spPr>
-          <a:xfrm>
-            <a:off x="11347938" y="2555631"/>
-            <a:ext cx="755162" cy="2562469"/>
+          <a:xfrm flipH="1">
+            <a:off x="10476689" y="5537200"/>
+            <a:ext cx="1634247" cy="0"/>
           </a:xfrm>
           <a:prstGeom prst="line">
             <a:avLst/>
@@ -5497,15 +6129,13 @@
               </a:ext>
             </a:extLst>
           </p:cNvPr>
-          <p:cNvCxnSpPr>
-            <a:cxnSpLocks/>
-          </p:cNvCxnSpPr>
+          <p:cNvCxnSpPr/>
           <p:nvPr/>
         </p:nvCxnSpPr>
         <p:spPr>
           <a:xfrm flipH="1" flipV="1">
-            <a:off x="9622204" y="4260850"/>
-            <a:ext cx="2480896" cy="828675"/>
+            <a:off x="8759397" y="3429000"/>
+            <a:ext cx="1746475" cy="2108200"/>
           </a:xfrm>
           <a:prstGeom prst="line">
             <a:avLst/>
@@ -5535,15 +6165,13 @@
               </a:ext>
             </a:extLst>
           </p:cNvPr>
-          <p:cNvCxnSpPr>
-            <a:cxnSpLocks/>
-          </p:cNvCxnSpPr>
+          <p:cNvCxnSpPr/>
           <p:nvPr/>
         </p:nvCxnSpPr>
         <p:spPr>
-          <a:xfrm flipH="1" flipV="1">
-            <a:off x="7971121" y="4232275"/>
-            <a:ext cx="1651083" cy="28575"/>
+          <a:xfrm flipH="1">
+            <a:off x="7075162" y="3429000"/>
+            <a:ext cx="1708194" cy="2142067"/>
           </a:xfrm>
           <a:prstGeom prst="line">
             <a:avLst/>
@@ -5573,15 +6201,13 @@
               </a:ext>
             </a:extLst>
           </p:cNvPr>
-          <p:cNvCxnSpPr>
-            <a:cxnSpLocks/>
-          </p:cNvCxnSpPr>
+          <p:cNvCxnSpPr/>
           <p:nvPr/>
         </p:nvCxnSpPr>
         <p:spPr>
           <a:xfrm flipH="1">
-            <a:off x="5367867" y="4257675"/>
-            <a:ext cx="2597122" cy="860425"/>
+            <a:off x="5367867" y="5571067"/>
+            <a:ext cx="1707295" cy="0"/>
           </a:xfrm>
           <a:prstGeom prst="line">
             <a:avLst/>
@@ -5605,7 +6231,7 @@
     </p:spTree>
     <p:extLst>
       <p:ext uri="{BB962C8B-B14F-4D97-AF65-F5344CB8AC3E}">
-        <p14:creationId xmlns:p14="http://schemas.microsoft.com/office/powerpoint/2010/main" val="2059681518"/>
+        <p14:creationId xmlns:p14="http://schemas.microsoft.com/office/powerpoint/2010/main" val="4210613587"/>
       </p:ext>
     </p:extLst>
   </p:cSld>
@@ -5745,8 +6371,24 @@
                 <a:ea typeface="+mj-ea"/>
                 <a:cs typeface="+mj-cs"/>
               </a:rPr>
-              <a:t>Eye #3</a:t>
+              <a:t>Eye #</a:t>
             </a:r>
+            <a:r>
+              <a:rPr lang="en-US" sz="3600" dirty="0">
+                <a:solidFill>
+                  <a:srgbClr val="FFFFFF"/>
+                </a:solidFill>
+              </a:rPr>
+              <a:t>2</a:t>
+            </a:r>
+            <a:endParaRPr lang="en-US" sz="3600" kern="1200" dirty="0">
+              <a:solidFill>
+                <a:srgbClr val="FFFFFF"/>
+              </a:solidFill>
+              <a:latin typeface="+mj-lt"/>
+              <a:ea typeface="+mj-ea"/>
+              <a:cs typeface="+mj-cs"/>
+            </a:endParaRPr>
           </a:p>
         </p:txBody>
       </p:sp>
@@ -5796,8 +6438,8 @@
         </p:nvCxnSpPr>
         <p:spPr>
           <a:xfrm flipV="1">
-            <a:off x="5367867" y="2074985"/>
-            <a:ext cx="1208779" cy="1306635"/>
+            <a:off x="5367867" y="2647950"/>
+            <a:ext cx="877520" cy="2441575"/>
           </a:xfrm>
           <a:prstGeom prst="line">
             <a:avLst/>
@@ -5834,8 +6476,8 @@
         </p:nvCxnSpPr>
         <p:spPr>
           <a:xfrm flipV="1">
-            <a:off x="6576646" y="1676401"/>
-            <a:ext cx="2184779" cy="398584"/>
+            <a:off x="6239567" y="1743075"/>
+            <a:ext cx="2521858" cy="904875"/>
           </a:xfrm>
           <a:prstGeom prst="line">
             <a:avLst/>
@@ -5872,8 +6514,8 @@
         </p:nvCxnSpPr>
         <p:spPr>
           <a:xfrm>
-            <a:off x="8761425" y="1676401"/>
-            <a:ext cx="2586513" cy="873369"/>
+            <a:off x="8761425" y="1741122"/>
+            <a:ext cx="2586513" cy="814509"/>
           </a:xfrm>
           <a:prstGeom prst="line">
             <a:avLst/>
@@ -5910,8 +6552,8 @@
         </p:nvCxnSpPr>
         <p:spPr>
           <a:xfrm>
-            <a:off x="11347938" y="2549770"/>
-            <a:ext cx="755162" cy="1660525"/>
+            <a:off x="11347938" y="2555631"/>
+            <a:ext cx="755162" cy="2562469"/>
           </a:xfrm>
           <a:prstGeom prst="line">
             <a:avLst/>
@@ -5947,9 +6589,9 @@
           <p:nvPr/>
         </p:nvCxnSpPr>
         <p:spPr>
-          <a:xfrm flipH="1">
-            <a:off x="9622204" y="4210295"/>
-            <a:ext cx="2480896" cy="900967"/>
+          <a:xfrm flipH="1" flipV="1">
+            <a:off x="9622204" y="4260850"/>
+            <a:ext cx="2480896" cy="828675"/>
           </a:xfrm>
           <a:prstGeom prst="line">
             <a:avLst/>
@@ -5985,9 +6627,9 @@
           <p:nvPr/>
         </p:nvCxnSpPr>
         <p:spPr>
-          <a:xfrm flipH="1">
-            <a:off x="7104185" y="5111262"/>
-            <a:ext cx="2518019" cy="0"/>
+          <a:xfrm flipH="1" flipV="1">
+            <a:off x="7971121" y="4232275"/>
+            <a:ext cx="1651083" cy="28575"/>
           </a:xfrm>
           <a:prstGeom prst="line">
             <a:avLst/>
@@ -6023,9 +6665,9 @@
           <p:nvPr/>
         </p:nvCxnSpPr>
         <p:spPr>
-          <a:xfrm flipH="1" flipV="1">
-            <a:off x="5367867" y="3381620"/>
-            <a:ext cx="1736318" cy="1729642"/>
+          <a:xfrm flipH="1">
+            <a:off x="5367867" y="4257675"/>
+            <a:ext cx="2597122" cy="860425"/>
           </a:xfrm>
           <a:prstGeom prst="line">
             <a:avLst/>
@@ -6049,7 +6691,7 @@
     </p:spTree>
     <p:extLst>
       <p:ext uri="{BB962C8B-B14F-4D97-AF65-F5344CB8AC3E}">
-        <p14:creationId xmlns:p14="http://schemas.microsoft.com/office/powerpoint/2010/main" val="3928716435"/>
+        <p14:creationId xmlns:p14="http://schemas.microsoft.com/office/powerpoint/2010/main" val="2059681518"/>
       </p:ext>
     </p:extLst>
   </p:cSld>
@@ -6189,7 +6831,7 @@
                 <a:ea typeface="+mj-ea"/>
                 <a:cs typeface="+mj-cs"/>
               </a:rPr>
-              <a:t>Eye #4</a:t>
+              <a:t>Eye #3</a:t>
             </a:r>
           </a:p>
         </p:txBody>
@@ -6239,9 +6881,9 @@
           <p:nvPr/>
         </p:nvCxnSpPr>
         <p:spPr>
-          <a:xfrm flipH="1" flipV="1">
-            <a:off x="5427785" y="1746738"/>
-            <a:ext cx="398584" cy="2133601"/>
+          <a:xfrm flipV="1">
+            <a:off x="5367867" y="2074985"/>
+            <a:ext cx="1208779" cy="1306635"/>
           </a:xfrm>
           <a:prstGeom prst="line">
             <a:avLst/>
@@ -6277,9 +6919,9 @@
           <p:nvPr/>
         </p:nvCxnSpPr>
         <p:spPr>
-          <a:xfrm>
-            <a:off x="5427785" y="1746738"/>
-            <a:ext cx="2895600" cy="410308"/>
+          <a:xfrm flipV="1">
+            <a:off x="6576646" y="1676401"/>
+            <a:ext cx="2184779" cy="398584"/>
           </a:xfrm>
           <a:prstGeom prst="line">
             <a:avLst/>
@@ -6316,8 +6958,8 @@
         </p:nvCxnSpPr>
         <p:spPr>
           <a:xfrm>
-            <a:off x="8323385" y="2157046"/>
-            <a:ext cx="2532184" cy="820615"/>
+            <a:off x="8761425" y="1676401"/>
+            <a:ext cx="2586513" cy="873369"/>
           </a:xfrm>
           <a:prstGeom prst="line">
             <a:avLst/>
@@ -6354,8 +6996,8 @@
         </p:nvCxnSpPr>
         <p:spPr>
           <a:xfrm>
-            <a:off x="10855569" y="2977661"/>
-            <a:ext cx="1247531" cy="2133601"/>
+            <a:off x="11347938" y="2549770"/>
+            <a:ext cx="755162" cy="1660525"/>
           </a:xfrm>
           <a:prstGeom prst="line">
             <a:avLst/>
@@ -6392,8 +7034,8 @@
         </p:nvCxnSpPr>
         <p:spPr>
           <a:xfrm flipH="1">
-            <a:off x="9622204" y="5111262"/>
-            <a:ext cx="2480896" cy="433753"/>
+            <a:off x="9622204" y="4210295"/>
+            <a:ext cx="2480896" cy="900967"/>
           </a:xfrm>
           <a:prstGeom prst="line">
             <a:avLst/>
@@ -6429,9 +7071,9 @@
           <p:nvPr/>
         </p:nvCxnSpPr>
         <p:spPr>
-          <a:xfrm flipH="1" flipV="1">
+          <a:xfrm flipH="1">
             <a:off x="7104185" y="5111262"/>
-            <a:ext cx="2518019" cy="433753"/>
+            <a:ext cx="2518019" cy="0"/>
           </a:xfrm>
           <a:prstGeom prst="line">
             <a:avLst/>
@@ -6468,8 +7110,8 @@
         </p:nvCxnSpPr>
         <p:spPr>
           <a:xfrm flipH="1" flipV="1">
-            <a:off x="5826369" y="3880339"/>
-            <a:ext cx="1277816" cy="1230923"/>
+            <a:off x="5367867" y="3381620"/>
+            <a:ext cx="1736318" cy="1729642"/>
           </a:xfrm>
           <a:prstGeom prst="line">
             <a:avLst/>
@@ -6493,7 +7135,7 @@
     </p:spTree>
     <p:extLst>
       <p:ext uri="{BB962C8B-B14F-4D97-AF65-F5344CB8AC3E}">
-        <p14:creationId xmlns:p14="http://schemas.microsoft.com/office/powerpoint/2010/main" val="1958241090"/>
+        <p14:creationId xmlns:p14="http://schemas.microsoft.com/office/powerpoint/2010/main" val="3928716435"/>
       </p:ext>
     </p:extLst>
   </p:cSld>
@@ -6633,7 +7275,7 @@
                 <a:ea typeface="+mj-ea"/>
                 <a:cs typeface="+mj-cs"/>
               </a:rPr>
-              <a:t>Eye #5</a:t>
+              <a:t>Eye #4</a:t>
             </a:r>
           </a:p>
         </p:txBody>
@@ -6683,9 +7325,9 @@
           <p:nvPr/>
         </p:nvCxnSpPr>
         <p:spPr>
-          <a:xfrm flipV="1">
-            <a:off x="6239567" y="1739900"/>
-            <a:ext cx="806002" cy="1689100"/>
+          <a:xfrm flipH="1" flipV="1">
+            <a:off x="5427785" y="1746738"/>
+            <a:ext cx="398584" cy="2133601"/>
           </a:xfrm>
           <a:prstGeom prst="line">
             <a:avLst/>
@@ -6721,9 +7363,9 @@
           <p:nvPr/>
         </p:nvCxnSpPr>
         <p:spPr>
-          <a:xfrm flipV="1">
-            <a:off x="7045569" y="808892"/>
-            <a:ext cx="1715856" cy="931008"/>
+          <a:xfrm>
+            <a:off x="5427785" y="1746738"/>
+            <a:ext cx="2895600" cy="410308"/>
           </a:xfrm>
           <a:prstGeom prst="line">
             <a:avLst/>
@@ -6760,8 +7402,8 @@
         </p:nvCxnSpPr>
         <p:spPr>
           <a:xfrm>
-            <a:off x="8761425" y="808892"/>
-            <a:ext cx="1707283" cy="931008"/>
+            <a:off x="8323385" y="2157046"/>
+            <a:ext cx="2532184" cy="820615"/>
           </a:xfrm>
           <a:prstGeom prst="line">
             <a:avLst/>
@@ -6797,9 +7439,9 @@
           <p:nvPr/>
         </p:nvCxnSpPr>
         <p:spPr>
-          <a:xfrm flipH="1">
-            <a:off x="10468708" y="3429000"/>
-            <a:ext cx="879230" cy="1689100"/>
+          <a:xfrm>
+            <a:off x="10855569" y="2977661"/>
+            <a:ext cx="1247531" cy="2133601"/>
           </a:xfrm>
           <a:prstGeom prst="line">
             <a:avLst/>
@@ -6836,8 +7478,8 @@
         </p:nvCxnSpPr>
         <p:spPr>
           <a:xfrm flipH="1">
-            <a:off x="8761425" y="5118100"/>
-            <a:ext cx="1707283" cy="837223"/>
+            <a:off x="9622204" y="5111262"/>
+            <a:ext cx="2480896" cy="433753"/>
           </a:xfrm>
           <a:prstGeom prst="line">
             <a:avLst/>
@@ -6874,8 +7516,8 @@
         </p:nvCxnSpPr>
         <p:spPr>
           <a:xfrm flipH="1" flipV="1">
-            <a:off x="7045569" y="5118100"/>
-            <a:ext cx="1715856" cy="837223"/>
+            <a:off x="7104185" y="5111262"/>
+            <a:ext cx="2518019" cy="433753"/>
           </a:xfrm>
           <a:prstGeom prst="line">
             <a:avLst/>
@@ -6912,44 +7554,8 @@
         </p:nvCxnSpPr>
         <p:spPr>
           <a:xfrm flipH="1" flipV="1">
-            <a:off x="6239567" y="3429000"/>
-            <a:ext cx="806002" cy="1660525"/>
-          </a:xfrm>
-          <a:prstGeom prst="line">
-            <a:avLst/>
-          </a:prstGeom>
-        </p:spPr>
-        <p:style>
-          <a:lnRef idx="2">
-            <a:schemeClr val="accent1"/>
-          </a:lnRef>
-          <a:fillRef idx="0">
-            <a:schemeClr val="accent1"/>
-          </a:fillRef>
-          <a:effectRef idx="1">
-            <a:schemeClr val="accent1"/>
-          </a:effectRef>
-          <a:fontRef idx="minor">
-            <a:schemeClr val="tx1"/>
-          </a:fontRef>
-        </p:style>
-      </p:cxnSp>
-      <p:cxnSp>
-        <p:nvCxnSpPr>
-          <p:cNvPr id="28" name="Straight Connector 27">
-            <a:extLst>
-              <a:ext uri="{FF2B5EF4-FFF2-40B4-BE49-F238E27FC236}">
-                <a16:creationId xmlns:a16="http://schemas.microsoft.com/office/drawing/2014/main" id="{03109C14-06D7-0376-9EBA-46A81B08409E}"/>
-              </a:ext>
-            </a:extLst>
-          </p:cNvPr>
-          <p:cNvCxnSpPr/>
-          <p:nvPr/>
-        </p:nvCxnSpPr>
-        <p:spPr>
-          <a:xfrm>
-            <a:off x="10468708" y="1739900"/>
-            <a:ext cx="879230" cy="1689100"/>
+            <a:off x="5826369" y="3880339"/>
+            <a:ext cx="1277816" cy="1230923"/>
           </a:xfrm>
           <a:prstGeom prst="line">
             <a:avLst/>
@@ -6973,7 +7579,7 @@
     </p:spTree>
     <p:extLst>
       <p:ext uri="{BB962C8B-B14F-4D97-AF65-F5344CB8AC3E}">
-        <p14:creationId xmlns:p14="http://schemas.microsoft.com/office/powerpoint/2010/main" val="1206378955"/>
+        <p14:creationId xmlns:p14="http://schemas.microsoft.com/office/powerpoint/2010/main" val="1958241090"/>
       </p:ext>
     </p:extLst>
   </p:cSld>
@@ -6986,6 +7592,14 @@
 <file path=ppt/slides/slide7.xml><?xml version="1.0" encoding="utf-8"?>
 <p:sld xmlns:a="http://schemas.openxmlformats.org/drawingml/2006/main" xmlns:r="http://schemas.openxmlformats.org/officeDocument/2006/relationships" xmlns:p="http://schemas.openxmlformats.org/presentationml/2006/main">
   <p:cSld>
+    <p:bg>
+      <p:bgPr>
+        <a:solidFill>
+          <a:schemeClr val="bg1"/>
+        </a:solidFill>
+        <a:effectLst/>
+      </p:bgPr>
+    </p:bg>
     <p:spTree>
       <p:nvGrpSpPr>
         <p:cNvPr id="1" name=""/>
@@ -7002,10 +7616,76 @@
       </p:grpSpPr>
       <p:sp>
         <p:nvSpPr>
+          <p:cNvPr id="10" name="Down Arrow 7">
+            <a:extLst>
+              <a:ext uri="{FF2B5EF4-FFF2-40B4-BE49-F238E27FC236}">
+                <a16:creationId xmlns:a16="http://schemas.microsoft.com/office/drawing/2014/main" id="{D4771268-CB57-404A-9271-370EB28F6090}"/>
+              </a:ext>
+              <a:ext uri="{C183D7F6-B498-43B3-948B-1728B52AA6E4}">
+                <adec:decorative xmlns:adec="http://schemas.microsoft.com/office/drawing/2017/decorative" val="1"/>
+              </a:ext>
+            </a:extLst>
+          </p:cNvPr>
+          <p:cNvSpPr>
+            <a:spLocks noGrp="1" noRot="1" noChangeAspect="1" noMove="1" noResize="1" noEditPoints="1" noAdjustHandles="1" noChangeArrowheads="1" noChangeShapeType="1" noTextEdit="1"/>
+          </p:cNvSpPr>
+          <p:nvPr>
+            <p:extLst>
+              <p:ext uri="{386F3935-93C4-4BCD-93E2-E3B085C9AB24}">
+                <p16:designElem xmlns:p16="http://schemas.microsoft.com/office/powerpoint/2015/main" val="1"/>
+              </p:ext>
+            </p:extLst>
+          </p:nvPr>
+        </p:nvSpPr>
+        <p:spPr>
+          <a:xfrm rot="16200000">
+            <a:off x="800100" y="1491343"/>
+            <a:ext cx="3333749" cy="3499103"/>
+          </a:xfrm>
+          <a:prstGeom prst="downArrow">
+            <a:avLst>
+              <a:gd name="adj1" fmla="val 100000"/>
+              <a:gd name="adj2" fmla="val 15788"/>
+            </a:avLst>
+          </a:prstGeom>
+          <a:solidFill>
+            <a:srgbClr val="404040"/>
+          </a:solidFill>
+          <a:ln w="53975">
+            <a:noFill/>
+          </a:ln>
+        </p:spPr>
+        <p:style>
+          <a:lnRef idx="2">
+            <a:schemeClr val="accent1">
+              <a:shade val="50000"/>
+            </a:schemeClr>
+          </a:lnRef>
+          <a:fillRef idx="1">
+            <a:schemeClr val="accent1"/>
+          </a:fillRef>
+          <a:effectRef idx="0">
+            <a:schemeClr val="accent1"/>
+          </a:effectRef>
+          <a:fontRef idx="minor">
+            <a:schemeClr val="lt1"/>
+          </a:fontRef>
+        </p:style>
+        <p:txBody>
+          <a:bodyPr rtlCol="0" anchor="ctr"/>
+          <a:lstStyle/>
+          <a:p>
+            <a:pPr algn="ctr"/>
+            <a:endParaRPr lang="en-US"/>
+          </a:p>
+        </p:txBody>
+      </p:sp>
+      <p:sp>
+        <p:nvSpPr>
           <p:cNvPr id="2" name="Title 1">
             <a:extLst>
               <a:ext uri="{FF2B5EF4-FFF2-40B4-BE49-F238E27FC236}">
-                <a16:creationId xmlns:a16="http://schemas.microsoft.com/office/drawing/2014/main" id="{FB479BB9-98BA-F181-D335-9D9490540DFF}"/>
+                <a16:creationId xmlns:a16="http://schemas.microsoft.com/office/drawing/2014/main" id="{C2BE60EB-67A6-F172-6373-FF311ED5CD57}"/>
               </a:ext>
             </a:extLst>
           </p:cNvPr>
@@ -7013,50 +7693,373 @@
             <a:spLocks noGrp="1"/>
           </p:cNvSpPr>
           <p:nvPr>
-            <p:ph type="ctrTitle"/>
+            <p:ph type="title"/>
           </p:nvPr>
         </p:nvSpPr>
-        <p:spPr/>
+        <p:spPr>
+          <a:xfrm>
+            <a:off x="1028700" y="1967266"/>
+            <a:ext cx="2628900" cy="2547257"/>
+          </a:xfrm>
+          <a:noFill/>
+        </p:spPr>
         <p:txBody>
-          <a:bodyPr/>
+          <a:bodyPr vert="horz" lIns="91440" tIns="45720" rIns="91440" bIns="45720" rtlCol="0" anchor="ctr">
+            <a:normAutofit/>
+          </a:bodyPr>
           <a:lstStyle/>
           <a:p>
+            <a:pPr algn="ctr"/>
             <a:r>
-              <a:rPr lang="en-US" dirty="0"/>
-              <a:t>Faces</a:t>
+              <a:rPr lang="en-US" sz="3600" kern="1200" dirty="0">
+                <a:solidFill>
+                  <a:srgbClr val="FFFFFF"/>
+                </a:solidFill>
+                <a:latin typeface="+mj-lt"/>
+                <a:ea typeface="+mj-ea"/>
+                <a:cs typeface="+mj-cs"/>
+              </a:rPr>
+              <a:t>Eye #5</a:t>
             </a:r>
           </a:p>
         </p:txBody>
       </p:sp>
-      <p:sp>
-        <p:nvSpPr>
-          <p:cNvPr id="3" name="Subtitle 2">
-            <a:extLst>
-              <a:ext uri="{FF2B5EF4-FFF2-40B4-BE49-F238E27FC236}">
-                <a16:creationId xmlns:a16="http://schemas.microsoft.com/office/drawing/2014/main" id="{DE40AE67-2EB5-9F31-E696-CE17976E0CC4}"/>
-              </a:ext>
-            </a:extLst>
-          </p:cNvPr>
-          <p:cNvSpPr>
-            <a:spLocks noGrp="1"/>
-          </p:cNvSpPr>
-          <p:nvPr>
-            <p:ph type="subTitle" idx="1"/>
-          </p:nvPr>
-        </p:nvSpPr>
-        <p:spPr/>
-        <p:txBody>
-          <a:bodyPr/>
-          <a:lstStyle/>
-          <a:p>
-            <a:endParaRPr lang="en-US"/>
-          </a:p>
-        </p:txBody>
-      </p:sp>
+      <p:pic>
+        <p:nvPicPr>
+          <p:cNvPr id="16" name="Picture 15">
+            <a:extLst>
+              <a:ext uri="{FF2B5EF4-FFF2-40B4-BE49-F238E27FC236}">
+                <a16:creationId xmlns:a16="http://schemas.microsoft.com/office/drawing/2014/main" id="{4EEDA010-1746-8BDE-1ED2-D101C940B45B}"/>
+              </a:ext>
+            </a:extLst>
+          </p:cNvPr>
+          <p:cNvPicPr>
+            <a:picLocks noChangeAspect="1"/>
+          </p:cNvPicPr>
+          <p:nvPr/>
+        </p:nvPicPr>
+        <p:blipFill>
+          <a:blip r:embed="rId2"/>
+          <a:stretch>
+            <a:fillRect/>
+          </a:stretch>
+        </p:blipFill>
+        <p:spPr>
+          <a:xfrm>
+            <a:off x="5231204" y="0"/>
+            <a:ext cx="6960796" cy="6858000"/>
+          </a:xfrm>
+          <a:prstGeom prst="rect">
+            <a:avLst/>
+          </a:prstGeom>
+        </p:spPr>
+      </p:pic>
+      <p:cxnSp>
+        <p:nvCxnSpPr>
+          <p:cNvPr id="20" name="Straight Connector 19">
+            <a:extLst>
+              <a:ext uri="{FF2B5EF4-FFF2-40B4-BE49-F238E27FC236}">
+                <a16:creationId xmlns:a16="http://schemas.microsoft.com/office/drawing/2014/main" id="{6773BAFF-677F-8FA1-E4F1-BDE9443FB9EE}"/>
+              </a:ext>
+            </a:extLst>
+          </p:cNvPr>
+          <p:cNvCxnSpPr>
+            <a:cxnSpLocks/>
+          </p:cNvCxnSpPr>
+          <p:nvPr/>
+        </p:nvCxnSpPr>
+        <p:spPr>
+          <a:xfrm flipV="1">
+            <a:off x="6239567" y="1739900"/>
+            <a:ext cx="806002" cy="1689100"/>
+          </a:xfrm>
+          <a:prstGeom prst="line">
+            <a:avLst/>
+          </a:prstGeom>
+        </p:spPr>
+        <p:style>
+          <a:lnRef idx="2">
+            <a:schemeClr val="accent1"/>
+          </a:lnRef>
+          <a:fillRef idx="0">
+            <a:schemeClr val="accent1"/>
+          </a:fillRef>
+          <a:effectRef idx="1">
+            <a:schemeClr val="accent1"/>
+          </a:effectRef>
+          <a:fontRef idx="minor">
+            <a:schemeClr val="tx1"/>
+          </a:fontRef>
+        </p:style>
+      </p:cxnSp>
+      <p:cxnSp>
+        <p:nvCxnSpPr>
+          <p:cNvPr id="22" name="Straight Connector 21">
+            <a:extLst>
+              <a:ext uri="{FF2B5EF4-FFF2-40B4-BE49-F238E27FC236}">
+                <a16:creationId xmlns:a16="http://schemas.microsoft.com/office/drawing/2014/main" id="{9F875B2E-E19A-9A5F-AE17-373EC8FFD782}"/>
+              </a:ext>
+            </a:extLst>
+          </p:cNvPr>
+          <p:cNvCxnSpPr>
+            <a:cxnSpLocks/>
+          </p:cNvCxnSpPr>
+          <p:nvPr/>
+        </p:nvCxnSpPr>
+        <p:spPr>
+          <a:xfrm flipV="1">
+            <a:off x="7045569" y="808892"/>
+            <a:ext cx="1715856" cy="931008"/>
+          </a:xfrm>
+          <a:prstGeom prst="line">
+            <a:avLst/>
+          </a:prstGeom>
+        </p:spPr>
+        <p:style>
+          <a:lnRef idx="2">
+            <a:schemeClr val="accent1"/>
+          </a:lnRef>
+          <a:fillRef idx="0">
+            <a:schemeClr val="accent1"/>
+          </a:fillRef>
+          <a:effectRef idx="1">
+            <a:schemeClr val="accent1"/>
+          </a:effectRef>
+          <a:fontRef idx="minor">
+            <a:schemeClr val="tx1"/>
+          </a:fontRef>
+        </p:style>
+      </p:cxnSp>
+      <p:cxnSp>
+        <p:nvCxnSpPr>
+          <p:cNvPr id="25" name="Straight Connector 24">
+            <a:extLst>
+              <a:ext uri="{FF2B5EF4-FFF2-40B4-BE49-F238E27FC236}">
+                <a16:creationId xmlns:a16="http://schemas.microsoft.com/office/drawing/2014/main" id="{8A3B97BD-1924-C6E1-84C0-C33DA4C35FF2}"/>
+              </a:ext>
+            </a:extLst>
+          </p:cNvPr>
+          <p:cNvCxnSpPr>
+            <a:cxnSpLocks/>
+          </p:cNvCxnSpPr>
+          <p:nvPr/>
+        </p:nvCxnSpPr>
+        <p:spPr>
+          <a:xfrm>
+            <a:off x="8761425" y="808892"/>
+            <a:ext cx="1707283" cy="931008"/>
+          </a:xfrm>
+          <a:prstGeom prst="line">
+            <a:avLst/>
+          </a:prstGeom>
+        </p:spPr>
+        <p:style>
+          <a:lnRef idx="2">
+            <a:schemeClr val="accent1"/>
+          </a:lnRef>
+          <a:fillRef idx="0">
+            <a:schemeClr val="accent1"/>
+          </a:fillRef>
+          <a:effectRef idx="1">
+            <a:schemeClr val="accent1"/>
+          </a:effectRef>
+          <a:fontRef idx="minor">
+            <a:schemeClr val="tx1"/>
+          </a:fontRef>
+        </p:style>
+      </p:cxnSp>
+      <p:cxnSp>
+        <p:nvCxnSpPr>
+          <p:cNvPr id="27" name="Straight Connector 26">
+            <a:extLst>
+              <a:ext uri="{FF2B5EF4-FFF2-40B4-BE49-F238E27FC236}">
+                <a16:creationId xmlns:a16="http://schemas.microsoft.com/office/drawing/2014/main" id="{24F9B259-E673-9874-8FB0-A9ABE023209B}"/>
+              </a:ext>
+            </a:extLst>
+          </p:cNvPr>
+          <p:cNvCxnSpPr>
+            <a:cxnSpLocks/>
+          </p:cNvCxnSpPr>
+          <p:nvPr/>
+        </p:nvCxnSpPr>
+        <p:spPr>
+          <a:xfrm flipH="1">
+            <a:off x="10468708" y="3429000"/>
+            <a:ext cx="879230" cy="1689100"/>
+          </a:xfrm>
+          <a:prstGeom prst="line">
+            <a:avLst/>
+          </a:prstGeom>
+        </p:spPr>
+        <p:style>
+          <a:lnRef idx="2">
+            <a:schemeClr val="accent1"/>
+          </a:lnRef>
+          <a:fillRef idx="0">
+            <a:schemeClr val="accent1"/>
+          </a:fillRef>
+          <a:effectRef idx="1">
+            <a:schemeClr val="accent1"/>
+          </a:effectRef>
+          <a:fontRef idx="minor">
+            <a:schemeClr val="tx1"/>
+          </a:fontRef>
+        </p:style>
+      </p:cxnSp>
+      <p:cxnSp>
+        <p:nvCxnSpPr>
+          <p:cNvPr id="29" name="Straight Connector 28">
+            <a:extLst>
+              <a:ext uri="{FF2B5EF4-FFF2-40B4-BE49-F238E27FC236}">
+                <a16:creationId xmlns:a16="http://schemas.microsoft.com/office/drawing/2014/main" id="{F21C2797-DA5D-7146-AD52-108E5AFE646A}"/>
+              </a:ext>
+            </a:extLst>
+          </p:cNvPr>
+          <p:cNvCxnSpPr>
+            <a:cxnSpLocks/>
+          </p:cNvCxnSpPr>
+          <p:nvPr/>
+        </p:nvCxnSpPr>
+        <p:spPr>
+          <a:xfrm flipH="1">
+            <a:off x="8761425" y="5118100"/>
+            <a:ext cx="1707283" cy="837223"/>
+          </a:xfrm>
+          <a:prstGeom prst="line">
+            <a:avLst/>
+          </a:prstGeom>
+        </p:spPr>
+        <p:style>
+          <a:lnRef idx="2">
+            <a:schemeClr val="accent1"/>
+          </a:lnRef>
+          <a:fillRef idx="0">
+            <a:schemeClr val="accent1"/>
+          </a:fillRef>
+          <a:effectRef idx="1">
+            <a:schemeClr val="accent1"/>
+          </a:effectRef>
+          <a:fontRef idx="minor">
+            <a:schemeClr val="tx1"/>
+          </a:fontRef>
+        </p:style>
+      </p:cxnSp>
+      <p:cxnSp>
+        <p:nvCxnSpPr>
+          <p:cNvPr id="31" name="Straight Connector 30">
+            <a:extLst>
+              <a:ext uri="{FF2B5EF4-FFF2-40B4-BE49-F238E27FC236}">
+                <a16:creationId xmlns:a16="http://schemas.microsoft.com/office/drawing/2014/main" id="{8BDF00CB-E64D-9BB6-3773-2F0460836E6F}"/>
+              </a:ext>
+            </a:extLst>
+          </p:cNvPr>
+          <p:cNvCxnSpPr>
+            <a:cxnSpLocks/>
+          </p:cNvCxnSpPr>
+          <p:nvPr/>
+        </p:nvCxnSpPr>
+        <p:spPr>
+          <a:xfrm flipH="1" flipV="1">
+            <a:off x="7045569" y="5118100"/>
+            <a:ext cx="1715856" cy="837223"/>
+          </a:xfrm>
+          <a:prstGeom prst="line">
+            <a:avLst/>
+          </a:prstGeom>
+        </p:spPr>
+        <p:style>
+          <a:lnRef idx="2">
+            <a:schemeClr val="accent1"/>
+          </a:lnRef>
+          <a:fillRef idx="0">
+            <a:schemeClr val="accent1"/>
+          </a:fillRef>
+          <a:effectRef idx="1">
+            <a:schemeClr val="accent1"/>
+          </a:effectRef>
+          <a:fontRef idx="minor">
+            <a:schemeClr val="tx1"/>
+          </a:fontRef>
+        </p:style>
+      </p:cxnSp>
+      <p:cxnSp>
+        <p:nvCxnSpPr>
+          <p:cNvPr id="33" name="Straight Connector 32">
+            <a:extLst>
+              <a:ext uri="{FF2B5EF4-FFF2-40B4-BE49-F238E27FC236}">
+                <a16:creationId xmlns:a16="http://schemas.microsoft.com/office/drawing/2014/main" id="{C470E4D4-663E-C2D9-0A69-1FC661B97DA9}"/>
+              </a:ext>
+            </a:extLst>
+          </p:cNvPr>
+          <p:cNvCxnSpPr>
+            <a:cxnSpLocks/>
+          </p:cNvCxnSpPr>
+          <p:nvPr/>
+        </p:nvCxnSpPr>
+        <p:spPr>
+          <a:xfrm flipH="1" flipV="1">
+            <a:off x="6239567" y="3429000"/>
+            <a:ext cx="806002" cy="1660525"/>
+          </a:xfrm>
+          <a:prstGeom prst="line">
+            <a:avLst/>
+          </a:prstGeom>
+        </p:spPr>
+        <p:style>
+          <a:lnRef idx="2">
+            <a:schemeClr val="accent1"/>
+          </a:lnRef>
+          <a:fillRef idx="0">
+            <a:schemeClr val="accent1"/>
+          </a:fillRef>
+          <a:effectRef idx="1">
+            <a:schemeClr val="accent1"/>
+          </a:effectRef>
+          <a:fontRef idx="minor">
+            <a:schemeClr val="tx1"/>
+          </a:fontRef>
+        </p:style>
+      </p:cxnSp>
+      <p:cxnSp>
+        <p:nvCxnSpPr>
+          <p:cNvPr id="28" name="Straight Connector 27">
+            <a:extLst>
+              <a:ext uri="{FF2B5EF4-FFF2-40B4-BE49-F238E27FC236}">
+                <a16:creationId xmlns:a16="http://schemas.microsoft.com/office/drawing/2014/main" id="{03109C14-06D7-0376-9EBA-46A81B08409E}"/>
+              </a:ext>
+            </a:extLst>
+          </p:cNvPr>
+          <p:cNvCxnSpPr/>
+          <p:nvPr/>
+        </p:nvCxnSpPr>
+        <p:spPr>
+          <a:xfrm>
+            <a:off x="10468708" y="1739900"/>
+            <a:ext cx="879230" cy="1689100"/>
+          </a:xfrm>
+          <a:prstGeom prst="line">
+            <a:avLst/>
+          </a:prstGeom>
+        </p:spPr>
+        <p:style>
+          <a:lnRef idx="2">
+            <a:schemeClr val="accent1"/>
+          </a:lnRef>
+          <a:fillRef idx="0">
+            <a:schemeClr val="accent1"/>
+          </a:fillRef>
+          <a:effectRef idx="1">
+            <a:schemeClr val="accent1"/>
+          </a:effectRef>
+          <a:fontRef idx="minor">
+            <a:schemeClr val="tx1"/>
+          </a:fontRef>
+        </p:style>
+      </p:cxnSp>
     </p:spTree>
     <p:extLst>
       <p:ext uri="{BB962C8B-B14F-4D97-AF65-F5344CB8AC3E}">
-        <p14:creationId xmlns:p14="http://schemas.microsoft.com/office/powerpoint/2010/main" val="3587196432"/>
+        <p14:creationId xmlns:p14="http://schemas.microsoft.com/office/powerpoint/2010/main" val="1206378955"/>
       </p:ext>
     </p:extLst>
   </p:cSld>
@@ -7088,7 +8091,7 @@
           <p:cNvPr id="2" name="Title 1">
             <a:extLst>
               <a:ext uri="{FF2B5EF4-FFF2-40B4-BE49-F238E27FC236}">
-                <a16:creationId xmlns:a16="http://schemas.microsoft.com/office/drawing/2014/main" id="{78E3A12E-67E9-7B6E-6E67-64645EE8AA0A}"/>
+                <a16:creationId xmlns:a16="http://schemas.microsoft.com/office/drawing/2014/main" id="{FB479BB9-98BA-F181-D335-9D9490540DFF}"/>
               </a:ext>
             </a:extLst>
           </p:cNvPr>
@@ -7096,480 +8099,50 @@
             <a:spLocks noGrp="1"/>
           </p:cNvSpPr>
           <p:nvPr>
-            <p:ph type="title"/>
+            <p:ph type="ctrTitle"/>
           </p:nvPr>
         </p:nvSpPr>
-        <p:spPr>
-          <a:xfrm>
-            <a:off x="175727" y="83976"/>
-            <a:ext cx="10515600" cy="474630"/>
-          </a:xfrm>
-        </p:spPr>
+        <p:spPr/>
         <p:txBody>
-          <a:bodyPr>
-            <a:noAutofit/>
-          </a:bodyPr>
+          <a:bodyPr/>
           <a:lstStyle/>
           <a:p>
             <a:r>
-              <a:rPr lang="en-US" sz="4800" dirty="0"/>
-              <a:t>Face #1</a:t>
+              <a:rPr lang="en-US" dirty="0"/>
+              <a:t>Faces</a:t>
             </a:r>
           </a:p>
         </p:txBody>
       </p:sp>
-      <p:pic>
-        <p:nvPicPr>
-          <p:cNvPr id="5" name="Picture 4">
-            <a:extLst>
-              <a:ext uri="{FF2B5EF4-FFF2-40B4-BE49-F238E27FC236}">
-                <a16:creationId xmlns:a16="http://schemas.microsoft.com/office/drawing/2014/main" id="{482151EE-733A-DC5F-EF0F-B4F7976E8966}"/>
-              </a:ext>
-            </a:extLst>
-          </p:cNvPr>
-          <p:cNvPicPr>
-            <a:picLocks noChangeAspect="1"/>
-          </p:cNvPicPr>
-          <p:nvPr/>
-        </p:nvPicPr>
-        <p:blipFill>
-          <a:blip r:embed="rId2"/>
-          <a:stretch>
-            <a:fillRect/>
-          </a:stretch>
-        </p:blipFill>
-        <p:spPr>
-          <a:xfrm>
-            <a:off x="0" y="652020"/>
-            <a:ext cx="12192000" cy="5553959"/>
-          </a:xfrm>
-          <a:prstGeom prst="rect">
-            <a:avLst/>
-          </a:prstGeom>
-        </p:spPr>
-      </p:pic>
-      <p:cxnSp>
-        <p:nvCxnSpPr>
-          <p:cNvPr id="9" name="Straight Connector 8">
-            <a:extLst>
-              <a:ext uri="{FF2B5EF4-FFF2-40B4-BE49-F238E27FC236}">
-                <a16:creationId xmlns:a16="http://schemas.microsoft.com/office/drawing/2014/main" id="{6DC65E9D-6E4E-4982-B830-4CEA68316194}"/>
-              </a:ext>
-            </a:extLst>
-          </p:cNvPr>
-          <p:cNvCxnSpPr>
-            <a:cxnSpLocks/>
-          </p:cNvCxnSpPr>
-          <p:nvPr/>
-        </p:nvCxnSpPr>
-        <p:spPr>
-          <a:xfrm flipH="1">
-            <a:off x="9884937" y="4544839"/>
-            <a:ext cx="2307063" cy="375000"/>
-          </a:xfrm>
-          <a:prstGeom prst="line">
-            <a:avLst/>
-          </a:prstGeom>
-        </p:spPr>
-        <p:style>
-          <a:lnRef idx="2">
-            <a:schemeClr val="accent1"/>
-          </a:lnRef>
-          <a:fillRef idx="0">
-            <a:schemeClr val="accent1"/>
-          </a:fillRef>
-          <a:effectRef idx="1">
-            <a:schemeClr val="accent1"/>
-          </a:effectRef>
-          <a:fontRef idx="minor">
-            <a:schemeClr val="tx1"/>
-          </a:fontRef>
-        </p:style>
-      </p:cxnSp>
-      <p:cxnSp>
-        <p:nvCxnSpPr>
-          <p:cNvPr id="11" name="Straight Connector 10">
-            <a:extLst>
-              <a:ext uri="{FF2B5EF4-FFF2-40B4-BE49-F238E27FC236}">
-                <a16:creationId xmlns:a16="http://schemas.microsoft.com/office/drawing/2014/main" id="{F38BEC55-8E77-818A-E49C-F7E8420EBB7B}"/>
-              </a:ext>
-            </a:extLst>
-          </p:cNvPr>
-          <p:cNvCxnSpPr>
-            <a:cxnSpLocks/>
-          </p:cNvCxnSpPr>
-          <p:nvPr/>
-        </p:nvCxnSpPr>
-        <p:spPr>
-          <a:xfrm flipH="1" flipV="1">
-            <a:off x="7659232" y="4544839"/>
-            <a:ext cx="2263366" cy="380246"/>
-          </a:xfrm>
-          <a:prstGeom prst="line">
-            <a:avLst/>
-          </a:prstGeom>
-        </p:spPr>
-        <p:style>
-          <a:lnRef idx="2">
-            <a:schemeClr val="accent1"/>
-          </a:lnRef>
-          <a:fillRef idx="0">
-            <a:schemeClr val="accent1"/>
-          </a:fillRef>
-          <a:effectRef idx="1">
-            <a:schemeClr val="accent1"/>
-          </a:effectRef>
-          <a:fontRef idx="minor">
-            <a:schemeClr val="tx1"/>
-          </a:fontRef>
-        </p:style>
-      </p:cxnSp>
-      <p:cxnSp>
-        <p:nvCxnSpPr>
-          <p:cNvPr id="13" name="Straight Connector 12">
-            <a:extLst>
-              <a:ext uri="{FF2B5EF4-FFF2-40B4-BE49-F238E27FC236}">
-                <a16:creationId xmlns:a16="http://schemas.microsoft.com/office/drawing/2014/main" id="{2D79115C-B29B-E661-B047-9AFE9EE44AB7}"/>
-              </a:ext>
-            </a:extLst>
-          </p:cNvPr>
-          <p:cNvCxnSpPr>
-            <a:cxnSpLocks/>
-          </p:cNvCxnSpPr>
-          <p:nvPr/>
-        </p:nvCxnSpPr>
-        <p:spPr>
-          <a:xfrm flipH="1">
-            <a:off x="5396589" y="4544839"/>
-            <a:ext cx="2246045" cy="374932"/>
-          </a:xfrm>
-          <a:prstGeom prst="line">
-            <a:avLst/>
-          </a:prstGeom>
-        </p:spPr>
-        <p:style>
-          <a:lnRef idx="2">
-            <a:schemeClr val="accent1"/>
-          </a:lnRef>
-          <a:fillRef idx="0">
-            <a:schemeClr val="accent1"/>
-          </a:fillRef>
-          <a:effectRef idx="1">
-            <a:schemeClr val="accent1"/>
-          </a:effectRef>
-          <a:fontRef idx="minor">
-            <a:schemeClr val="tx1"/>
-          </a:fontRef>
-        </p:style>
-      </p:cxnSp>
-      <p:cxnSp>
-        <p:nvCxnSpPr>
-          <p:cNvPr id="21" name="Straight Connector 20">
-            <a:extLst>
-              <a:ext uri="{FF2B5EF4-FFF2-40B4-BE49-F238E27FC236}">
-                <a16:creationId xmlns:a16="http://schemas.microsoft.com/office/drawing/2014/main" id="{9ECAE667-05EC-D218-F92D-031D1CC71844}"/>
-              </a:ext>
-            </a:extLst>
-          </p:cNvPr>
-          <p:cNvCxnSpPr>
-            <a:cxnSpLocks/>
-          </p:cNvCxnSpPr>
-          <p:nvPr/>
-        </p:nvCxnSpPr>
-        <p:spPr>
-          <a:xfrm flipH="1" flipV="1">
-            <a:off x="3862058" y="4544839"/>
-            <a:ext cx="1534531" cy="359643"/>
-          </a:xfrm>
-          <a:prstGeom prst="line">
-            <a:avLst/>
-          </a:prstGeom>
-        </p:spPr>
-        <p:style>
-          <a:lnRef idx="2">
-            <a:schemeClr val="accent1"/>
-          </a:lnRef>
-          <a:fillRef idx="0">
-            <a:schemeClr val="accent1"/>
-          </a:fillRef>
-          <a:effectRef idx="1">
-            <a:schemeClr val="accent1"/>
-          </a:effectRef>
-          <a:fontRef idx="minor">
-            <a:schemeClr val="tx1"/>
-          </a:fontRef>
-        </p:style>
-      </p:cxnSp>
-      <p:cxnSp>
-        <p:nvCxnSpPr>
-          <p:cNvPr id="23" name="Straight Connector 22">
-            <a:extLst>
-              <a:ext uri="{FF2B5EF4-FFF2-40B4-BE49-F238E27FC236}">
-                <a16:creationId xmlns:a16="http://schemas.microsoft.com/office/drawing/2014/main" id="{E530229F-89CE-FE75-CA19-B7E654087376}"/>
-              </a:ext>
-            </a:extLst>
-          </p:cNvPr>
-          <p:cNvCxnSpPr>
-            <a:cxnSpLocks/>
-          </p:cNvCxnSpPr>
-          <p:nvPr/>
-        </p:nvCxnSpPr>
-        <p:spPr>
-          <a:xfrm flipH="1" flipV="1">
-            <a:off x="2353901" y="3428999"/>
-            <a:ext cx="1508157" cy="1115840"/>
-          </a:xfrm>
-          <a:prstGeom prst="line">
-            <a:avLst/>
-          </a:prstGeom>
-        </p:spPr>
-        <p:style>
-          <a:lnRef idx="2">
-            <a:schemeClr val="accent1"/>
-          </a:lnRef>
-          <a:fillRef idx="0">
-            <a:schemeClr val="accent1"/>
-          </a:fillRef>
-          <a:effectRef idx="1">
-            <a:schemeClr val="accent1"/>
-          </a:effectRef>
-          <a:fontRef idx="minor">
-            <a:schemeClr val="tx1"/>
-          </a:fontRef>
-        </p:style>
-      </p:cxnSp>
-      <p:cxnSp>
-        <p:nvCxnSpPr>
-          <p:cNvPr id="25" name="Straight Connector 24">
-            <a:extLst>
-              <a:ext uri="{FF2B5EF4-FFF2-40B4-BE49-F238E27FC236}">
-                <a16:creationId xmlns:a16="http://schemas.microsoft.com/office/drawing/2014/main" id="{15298556-20C9-DE82-AD3D-2640DEF38799}"/>
-              </a:ext>
-            </a:extLst>
-          </p:cNvPr>
-          <p:cNvCxnSpPr>
-            <a:cxnSpLocks/>
-          </p:cNvCxnSpPr>
-          <p:nvPr/>
-        </p:nvCxnSpPr>
-        <p:spPr>
-          <a:xfrm>
-            <a:off x="2362954" y="3428999"/>
-            <a:ext cx="362140" cy="1523246"/>
-          </a:xfrm>
-          <a:prstGeom prst="line">
-            <a:avLst/>
-          </a:prstGeom>
-        </p:spPr>
-        <p:style>
-          <a:lnRef idx="2">
-            <a:schemeClr val="accent1"/>
-          </a:lnRef>
-          <a:fillRef idx="0">
-            <a:schemeClr val="accent1"/>
-          </a:fillRef>
-          <a:effectRef idx="1">
-            <a:schemeClr val="accent1"/>
-          </a:effectRef>
-          <a:fontRef idx="minor">
-            <a:schemeClr val="tx1"/>
-          </a:fontRef>
-        </p:style>
-      </p:cxnSp>
-      <p:cxnSp>
-        <p:nvCxnSpPr>
-          <p:cNvPr id="27" name="Straight Connector 26">
-            <a:extLst>
-              <a:ext uri="{FF2B5EF4-FFF2-40B4-BE49-F238E27FC236}">
-                <a16:creationId xmlns:a16="http://schemas.microsoft.com/office/drawing/2014/main" id="{3DA3FC97-A09F-0D76-E7DF-CA0E4A514D0E}"/>
-              </a:ext>
-            </a:extLst>
-          </p:cNvPr>
-          <p:cNvCxnSpPr>
-            <a:cxnSpLocks/>
-          </p:cNvCxnSpPr>
-          <p:nvPr/>
-        </p:nvCxnSpPr>
-        <p:spPr>
-          <a:xfrm>
-            <a:off x="2734147" y="4952245"/>
-            <a:ext cx="1131683" cy="724278"/>
-          </a:xfrm>
-          <a:prstGeom prst="line">
-            <a:avLst/>
-          </a:prstGeom>
-        </p:spPr>
-        <p:style>
-          <a:lnRef idx="2">
-            <a:schemeClr val="accent1"/>
-          </a:lnRef>
-          <a:fillRef idx="0">
-            <a:schemeClr val="accent1"/>
-          </a:fillRef>
-          <a:effectRef idx="1">
-            <a:schemeClr val="accent1"/>
-          </a:effectRef>
-          <a:fontRef idx="minor">
-            <a:schemeClr val="tx1"/>
-          </a:fontRef>
-        </p:style>
-      </p:cxnSp>
-      <p:cxnSp>
-        <p:nvCxnSpPr>
-          <p:cNvPr id="29" name="Straight Connector 28">
-            <a:extLst>
-              <a:ext uri="{FF2B5EF4-FFF2-40B4-BE49-F238E27FC236}">
-                <a16:creationId xmlns:a16="http://schemas.microsoft.com/office/drawing/2014/main" id="{60F19470-C38F-16CC-A72B-C1CA3DCC0C16}"/>
-              </a:ext>
-            </a:extLst>
-          </p:cNvPr>
-          <p:cNvCxnSpPr>
-            <a:cxnSpLocks/>
-          </p:cNvCxnSpPr>
-          <p:nvPr/>
-        </p:nvCxnSpPr>
-        <p:spPr>
-          <a:xfrm>
-            <a:off x="3862058" y="5694630"/>
-            <a:ext cx="1536825" cy="337515"/>
-          </a:xfrm>
-          <a:prstGeom prst="line">
-            <a:avLst/>
-          </a:prstGeom>
-        </p:spPr>
-        <p:style>
-          <a:lnRef idx="2">
-            <a:schemeClr val="accent1"/>
-          </a:lnRef>
-          <a:fillRef idx="0">
-            <a:schemeClr val="accent1"/>
-          </a:fillRef>
-          <a:effectRef idx="1">
-            <a:schemeClr val="accent1"/>
-          </a:effectRef>
-          <a:fontRef idx="minor">
-            <a:schemeClr val="tx1"/>
-          </a:fontRef>
-        </p:style>
-      </p:cxnSp>
-      <p:cxnSp>
-        <p:nvCxnSpPr>
-          <p:cNvPr id="31" name="Straight Connector 30">
-            <a:extLst>
-              <a:ext uri="{FF2B5EF4-FFF2-40B4-BE49-F238E27FC236}">
-                <a16:creationId xmlns:a16="http://schemas.microsoft.com/office/drawing/2014/main" id="{C85AAB79-D294-47D3-6E02-04CA7C85ADF4}"/>
-              </a:ext>
-            </a:extLst>
-          </p:cNvPr>
-          <p:cNvCxnSpPr>
-            <a:cxnSpLocks/>
-          </p:cNvCxnSpPr>
-          <p:nvPr/>
-        </p:nvCxnSpPr>
-        <p:spPr>
-          <a:xfrm flipV="1">
-            <a:off x="5373232" y="5644371"/>
-            <a:ext cx="2286000" cy="403173"/>
-          </a:xfrm>
-          <a:prstGeom prst="line">
-            <a:avLst/>
-          </a:prstGeom>
-        </p:spPr>
-        <p:style>
-          <a:lnRef idx="2">
-            <a:schemeClr val="accent1"/>
-          </a:lnRef>
-          <a:fillRef idx="0">
-            <a:schemeClr val="accent1"/>
-          </a:fillRef>
-          <a:effectRef idx="1">
-            <a:schemeClr val="accent1"/>
-          </a:effectRef>
-          <a:fontRef idx="minor">
-            <a:schemeClr val="tx1"/>
-          </a:fontRef>
-        </p:style>
-      </p:cxnSp>
-      <p:cxnSp>
-        <p:nvCxnSpPr>
-          <p:cNvPr id="33" name="Straight Connector 32">
-            <a:extLst>
-              <a:ext uri="{FF2B5EF4-FFF2-40B4-BE49-F238E27FC236}">
-                <a16:creationId xmlns:a16="http://schemas.microsoft.com/office/drawing/2014/main" id="{9DEC60CB-6830-F13C-6243-D560580965E6}"/>
-              </a:ext>
-            </a:extLst>
-          </p:cNvPr>
-          <p:cNvCxnSpPr>
-            <a:cxnSpLocks/>
-          </p:cNvCxnSpPr>
-          <p:nvPr/>
-        </p:nvCxnSpPr>
-        <p:spPr>
-          <a:xfrm>
-            <a:off x="7642634" y="5659770"/>
-            <a:ext cx="2279964" cy="372375"/>
-          </a:xfrm>
-          <a:prstGeom prst="line">
-            <a:avLst/>
-          </a:prstGeom>
-        </p:spPr>
-        <p:style>
-          <a:lnRef idx="2">
-            <a:schemeClr val="accent1"/>
-          </a:lnRef>
-          <a:fillRef idx="0">
-            <a:schemeClr val="accent1"/>
-          </a:fillRef>
-          <a:effectRef idx="1">
-            <a:schemeClr val="accent1"/>
-          </a:effectRef>
-          <a:fontRef idx="minor">
-            <a:schemeClr val="tx1"/>
-          </a:fontRef>
-        </p:style>
-      </p:cxnSp>
-      <p:cxnSp>
-        <p:nvCxnSpPr>
-          <p:cNvPr id="35" name="Straight Connector 34">
-            <a:extLst>
-              <a:ext uri="{FF2B5EF4-FFF2-40B4-BE49-F238E27FC236}">
-                <a16:creationId xmlns:a16="http://schemas.microsoft.com/office/drawing/2014/main" id="{19E10E76-5328-5659-9998-EC565662200B}"/>
-              </a:ext>
-            </a:extLst>
-          </p:cNvPr>
-          <p:cNvCxnSpPr>
-            <a:cxnSpLocks/>
-          </p:cNvCxnSpPr>
-          <p:nvPr/>
-        </p:nvCxnSpPr>
-        <p:spPr>
-          <a:xfrm flipV="1">
-            <a:off x="9922598" y="5676523"/>
-            <a:ext cx="2266384" cy="371021"/>
-          </a:xfrm>
-          <a:prstGeom prst="line">
-            <a:avLst/>
-          </a:prstGeom>
-        </p:spPr>
-        <p:style>
-          <a:lnRef idx="2">
-            <a:schemeClr val="accent1"/>
-          </a:lnRef>
-          <a:fillRef idx="0">
-            <a:schemeClr val="accent1"/>
-          </a:fillRef>
-          <a:effectRef idx="1">
-            <a:schemeClr val="accent1"/>
-          </a:effectRef>
-          <a:fontRef idx="minor">
-            <a:schemeClr val="tx1"/>
-          </a:fontRef>
-        </p:style>
-      </p:cxnSp>
+      <p:sp>
+        <p:nvSpPr>
+          <p:cNvPr id="3" name="Subtitle 2">
+            <a:extLst>
+              <a:ext uri="{FF2B5EF4-FFF2-40B4-BE49-F238E27FC236}">
+                <a16:creationId xmlns:a16="http://schemas.microsoft.com/office/drawing/2014/main" id="{DE40AE67-2EB5-9F31-E696-CE17976E0CC4}"/>
+              </a:ext>
+            </a:extLst>
+          </p:cNvPr>
+          <p:cNvSpPr>
+            <a:spLocks noGrp="1"/>
+          </p:cNvSpPr>
+          <p:nvPr>
+            <p:ph type="subTitle" idx="1"/>
+          </p:nvPr>
+        </p:nvSpPr>
+        <p:spPr/>
+        <p:txBody>
+          <a:bodyPr/>
+          <a:lstStyle/>
+          <a:p>
+            <a:endParaRPr lang="en-US"/>
+          </a:p>
+        </p:txBody>
+      </p:sp>
     </p:spTree>
     <p:extLst>
       <p:ext uri="{BB962C8B-B14F-4D97-AF65-F5344CB8AC3E}">
-        <p14:creationId xmlns:p14="http://schemas.microsoft.com/office/powerpoint/2010/main" val="3941456667"/>
+        <p14:creationId xmlns:p14="http://schemas.microsoft.com/office/powerpoint/2010/main" val="3587196432"/>
       </p:ext>
     </p:extLst>
   </p:cSld>
@@ -7626,7 +8199,7 @@
           <a:p>
             <a:r>
               <a:rPr lang="en-US" sz="4800" dirty="0"/>
-              <a:t>Face #2</a:t>
+              <a:t>Face #1</a:t>
             </a:r>
           </a:p>
         </p:txBody>
@@ -7790,9 +8363,9 @@
           <p:nvPr/>
         </p:nvCxnSpPr>
         <p:spPr>
-          <a:xfrm flipH="1">
-            <a:off x="3862058" y="4904482"/>
-            <a:ext cx="1534531" cy="15289"/>
+          <a:xfrm flipH="1" flipV="1">
+            <a:off x="3862058" y="4544839"/>
+            <a:ext cx="1534531" cy="359643"/>
           </a:xfrm>
           <a:prstGeom prst="line">
             <a:avLst/>
@@ -7829,8 +8402,8 @@
         </p:nvCxnSpPr>
         <p:spPr>
           <a:xfrm flipH="1" flipV="1">
-            <a:off x="2353901" y="4544839"/>
-            <a:ext cx="1508157" cy="374932"/>
+            <a:off x="2353901" y="3428999"/>
+            <a:ext cx="1508157" cy="1115840"/>
           </a:xfrm>
           <a:prstGeom prst="line">
             <a:avLst/>
@@ -7867,8 +8440,8 @@
         </p:nvCxnSpPr>
         <p:spPr>
           <a:xfrm>
-            <a:off x="2353901" y="4544839"/>
-            <a:ext cx="371193" cy="751438"/>
+            <a:off x="2362954" y="3428999"/>
+            <a:ext cx="362140" cy="1523246"/>
           </a:xfrm>
           <a:prstGeom prst="line">
             <a:avLst/>
@@ -7905,8 +8478,8 @@
         </p:nvCxnSpPr>
         <p:spPr>
           <a:xfrm>
-            <a:off x="2725094" y="5296277"/>
-            <a:ext cx="1136964" cy="398353"/>
+            <a:off x="2734147" y="4952245"/>
+            <a:ext cx="1131683" cy="724278"/>
           </a:xfrm>
           <a:prstGeom prst="line">
             <a:avLst/>
@@ -8082,7 +8655,7 @@
     </p:spTree>
     <p:extLst>
       <p:ext uri="{BB962C8B-B14F-4D97-AF65-F5344CB8AC3E}">
-        <p14:creationId xmlns:p14="http://schemas.microsoft.com/office/powerpoint/2010/main" val="2517153691"/>
+        <p14:creationId xmlns:p14="http://schemas.microsoft.com/office/powerpoint/2010/main" val="3941456667"/>
       </p:ext>
     </p:extLst>
   </p:cSld>

</xml_diff>

<commit_message>
Bug fixes with bluetooth
</commit_message>
<xml_diff>
--- a/assets/FaceMaps.pptx
+++ b/assets/FaceMaps.pptx
@@ -134,6 +134,1003 @@
 <file path=ppt/changesInfos/changesInfo1.xml><?xml version="1.0" encoding="utf-8"?>
 <pc:chgInfo xmlns:a="http://schemas.openxmlformats.org/drawingml/2006/main" xmlns:r="http://schemas.openxmlformats.org/officeDocument/2006/relationships" xmlns:ac="http://schemas.microsoft.com/office/drawing/2013/main/command" xmlns:pc="http://schemas.microsoft.com/office/powerpoint/2013/main/command">
   <pc:docChgLst>
+    <pc:chgData name="Tyler Place" userId="ea307159bb280439" providerId="LiveId" clId="{09E72B4C-2191-4659-97A9-43CF591626FA}"/>
+    <pc:docChg chg="undo redo custSel addSld delSld modSld sldOrd">
+      <pc:chgData name="Tyler Place" userId="ea307159bb280439" providerId="LiveId" clId="{09E72B4C-2191-4659-97A9-43CF591626FA}" dt="2024-10-28T02:21:24.175" v="624" actId="14100"/>
+      <pc:docMkLst>
+        <pc:docMk/>
+      </pc:docMkLst>
+      <pc:sldChg chg="modSp mod">
+        <pc:chgData name="Tyler Place" userId="ea307159bb280439" providerId="LiveId" clId="{09E72B4C-2191-4659-97A9-43CF591626FA}" dt="2024-10-27T21:45:19.157" v="460" actId="14100"/>
+        <pc:sldMkLst>
+          <pc:docMk/>
+          <pc:sldMk cId="4210613587" sldId="257"/>
+        </pc:sldMkLst>
+        <pc:cxnChg chg="mod">
+          <ac:chgData name="Tyler Place" userId="ea307159bb280439" providerId="LiveId" clId="{09E72B4C-2191-4659-97A9-43CF591626FA}" dt="2024-10-27T21:45:19.157" v="460" actId="14100"/>
+          <ac:cxnSpMkLst>
+            <pc:docMk/>
+            <pc:sldMk cId="4210613587" sldId="257"/>
+            <ac:cxnSpMk id="20" creationId="{6773BAFF-677F-8FA1-E4F1-BDE9443FB9EE}"/>
+          </ac:cxnSpMkLst>
+        </pc:cxnChg>
+        <pc:cxnChg chg="mod">
+          <ac:chgData name="Tyler Place" userId="ea307159bb280439" providerId="LiveId" clId="{09E72B4C-2191-4659-97A9-43CF591626FA}" dt="2024-10-27T21:45:11.636" v="459" actId="14100"/>
+          <ac:cxnSpMkLst>
+            <pc:docMk/>
+            <pc:sldMk cId="4210613587" sldId="257"/>
+            <ac:cxnSpMk id="22" creationId="{9F875B2E-E19A-9A5F-AE17-373EC8FFD782}"/>
+          </ac:cxnSpMkLst>
+        </pc:cxnChg>
+        <pc:cxnChg chg="mod">
+          <ac:chgData name="Tyler Place" userId="ea307159bb280439" providerId="LiveId" clId="{09E72B4C-2191-4659-97A9-43CF591626FA}" dt="2024-10-27T21:33:49.898" v="420" actId="14100"/>
+          <ac:cxnSpMkLst>
+            <pc:docMk/>
+            <pc:sldMk cId="4210613587" sldId="257"/>
+            <ac:cxnSpMk id="25" creationId="{8A3B97BD-1924-C6E1-84C0-C33DA4C35FF2}"/>
+          </ac:cxnSpMkLst>
+        </pc:cxnChg>
+        <pc:cxnChg chg="mod">
+          <ac:chgData name="Tyler Place" userId="ea307159bb280439" providerId="LiveId" clId="{09E72B4C-2191-4659-97A9-43CF591626FA}" dt="2024-10-27T21:33:29.779" v="416" actId="14100"/>
+          <ac:cxnSpMkLst>
+            <pc:docMk/>
+            <pc:sldMk cId="4210613587" sldId="257"/>
+            <ac:cxnSpMk id="27" creationId="{24F9B259-E673-9874-8FB0-A9ABE023209B}"/>
+          </ac:cxnSpMkLst>
+        </pc:cxnChg>
+        <pc:cxnChg chg="mod">
+          <ac:chgData name="Tyler Place" userId="ea307159bb280439" providerId="LiveId" clId="{09E72B4C-2191-4659-97A9-43CF591626FA}" dt="2024-10-27T21:33:26.825" v="414" actId="14100"/>
+          <ac:cxnSpMkLst>
+            <pc:docMk/>
+            <pc:sldMk cId="4210613587" sldId="257"/>
+            <ac:cxnSpMk id="29" creationId="{F21C2797-DA5D-7146-AD52-108E5AFE646A}"/>
+          </ac:cxnSpMkLst>
+        </pc:cxnChg>
+        <pc:cxnChg chg="mod">
+          <ac:chgData name="Tyler Place" userId="ea307159bb280439" providerId="LiveId" clId="{09E72B4C-2191-4659-97A9-43CF591626FA}" dt="2024-10-27T21:33:19.841" v="411" actId="14100"/>
+          <ac:cxnSpMkLst>
+            <pc:docMk/>
+            <pc:sldMk cId="4210613587" sldId="257"/>
+            <ac:cxnSpMk id="31" creationId="{8BDF00CB-E64D-9BB6-3773-2F0460836E6F}"/>
+          </ac:cxnSpMkLst>
+        </pc:cxnChg>
+        <pc:cxnChg chg="mod">
+          <ac:chgData name="Tyler Place" userId="ea307159bb280439" providerId="LiveId" clId="{09E72B4C-2191-4659-97A9-43CF591626FA}" dt="2024-10-27T21:33:23.888" v="413" actId="14100"/>
+          <ac:cxnSpMkLst>
+            <pc:docMk/>
+            <pc:sldMk cId="4210613587" sldId="257"/>
+            <ac:cxnSpMk id="33" creationId="{C470E4D4-663E-C2D9-0A69-1FC661B97DA9}"/>
+          </ac:cxnSpMkLst>
+        </pc:cxnChg>
+      </pc:sldChg>
+      <pc:sldChg chg="modSp mod">
+        <pc:chgData name="Tyler Place" userId="ea307159bb280439" providerId="LiveId" clId="{09E72B4C-2191-4659-97A9-43CF591626FA}" dt="2024-10-27T21:58:40.003" v="484" actId="14100"/>
+        <pc:sldMkLst>
+          <pc:docMk/>
+          <pc:sldMk cId="2059681518" sldId="258"/>
+        </pc:sldMkLst>
+        <pc:cxnChg chg="mod">
+          <ac:chgData name="Tyler Place" userId="ea307159bb280439" providerId="LiveId" clId="{09E72B4C-2191-4659-97A9-43CF591626FA}" dt="2024-10-27T21:55:49.827" v="476" actId="14100"/>
+          <ac:cxnSpMkLst>
+            <pc:docMk/>
+            <pc:sldMk cId="2059681518" sldId="258"/>
+            <ac:cxnSpMk id="20" creationId="{6773BAFF-677F-8FA1-E4F1-BDE9443FB9EE}"/>
+          </ac:cxnSpMkLst>
+        </pc:cxnChg>
+        <pc:cxnChg chg="mod">
+          <ac:chgData name="Tyler Place" userId="ea307159bb280439" providerId="LiveId" clId="{09E72B4C-2191-4659-97A9-43CF591626FA}" dt="2024-10-27T21:31:47.547" v="390" actId="14100"/>
+          <ac:cxnSpMkLst>
+            <pc:docMk/>
+            <pc:sldMk cId="2059681518" sldId="258"/>
+            <ac:cxnSpMk id="22" creationId="{9F875B2E-E19A-9A5F-AE17-373EC8FFD782}"/>
+          </ac:cxnSpMkLst>
+        </pc:cxnChg>
+        <pc:cxnChg chg="mod">
+          <ac:chgData name="Tyler Place" userId="ea307159bb280439" providerId="LiveId" clId="{09E72B4C-2191-4659-97A9-43CF591626FA}" dt="2024-10-27T21:31:11.599" v="384" actId="14100"/>
+          <ac:cxnSpMkLst>
+            <pc:docMk/>
+            <pc:sldMk cId="2059681518" sldId="258"/>
+            <ac:cxnSpMk id="25" creationId="{8A3B97BD-1924-C6E1-84C0-C33DA4C35FF2}"/>
+          </ac:cxnSpMkLst>
+        </pc:cxnChg>
+        <pc:cxnChg chg="mod">
+          <ac:chgData name="Tyler Place" userId="ea307159bb280439" providerId="LiveId" clId="{09E72B4C-2191-4659-97A9-43CF591626FA}" dt="2024-10-27T21:58:37.558" v="483" actId="14100"/>
+          <ac:cxnSpMkLst>
+            <pc:docMk/>
+            <pc:sldMk cId="2059681518" sldId="258"/>
+            <ac:cxnSpMk id="27" creationId="{24F9B259-E673-9874-8FB0-A9ABE023209B}"/>
+          </ac:cxnSpMkLst>
+        </pc:cxnChg>
+        <pc:cxnChg chg="mod">
+          <ac:chgData name="Tyler Place" userId="ea307159bb280439" providerId="LiveId" clId="{09E72B4C-2191-4659-97A9-43CF591626FA}" dt="2024-10-27T21:58:40.003" v="484" actId="14100"/>
+          <ac:cxnSpMkLst>
+            <pc:docMk/>
+            <pc:sldMk cId="2059681518" sldId="258"/>
+            <ac:cxnSpMk id="29" creationId="{F21C2797-DA5D-7146-AD52-108E5AFE646A}"/>
+          </ac:cxnSpMkLst>
+        </pc:cxnChg>
+        <pc:cxnChg chg="mod">
+          <ac:chgData name="Tyler Place" userId="ea307159bb280439" providerId="LiveId" clId="{09E72B4C-2191-4659-97A9-43CF591626FA}" dt="2024-10-27T21:31:18.028" v="386" actId="14100"/>
+          <ac:cxnSpMkLst>
+            <pc:docMk/>
+            <pc:sldMk cId="2059681518" sldId="258"/>
+            <ac:cxnSpMk id="31" creationId="{8BDF00CB-E64D-9BB6-3773-2F0460836E6F}"/>
+          </ac:cxnSpMkLst>
+        </pc:cxnChg>
+        <pc:cxnChg chg="mod">
+          <ac:chgData name="Tyler Place" userId="ea307159bb280439" providerId="LiveId" clId="{09E72B4C-2191-4659-97A9-43CF591626FA}" dt="2024-10-27T21:55:47.827" v="475" actId="14100"/>
+          <ac:cxnSpMkLst>
+            <pc:docMk/>
+            <pc:sldMk cId="2059681518" sldId="258"/>
+            <ac:cxnSpMk id="33" creationId="{C470E4D4-663E-C2D9-0A69-1FC661B97DA9}"/>
+          </ac:cxnSpMkLst>
+        </pc:cxnChg>
+      </pc:sldChg>
+      <pc:sldChg chg="modSp mod">
+        <pc:chgData name="Tyler Place" userId="ea307159bb280439" providerId="LiveId" clId="{09E72B4C-2191-4659-97A9-43CF591626FA}" dt="2024-10-27T21:32:51.316" v="406" actId="14100"/>
+        <pc:sldMkLst>
+          <pc:docMk/>
+          <pc:sldMk cId="3928716435" sldId="259"/>
+        </pc:sldMkLst>
+        <pc:cxnChg chg="mod">
+          <ac:chgData name="Tyler Place" userId="ea307159bb280439" providerId="LiveId" clId="{09E72B4C-2191-4659-97A9-43CF591626FA}" dt="2024-10-27T21:32:16.171" v="394" actId="14100"/>
+          <ac:cxnSpMkLst>
+            <pc:docMk/>
+            <pc:sldMk cId="3928716435" sldId="259"/>
+            <ac:cxnSpMk id="20" creationId="{6773BAFF-677F-8FA1-E4F1-BDE9443FB9EE}"/>
+          </ac:cxnSpMkLst>
+        </pc:cxnChg>
+        <pc:cxnChg chg="mod">
+          <ac:chgData name="Tyler Place" userId="ea307159bb280439" providerId="LiveId" clId="{09E72B4C-2191-4659-97A9-43CF591626FA}" dt="2024-10-27T21:32:13.967" v="393" actId="14100"/>
+          <ac:cxnSpMkLst>
+            <pc:docMk/>
+            <pc:sldMk cId="3928716435" sldId="259"/>
+            <ac:cxnSpMk id="22" creationId="{9F875B2E-E19A-9A5F-AE17-373EC8FFD782}"/>
+          </ac:cxnSpMkLst>
+        </pc:cxnChg>
+        <pc:cxnChg chg="mod">
+          <ac:chgData name="Tyler Place" userId="ea307159bb280439" providerId="LiveId" clId="{09E72B4C-2191-4659-97A9-43CF591626FA}" dt="2024-10-27T21:32:24.155" v="396" actId="14100"/>
+          <ac:cxnSpMkLst>
+            <pc:docMk/>
+            <pc:sldMk cId="3928716435" sldId="259"/>
+            <ac:cxnSpMk id="25" creationId="{8A3B97BD-1924-C6E1-84C0-C33DA4C35FF2}"/>
+          </ac:cxnSpMkLst>
+        </pc:cxnChg>
+        <pc:cxnChg chg="mod">
+          <ac:chgData name="Tyler Place" userId="ea307159bb280439" providerId="LiveId" clId="{09E72B4C-2191-4659-97A9-43CF591626FA}" dt="2024-10-27T21:32:49.368" v="405" actId="14100"/>
+          <ac:cxnSpMkLst>
+            <pc:docMk/>
+            <pc:sldMk cId="3928716435" sldId="259"/>
+            <ac:cxnSpMk id="27" creationId="{24F9B259-E673-9874-8FB0-A9ABE023209B}"/>
+          </ac:cxnSpMkLst>
+        </pc:cxnChg>
+        <pc:cxnChg chg="mod">
+          <ac:chgData name="Tyler Place" userId="ea307159bb280439" providerId="LiveId" clId="{09E72B4C-2191-4659-97A9-43CF591626FA}" dt="2024-10-27T21:32:51.316" v="406" actId="14100"/>
+          <ac:cxnSpMkLst>
+            <pc:docMk/>
+            <pc:sldMk cId="3928716435" sldId="259"/>
+            <ac:cxnSpMk id="29" creationId="{F21C2797-DA5D-7146-AD52-108E5AFE646A}"/>
+          </ac:cxnSpMkLst>
+        </pc:cxnChg>
+        <pc:cxnChg chg="mod">
+          <ac:chgData name="Tyler Place" userId="ea307159bb280439" providerId="LiveId" clId="{09E72B4C-2191-4659-97A9-43CF591626FA}" dt="2024-10-27T21:32:43.641" v="403" actId="14100"/>
+          <ac:cxnSpMkLst>
+            <pc:docMk/>
+            <pc:sldMk cId="3928716435" sldId="259"/>
+            <ac:cxnSpMk id="31" creationId="{8BDF00CB-E64D-9BB6-3773-2F0460836E6F}"/>
+          </ac:cxnSpMkLst>
+        </pc:cxnChg>
+        <pc:cxnChg chg="mod">
+          <ac:chgData name="Tyler Place" userId="ea307159bb280439" providerId="LiveId" clId="{09E72B4C-2191-4659-97A9-43CF591626FA}" dt="2024-10-27T21:32:39.120" v="401" actId="14100"/>
+          <ac:cxnSpMkLst>
+            <pc:docMk/>
+            <pc:sldMk cId="3928716435" sldId="259"/>
+            <ac:cxnSpMk id="33" creationId="{C470E4D4-663E-C2D9-0A69-1FC661B97DA9}"/>
+          </ac:cxnSpMkLst>
+        </pc:cxnChg>
+      </pc:sldChg>
+      <pc:sldChg chg="modSp mod">
+        <pc:chgData name="Tyler Place" userId="ea307159bb280439" providerId="LiveId" clId="{09E72B4C-2191-4659-97A9-43CF591626FA}" dt="2024-10-27T22:03:34.733" v="486" actId="14100"/>
+        <pc:sldMkLst>
+          <pc:docMk/>
+          <pc:sldMk cId="1958241090" sldId="260"/>
+        </pc:sldMkLst>
+        <pc:cxnChg chg="mod">
+          <ac:chgData name="Tyler Place" userId="ea307159bb280439" providerId="LiveId" clId="{09E72B4C-2191-4659-97A9-43CF591626FA}" dt="2024-10-27T21:41:47.327" v="441" actId="14100"/>
+          <ac:cxnSpMkLst>
+            <pc:docMk/>
+            <pc:sldMk cId="1958241090" sldId="260"/>
+            <ac:cxnSpMk id="20" creationId="{6773BAFF-677F-8FA1-E4F1-BDE9443FB9EE}"/>
+          </ac:cxnSpMkLst>
+        </pc:cxnChg>
+        <pc:cxnChg chg="mod">
+          <ac:chgData name="Tyler Place" userId="ea307159bb280439" providerId="LiveId" clId="{09E72B4C-2191-4659-97A9-43CF591626FA}" dt="2024-10-27T21:41:18.435" v="437" actId="14100"/>
+          <ac:cxnSpMkLst>
+            <pc:docMk/>
+            <pc:sldMk cId="1958241090" sldId="260"/>
+            <ac:cxnSpMk id="22" creationId="{9F875B2E-E19A-9A5F-AE17-373EC8FFD782}"/>
+          </ac:cxnSpMkLst>
+        </pc:cxnChg>
+        <pc:cxnChg chg="mod">
+          <ac:chgData name="Tyler Place" userId="ea307159bb280439" providerId="LiveId" clId="{09E72B4C-2191-4659-97A9-43CF591626FA}" dt="2024-10-27T21:41:33.611" v="439" actId="14100"/>
+          <ac:cxnSpMkLst>
+            <pc:docMk/>
+            <pc:sldMk cId="1958241090" sldId="260"/>
+            <ac:cxnSpMk id="25" creationId="{8A3B97BD-1924-C6E1-84C0-C33DA4C35FF2}"/>
+          </ac:cxnSpMkLst>
+        </pc:cxnChg>
+        <pc:cxnChg chg="mod">
+          <ac:chgData name="Tyler Place" userId="ea307159bb280439" providerId="LiveId" clId="{09E72B4C-2191-4659-97A9-43CF591626FA}" dt="2024-10-27T21:41:32.003" v="438" actId="14100"/>
+          <ac:cxnSpMkLst>
+            <pc:docMk/>
+            <pc:sldMk cId="1958241090" sldId="260"/>
+            <ac:cxnSpMk id="27" creationId="{24F9B259-E673-9874-8FB0-A9ABE023209B}"/>
+          </ac:cxnSpMkLst>
+        </pc:cxnChg>
+        <pc:cxnChg chg="mod">
+          <ac:chgData name="Tyler Place" userId="ea307159bb280439" providerId="LiveId" clId="{09E72B4C-2191-4659-97A9-43CF591626FA}" dt="2024-10-27T22:03:32.883" v="485" actId="14100"/>
+          <ac:cxnSpMkLst>
+            <pc:docMk/>
+            <pc:sldMk cId="1958241090" sldId="260"/>
+            <ac:cxnSpMk id="29" creationId="{F21C2797-DA5D-7146-AD52-108E5AFE646A}"/>
+          </ac:cxnSpMkLst>
+        </pc:cxnChg>
+        <pc:cxnChg chg="mod">
+          <ac:chgData name="Tyler Place" userId="ea307159bb280439" providerId="LiveId" clId="{09E72B4C-2191-4659-97A9-43CF591626FA}" dt="2024-10-27T22:03:34.733" v="486" actId="14100"/>
+          <ac:cxnSpMkLst>
+            <pc:docMk/>
+            <pc:sldMk cId="1958241090" sldId="260"/>
+            <ac:cxnSpMk id="31" creationId="{8BDF00CB-E64D-9BB6-3773-2F0460836E6F}"/>
+          </ac:cxnSpMkLst>
+        </pc:cxnChg>
+        <pc:cxnChg chg="mod">
+          <ac:chgData name="Tyler Place" userId="ea307159bb280439" providerId="LiveId" clId="{09E72B4C-2191-4659-97A9-43CF591626FA}" dt="2024-10-27T21:41:45.450" v="440" actId="14100"/>
+          <ac:cxnSpMkLst>
+            <pc:docMk/>
+            <pc:sldMk cId="1958241090" sldId="260"/>
+            <ac:cxnSpMk id="33" creationId="{C470E4D4-663E-C2D9-0A69-1FC661B97DA9}"/>
+          </ac:cxnSpMkLst>
+        </pc:cxnChg>
+      </pc:sldChg>
+      <pc:sldChg chg="modSp mod">
+        <pc:chgData name="Tyler Place" userId="ea307159bb280439" providerId="LiveId" clId="{09E72B4C-2191-4659-97A9-43CF591626FA}" dt="2024-10-27T22:07:01.517" v="494" actId="14100"/>
+        <pc:sldMkLst>
+          <pc:docMk/>
+          <pc:sldMk cId="1206378955" sldId="261"/>
+        </pc:sldMkLst>
+        <pc:cxnChg chg="mod">
+          <ac:chgData name="Tyler Place" userId="ea307159bb280439" providerId="LiveId" clId="{09E72B4C-2191-4659-97A9-43CF591626FA}" dt="2024-10-27T22:07:01.517" v="494" actId="14100"/>
+          <ac:cxnSpMkLst>
+            <pc:docMk/>
+            <pc:sldMk cId="1206378955" sldId="261"/>
+            <ac:cxnSpMk id="20" creationId="{6773BAFF-677F-8FA1-E4F1-BDE9443FB9EE}"/>
+          </ac:cxnSpMkLst>
+        </pc:cxnChg>
+        <pc:cxnChg chg="mod">
+          <ac:chgData name="Tyler Place" userId="ea307159bb280439" providerId="LiveId" clId="{09E72B4C-2191-4659-97A9-43CF591626FA}" dt="2024-10-27T22:06:43.013" v="487" actId="14100"/>
+          <ac:cxnSpMkLst>
+            <pc:docMk/>
+            <pc:sldMk cId="1206378955" sldId="261"/>
+            <ac:cxnSpMk id="22" creationId="{9F875B2E-E19A-9A5F-AE17-373EC8FFD782}"/>
+          </ac:cxnSpMkLst>
+        </pc:cxnChg>
+        <pc:cxnChg chg="mod">
+          <ac:chgData name="Tyler Place" userId="ea307159bb280439" providerId="LiveId" clId="{09E72B4C-2191-4659-97A9-43CF591626FA}" dt="2024-10-27T22:06:44.911" v="488" actId="14100"/>
+          <ac:cxnSpMkLst>
+            <pc:docMk/>
+            <pc:sldMk cId="1206378955" sldId="261"/>
+            <ac:cxnSpMk id="25" creationId="{8A3B97BD-1924-C6E1-84C0-C33DA4C35FF2}"/>
+          </ac:cxnSpMkLst>
+        </pc:cxnChg>
+        <pc:cxnChg chg="mod">
+          <ac:chgData name="Tyler Place" userId="ea307159bb280439" providerId="LiveId" clId="{09E72B4C-2191-4659-97A9-43CF591626FA}" dt="2024-10-27T22:06:49.635" v="490" actId="14100"/>
+          <ac:cxnSpMkLst>
+            <pc:docMk/>
+            <pc:sldMk cId="1206378955" sldId="261"/>
+            <ac:cxnSpMk id="27" creationId="{24F9B259-E673-9874-8FB0-A9ABE023209B}"/>
+          </ac:cxnSpMkLst>
+        </pc:cxnChg>
+        <pc:cxnChg chg="mod">
+          <ac:chgData name="Tyler Place" userId="ea307159bb280439" providerId="LiveId" clId="{09E72B4C-2191-4659-97A9-43CF591626FA}" dt="2024-10-27T22:06:47.638" v="489" actId="14100"/>
+          <ac:cxnSpMkLst>
+            <pc:docMk/>
+            <pc:sldMk cId="1206378955" sldId="261"/>
+            <ac:cxnSpMk id="28" creationId="{03109C14-06D7-0376-9EBA-46A81B08409E}"/>
+          </ac:cxnSpMkLst>
+        </pc:cxnChg>
+        <pc:cxnChg chg="mod">
+          <ac:chgData name="Tyler Place" userId="ea307159bb280439" providerId="LiveId" clId="{09E72B4C-2191-4659-97A9-43CF591626FA}" dt="2024-10-27T22:06:55.143" v="491" actId="14100"/>
+          <ac:cxnSpMkLst>
+            <pc:docMk/>
+            <pc:sldMk cId="1206378955" sldId="261"/>
+            <ac:cxnSpMk id="29" creationId="{F21C2797-DA5D-7146-AD52-108E5AFE646A}"/>
+          </ac:cxnSpMkLst>
+        </pc:cxnChg>
+        <pc:cxnChg chg="mod">
+          <ac:chgData name="Tyler Place" userId="ea307159bb280439" providerId="LiveId" clId="{09E72B4C-2191-4659-97A9-43CF591626FA}" dt="2024-10-27T22:06:57.080" v="492" actId="14100"/>
+          <ac:cxnSpMkLst>
+            <pc:docMk/>
+            <pc:sldMk cId="1206378955" sldId="261"/>
+            <ac:cxnSpMk id="31" creationId="{8BDF00CB-E64D-9BB6-3773-2F0460836E6F}"/>
+          </ac:cxnSpMkLst>
+        </pc:cxnChg>
+        <pc:cxnChg chg="mod">
+          <ac:chgData name="Tyler Place" userId="ea307159bb280439" providerId="LiveId" clId="{09E72B4C-2191-4659-97A9-43CF591626FA}" dt="2024-10-27T22:06:59.702" v="493" actId="14100"/>
+          <ac:cxnSpMkLst>
+            <pc:docMk/>
+            <pc:sldMk cId="1206378955" sldId="261"/>
+            <ac:cxnSpMk id="33" creationId="{C470E4D4-663E-C2D9-0A69-1FC661B97DA9}"/>
+          </ac:cxnSpMkLst>
+        </pc:cxnChg>
+      </pc:sldChg>
+      <pc:sldChg chg="modSp new mod">
+        <pc:chgData name="Tyler Place" userId="ea307159bb280439" providerId="LiveId" clId="{09E72B4C-2191-4659-97A9-43CF591626FA}" dt="2024-05-30T04:07:28.200" v="5" actId="20577"/>
+        <pc:sldMkLst>
+          <pc:docMk/>
+          <pc:sldMk cId="3587196432" sldId="262"/>
+        </pc:sldMkLst>
+        <pc:spChg chg="mod">
+          <ac:chgData name="Tyler Place" userId="ea307159bb280439" providerId="LiveId" clId="{09E72B4C-2191-4659-97A9-43CF591626FA}" dt="2024-05-30T04:07:28.200" v="5" actId="20577"/>
+          <ac:spMkLst>
+            <pc:docMk/>
+            <pc:sldMk cId="3587196432" sldId="262"/>
+            <ac:spMk id="2" creationId="{FB479BB9-98BA-F181-D335-9D9490540DFF}"/>
+          </ac:spMkLst>
+        </pc:spChg>
+      </pc:sldChg>
+      <pc:sldChg chg="addSp delSp modSp new mod">
+        <pc:chgData name="Tyler Place" userId="ea307159bb280439" providerId="LiveId" clId="{09E72B4C-2191-4659-97A9-43CF591626FA}" dt="2024-10-27T21:29:05.730" v="355" actId="14100"/>
+        <pc:sldMkLst>
+          <pc:docMk/>
+          <pc:sldMk cId="3941456667" sldId="263"/>
+        </pc:sldMkLst>
+        <pc:spChg chg="mod">
+          <ac:chgData name="Tyler Place" userId="ea307159bb280439" providerId="LiveId" clId="{09E72B4C-2191-4659-97A9-43CF591626FA}" dt="2024-05-30T04:48:44.989" v="166" actId="404"/>
+          <ac:spMkLst>
+            <pc:docMk/>
+            <pc:sldMk cId="3941456667" sldId="263"/>
+            <ac:spMk id="2" creationId="{78E3A12E-67E9-7B6E-6E67-64645EE8AA0A}"/>
+          </ac:spMkLst>
+        </pc:spChg>
+        <pc:spChg chg="add del">
+          <ac:chgData name="Tyler Place" userId="ea307159bb280439" providerId="LiveId" clId="{09E72B4C-2191-4659-97A9-43CF591626FA}" dt="2024-05-30T04:09:21.736" v="11" actId="478"/>
+          <ac:spMkLst>
+            <pc:docMk/>
+            <pc:sldMk cId="3941456667" sldId="263"/>
+            <ac:spMk id="3" creationId="{463345A4-D1B2-558E-BE72-E97481417C8A}"/>
+          </ac:spMkLst>
+        </pc:spChg>
+        <pc:picChg chg="add del mod">
+          <ac:chgData name="Tyler Place" userId="ea307159bb280439" providerId="LiveId" clId="{09E72B4C-2191-4659-97A9-43CF591626FA}" dt="2024-05-30T04:19:28.769" v="85" actId="14100"/>
+          <ac:picMkLst>
+            <pc:docMk/>
+            <pc:sldMk cId="3941456667" sldId="263"/>
+            <ac:picMk id="5" creationId="{482151EE-733A-DC5F-EF0F-B4F7976E8966}"/>
+          </ac:picMkLst>
+        </pc:picChg>
+        <pc:cxnChg chg="add del">
+          <ac:chgData name="Tyler Place" userId="ea307159bb280439" providerId="LiveId" clId="{09E72B4C-2191-4659-97A9-43CF591626FA}" dt="2024-05-30T04:10:55.122" v="37" actId="11529"/>
+          <ac:cxnSpMkLst>
+            <pc:docMk/>
+            <pc:sldMk cId="3941456667" sldId="263"/>
+            <ac:cxnSpMk id="7" creationId="{ED4EE6D3-530D-9ED3-83CD-3DC2CAF64FBB}"/>
+          </ac:cxnSpMkLst>
+        </pc:cxnChg>
+        <pc:cxnChg chg="add mod">
+          <ac:chgData name="Tyler Place" userId="ea307159bb280439" providerId="LiveId" clId="{09E72B4C-2191-4659-97A9-43CF591626FA}" dt="2024-10-27T21:28:35.644" v="345" actId="14100"/>
+          <ac:cxnSpMkLst>
+            <pc:docMk/>
+            <pc:sldMk cId="3941456667" sldId="263"/>
+            <ac:cxnSpMk id="9" creationId="{6DC65E9D-6E4E-4982-B830-4CEA68316194}"/>
+          </ac:cxnSpMkLst>
+        </pc:cxnChg>
+        <pc:cxnChg chg="add mod">
+          <ac:chgData name="Tyler Place" userId="ea307159bb280439" providerId="LiveId" clId="{09E72B4C-2191-4659-97A9-43CF591626FA}" dt="2024-10-27T21:28:37.719" v="346" actId="14100"/>
+          <ac:cxnSpMkLst>
+            <pc:docMk/>
+            <pc:sldMk cId="3941456667" sldId="263"/>
+            <ac:cxnSpMk id="11" creationId="{F38BEC55-8E77-818A-E49C-F7E8420EBB7B}"/>
+          </ac:cxnSpMkLst>
+        </pc:cxnChg>
+        <pc:cxnChg chg="add mod">
+          <ac:chgData name="Tyler Place" userId="ea307159bb280439" providerId="LiveId" clId="{09E72B4C-2191-4659-97A9-43CF591626FA}" dt="2024-10-27T21:28:50.525" v="350" actId="14100"/>
+          <ac:cxnSpMkLst>
+            <pc:docMk/>
+            <pc:sldMk cId="3941456667" sldId="263"/>
+            <ac:cxnSpMk id="13" creationId="{2D79115C-B29B-E661-B047-9AFE9EE44AB7}"/>
+          </ac:cxnSpMkLst>
+        </pc:cxnChg>
+        <pc:cxnChg chg="add mod">
+          <ac:chgData name="Tyler Place" userId="ea307159bb280439" providerId="LiveId" clId="{09E72B4C-2191-4659-97A9-43CF591626FA}" dt="2024-10-27T21:29:03.737" v="354" actId="14100"/>
+          <ac:cxnSpMkLst>
+            <pc:docMk/>
+            <pc:sldMk cId="3941456667" sldId="263"/>
+            <ac:cxnSpMk id="21" creationId="{9ECAE667-05EC-D218-F92D-031D1CC71844}"/>
+          </ac:cxnSpMkLst>
+        </pc:cxnChg>
+        <pc:cxnChg chg="add mod">
+          <ac:chgData name="Tyler Place" userId="ea307159bb280439" providerId="LiveId" clId="{09E72B4C-2191-4659-97A9-43CF591626FA}" dt="2024-10-27T21:29:05.730" v="355" actId="14100"/>
+          <ac:cxnSpMkLst>
+            <pc:docMk/>
+            <pc:sldMk cId="3941456667" sldId="263"/>
+            <ac:cxnSpMk id="23" creationId="{E530229F-89CE-FE75-CA19-B7E654087376}"/>
+          </ac:cxnSpMkLst>
+        </pc:cxnChg>
+        <pc:cxnChg chg="add mod">
+          <ac:chgData name="Tyler Place" userId="ea307159bb280439" providerId="LiveId" clId="{09E72B4C-2191-4659-97A9-43CF591626FA}" dt="2024-05-30T04:15:59.676" v="83" actId="14100"/>
+          <ac:cxnSpMkLst>
+            <pc:docMk/>
+            <pc:sldMk cId="3941456667" sldId="263"/>
+            <ac:cxnSpMk id="25" creationId="{15298556-20C9-DE82-AD3D-2640DEF38799}"/>
+          </ac:cxnSpMkLst>
+        </pc:cxnChg>
+        <pc:cxnChg chg="add mod">
+          <ac:chgData name="Tyler Place" userId="ea307159bb280439" providerId="LiveId" clId="{09E72B4C-2191-4659-97A9-43CF591626FA}" dt="2024-05-30T04:15:30.118" v="71" actId="14100"/>
+          <ac:cxnSpMkLst>
+            <pc:docMk/>
+            <pc:sldMk cId="3941456667" sldId="263"/>
+            <ac:cxnSpMk id="27" creationId="{3DA3FC97-A09F-0D76-E7DF-CA0E4A514D0E}"/>
+          </ac:cxnSpMkLst>
+        </pc:cxnChg>
+        <pc:cxnChg chg="add mod">
+          <ac:chgData name="Tyler Place" userId="ea307159bb280439" providerId="LiveId" clId="{09E72B4C-2191-4659-97A9-43CF591626FA}" dt="2024-05-30T04:15:24.123" v="69" actId="14100"/>
+          <ac:cxnSpMkLst>
+            <pc:docMk/>
+            <pc:sldMk cId="3941456667" sldId="263"/>
+            <ac:cxnSpMk id="29" creationId="{60F19470-C38F-16CC-A72B-C1CA3DCC0C16}"/>
+          </ac:cxnSpMkLst>
+        </pc:cxnChg>
+        <pc:cxnChg chg="add mod">
+          <ac:chgData name="Tyler Place" userId="ea307159bb280439" providerId="LiveId" clId="{09E72B4C-2191-4659-97A9-43CF591626FA}" dt="2024-10-27T21:28:47.449" v="349" actId="14100"/>
+          <ac:cxnSpMkLst>
+            <pc:docMk/>
+            <pc:sldMk cId="3941456667" sldId="263"/>
+            <ac:cxnSpMk id="31" creationId="{C85AAB79-D294-47D3-6E02-04CA7C85ADF4}"/>
+          </ac:cxnSpMkLst>
+        </pc:cxnChg>
+        <pc:cxnChg chg="add mod">
+          <ac:chgData name="Tyler Place" userId="ea307159bb280439" providerId="LiveId" clId="{09E72B4C-2191-4659-97A9-43CF591626FA}" dt="2024-10-27T21:28:45.821" v="348" actId="14100"/>
+          <ac:cxnSpMkLst>
+            <pc:docMk/>
+            <pc:sldMk cId="3941456667" sldId="263"/>
+            <ac:cxnSpMk id="33" creationId="{9DEC60CB-6830-F13C-6243-D560580965E6}"/>
+          </ac:cxnSpMkLst>
+        </pc:cxnChg>
+        <pc:cxnChg chg="add mod">
+          <ac:chgData name="Tyler Place" userId="ea307159bb280439" providerId="LiveId" clId="{09E72B4C-2191-4659-97A9-43CF591626FA}" dt="2024-10-27T21:28:42.297" v="347" actId="14100"/>
+          <ac:cxnSpMkLst>
+            <pc:docMk/>
+            <pc:sldMk cId="3941456667" sldId="263"/>
+            <ac:cxnSpMk id="35" creationId="{19E10E76-5328-5659-9998-EC565662200B}"/>
+          </ac:cxnSpMkLst>
+        </pc:cxnChg>
+      </pc:sldChg>
+      <pc:sldChg chg="modSp add mod">
+        <pc:chgData name="Tyler Place" userId="ea307159bb280439" providerId="LiveId" clId="{09E72B4C-2191-4659-97A9-43CF591626FA}" dt="2024-10-27T21:29:28.296" v="363" actId="14100"/>
+        <pc:sldMkLst>
+          <pc:docMk/>
+          <pc:sldMk cId="2517153691" sldId="264"/>
+        </pc:sldMkLst>
+        <pc:spChg chg="mod">
+          <ac:chgData name="Tyler Place" userId="ea307159bb280439" providerId="LiveId" clId="{09E72B4C-2191-4659-97A9-43CF591626FA}" dt="2024-05-30T04:48:52.996" v="168" actId="255"/>
+          <ac:spMkLst>
+            <pc:docMk/>
+            <pc:sldMk cId="2517153691" sldId="264"/>
+            <ac:spMk id="2" creationId="{78E3A12E-67E9-7B6E-6E67-64645EE8AA0A}"/>
+          </ac:spMkLst>
+        </pc:spChg>
+        <pc:cxnChg chg="mod">
+          <ac:chgData name="Tyler Place" userId="ea307159bb280439" providerId="LiveId" clId="{09E72B4C-2191-4659-97A9-43CF591626FA}" dt="2024-10-27T21:29:18.359" v="358" actId="14100"/>
+          <ac:cxnSpMkLst>
+            <pc:docMk/>
+            <pc:sldMk cId="2517153691" sldId="264"/>
+            <ac:cxnSpMk id="9" creationId="{6DC65E9D-6E4E-4982-B830-4CEA68316194}"/>
+          </ac:cxnSpMkLst>
+        </pc:cxnChg>
+        <pc:cxnChg chg="mod">
+          <ac:chgData name="Tyler Place" userId="ea307159bb280439" providerId="LiveId" clId="{09E72B4C-2191-4659-97A9-43CF591626FA}" dt="2024-10-27T21:29:20.118" v="359" actId="14100"/>
+          <ac:cxnSpMkLst>
+            <pc:docMk/>
+            <pc:sldMk cId="2517153691" sldId="264"/>
+            <ac:cxnSpMk id="11" creationId="{F38BEC55-8E77-818A-E49C-F7E8420EBB7B}"/>
+          </ac:cxnSpMkLst>
+        </pc:cxnChg>
+        <pc:cxnChg chg="mod">
+          <ac:chgData name="Tyler Place" userId="ea307159bb280439" providerId="LiveId" clId="{09E72B4C-2191-4659-97A9-43CF591626FA}" dt="2024-10-27T21:29:26.363" v="362" actId="14100"/>
+          <ac:cxnSpMkLst>
+            <pc:docMk/>
+            <pc:sldMk cId="2517153691" sldId="264"/>
+            <ac:cxnSpMk id="13" creationId="{2D79115C-B29B-E661-B047-9AFE9EE44AB7}"/>
+          </ac:cxnSpMkLst>
+        </pc:cxnChg>
+        <pc:cxnChg chg="mod">
+          <ac:chgData name="Tyler Place" userId="ea307159bb280439" providerId="LiveId" clId="{09E72B4C-2191-4659-97A9-43CF591626FA}" dt="2024-10-27T21:29:28.296" v="363" actId="14100"/>
+          <ac:cxnSpMkLst>
+            <pc:docMk/>
+            <pc:sldMk cId="2517153691" sldId="264"/>
+            <ac:cxnSpMk id="21" creationId="{9ECAE667-05EC-D218-F92D-031D1CC71844}"/>
+          </ac:cxnSpMkLst>
+        </pc:cxnChg>
+        <pc:cxnChg chg="mod">
+          <ac:chgData name="Tyler Place" userId="ea307159bb280439" providerId="LiveId" clId="{09E72B4C-2191-4659-97A9-43CF591626FA}" dt="2024-05-30T04:22:12.005" v="112" actId="14100"/>
+          <ac:cxnSpMkLst>
+            <pc:docMk/>
+            <pc:sldMk cId="2517153691" sldId="264"/>
+            <ac:cxnSpMk id="23" creationId="{E530229F-89CE-FE75-CA19-B7E654087376}"/>
+          </ac:cxnSpMkLst>
+        </pc:cxnChg>
+        <pc:cxnChg chg="mod">
+          <ac:chgData name="Tyler Place" userId="ea307159bb280439" providerId="LiveId" clId="{09E72B4C-2191-4659-97A9-43CF591626FA}" dt="2024-05-30T04:20:46.194" v="90" actId="14100"/>
+          <ac:cxnSpMkLst>
+            <pc:docMk/>
+            <pc:sldMk cId="2517153691" sldId="264"/>
+            <ac:cxnSpMk id="25" creationId="{15298556-20C9-DE82-AD3D-2640DEF38799}"/>
+          </ac:cxnSpMkLst>
+        </pc:cxnChg>
+        <pc:cxnChg chg="mod">
+          <ac:chgData name="Tyler Place" userId="ea307159bb280439" providerId="LiveId" clId="{09E72B4C-2191-4659-97A9-43CF591626FA}" dt="2024-05-30T04:20:48.786" v="91" actId="14100"/>
+          <ac:cxnSpMkLst>
+            <pc:docMk/>
+            <pc:sldMk cId="2517153691" sldId="264"/>
+            <ac:cxnSpMk id="27" creationId="{3DA3FC97-A09F-0D76-E7DF-CA0E4A514D0E}"/>
+          </ac:cxnSpMkLst>
+        </pc:cxnChg>
+        <pc:cxnChg chg="mod">
+          <ac:chgData name="Tyler Place" userId="ea307159bb280439" providerId="LiveId" clId="{09E72B4C-2191-4659-97A9-43CF591626FA}" dt="2024-10-27T21:29:23.901" v="361" actId="14100"/>
+          <ac:cxnSpMkLst>
+            <pc:docMk/>
+            <pc:sldMk cId="2517153691" sldId="264"/>
+            <ac:cxnSpMk id="31" creationId="{C85AAB79-D294-47D3-6E02-04CA7C85ADF4}"/>
+          </ac:cxnSpMkLst>
+        </pc:cxnChg>
+        <pc:cxnChg chg="mod">
+          <ac:chgData name="Tyler Place" userId="ea307159bb280439" providerId="LiveId" clId="{09E72B4C-2191-4659-97A9-43CF591626FA}" dt="2024-10-27T21:29:22.327" v="360" actId="14100"/>
+          <ac:cxnSpMkLst>
+            <pc:docMk/>
+            <pc:sldMk cId="2517153691" sldId="264"/>
+            <ac:cxnSpMk id="33" creationId="{9DEC60CB-6830-F13C-6243-D560580965E6}"/>
+          </ac:cxnSpMkLst>
+        </pc:cxnChg>
+        <pc:cxnChg chg="mod">
+          <ac:chgData name="Tyler Place" userId="ea307159bb280439" providerId="LiveId" clId="{09E72B4C-2191-4659-97A9-43CF591626FA}" dt="2024-10-27T21:29:14.665" v="356" actId="14100"/>
+          <ac:cxnSpMkLst>
+            <pc:docMk/>
+            <pc:sldMk cId="2517153691" sldId="264"/>
+            <ac:cxnSpMk id="35" creationId="{19E10E76-5328-5659-9998-EC565662200B}"/>
+          </ac:cxnSpMkLst>
+        </pc:cxnChg>
+      </pc:sldChg>
+      <pc:sldChg chg="modSp add mod">
+        <pc:chgData name="Tyler Place" userId="ea307159bb280439" providerId="LiveId" clId="{09E72B4C-2191-4659-97A9-43CF591626FA}" dt="2024-10-27T21:30:40.461" v="376" actId="14100"/>
+        <pc:sldMkLst>
+          <pc:docMk/>
+          <pc:sldMk cId="1007413632" sldId="265"/>
+        </pc:sldMkLst>
+        <pc:spChg chg="mod">
+          <ac:chgData name="Tyler Place" userId="ea307159bb280439" providerId="LiveId" clId="{09E72B4C-2191-4659-97A9-43CF591626FA}" dt="2024-06-01T03:56:49.270" v="337" actId="20577"/>
+          <ac:spMkLst>
+            <pc:docMk/>
+            <pc:sldMk cId="1007413632" sldId="265"/>
+            <ac:spMk id="2" creationId="{78E3A12E-67E9-7B6E-6E67-64645EE8AA0A}"/>
+          </ac:spMkLst>
+        </pc:spChg>
+        <pc:cxnChg chg="mod">
+          <ac:chgData name="Tyler Place" userId="ea307159bb280439" providerId="LiveId" clId="{09E72B4C-2191-4659-97A9-43CF591626FA}" dt="2024-10-27T21:30:00.717" v="364" actId="14100"/>
+          <ac:cxnSpMkLst>
+            <pc:docMk/>
+            <pc:sldMk cId="1007413632" sldId="265"/>
+            <ac:cxnSpMk id="9" creationId="{6DC65E9D-6E4E-4982-B830-4CEA68316194}"/>
+          </ac:cxnSpMkLst>
+        </pc:cxnChg>
+        <pc:cxnChg chg="mod">
+          <ac:chgData name="Tyler Place" userId="ea307159bb280439" providerId="LiveId" clId="{09E72B4C-2191-4659-97A9-43CF591626FA}" dt="2024-10-27T21:30:02.364" v="365" actId="14100"/>
+          <ac:cxnSpMkLst>
+            <pc:docMk/>
+            <pc:sldMk cId="1007413632" sldId="265"/>
+            <ac:cxnSpMk id="11" creationId="{F38BEC55-8E77-818A-E49C-F7E8420EBB7B}"/>
+          </ac:cxnSpMkLst>
+        </pc:cxnChg>
+        <pc:cxnChg chg="mod">
+          <ac:chgData name="Tyler Place" userId="ea307159bb280439" providerId="LiveId" clId="{09E72B4C-2191-4659-97A9-43CF591626FA}" dt="2024-05-30T04:27:47.279" v="116" actId="14100"/>
+          <ac:cxnSpMkLst>
+            <pc:docMk/>
+            <pc:sldMk cId="1007413632" sldId="265"/>
+            <ac:cxnSpMk id="13" creationId="{2D79115C-B29B-E661-B047-9AFE9EE44AB7}"/>
+          </ac:cxnSpMkLst>
+        </pc:cxnChg>
+        <pc:cxnChg chg="mod">
+          <ac:chgData name="Tyler Place" userId="ea307159bb280439" providerId="LiveId" clId="{09E72B4C-2191-4659-97A9-43CF591626FA}" dt="2024-05-30T04:28:13.958" v="126" actId="14100"/>
+          <ac:cxnSpMkLst>
+            <pc:docMk/>
+            <pc:sldMk cId="1007413632" sldId="265"/>
+            <ac:cxnSpMk id="21" creationId="{9ECAE667-05EC-D218-F92D-031D1CC71844}"/>
+          </ac:cxnSpMkLst>
+        </pc:cxnChg>
+        <pc:cxnChg chg="mod">
+          <ac:chgData name="Tyler Place" userId="ea307159bb280439" providerId="LiveId" clId="{09E72B4C-2191-4659-97A9-43CF591626FA}" dt="2024-05-30T04:28:12.083" v="125" actId="14100"/>
+          <ac:cxnSpMkLst>
+            <pc:docMk/>
+            <pc:sldMk cId="1007413632" sldId="265"/>
+            <ac:cxnSpMk id="23" creationId="{E530229F-89CE-FE75-CA19-B7E654087376}"/>
+          </ac:cxnSpMkLst>
+        </pc:cxnChg>
+        <pc:cxnChg chg="mod">
+          <ac:chgData name="Tyler Place" userId="ea307159bb280439" providerId="LiveId" clId="{09E72B4C-2191-4659-97A9-43CF591626FA}" dt="2024-10-27T21:30:23.446" v="373" actId="14100"/>
+          <ac:cxnSpMkLst>
+            <pc:docMk/>
+            <pc:sldMk cId="1007413632" sldId="265"/>
+            <ac:cxnSpMk id="25" creationId="{15298556-20C9-DE82-AD3D-2640DEF38799}"/>
+          </ac:cxnSpMkLst>
+        </pc:cxnChg>
+        <pc:cxnChg chg="mod">
+          <ac:chgData name="Tyler Place" userId="ea307159bb280439" providerId="LiveId" clId="{09E72B4C-2191-4659-97A9-43CF591626FA}" dt="2024-10-27T21:30:40.461" v="376" actId="14100"/>
+          <ac:cxnSpMkLst>
+            <pc:docMk/>
+            <pc:sldMk cId="1007413632" sldId="265"/>
+            <ac:cxnSpMk id="27" creationId="{3DA3FC97-A09F-0D76-E7DF-CA0E4A514D0E}"/>
+          </ac:cxnSpMkLst>
+        </pc:cxnChg>
+        <pc:cxnChg chg="mod">
+          <ac:chgData name="Tyler Place" userId="ea307159bb280439" providerId="LiveId" clId="{09E72B4C-2191-4659-97A9-43CF591626FA}" dt="2024-10-27T21:30:13.838" v="370" actId="14100"/>
+          <ac:cxnSpMkLst>
+            <pc:docMk/>
+            <pc:sldMk cId="1007413632" sldId="265"/>
+            <ac:cxnSpMk id="29" creationId="{60F19470-C38F-16CC-A72B-C1CA3DCC0C16}"/>
+          </ac:cxnSpMkLst>
+        </pc:cxnChg>
+        <pc:cxnChg chg="mod">
+          <ac:chgData name="Tyler Place" userId="ea307159bb280439" providerId="LiveId" clId="{09E72B4C-2191-4659-97A9-43CF591626FA}" dt="2024-10-27T21:30:11.605" v="369" actId="14100"/>
+          <ac:cxnSpMkLst>
+            <pc:docMk/>
+            <pc:sldMk cId="1007413632" sldId="265"/>
+            <ac:cxnSpMk id="31" creationId="{C85AAB79-D294-47D3-6E02-04CA7C85ADF4}"/>
+          </ac:cxnSpMkLst>
+        </pc:cxnChg>
+        <pc:cxnChg chg="mod">
+          <ac:chgData name="Tyler Place" userId="ea307159bb280439" providerId="LiveId" clId="{09E72B4C-2191-4659-97A9-43CF591626FA}" dt="2024-10-27T21:30:07.034" v="367" actId="14100"/>
+          <ac:cxnSpMkLst>
+            <pc:docMk/>
+            <pc:sldMk cId="1007413632" sldId="265"/>
+            <ac:cxnSpMk id="33" creationId="{9DEC60CB-6830-F13C-6243-D560580965E6}"/>
+          </ac:cxnSpMkLst>
+        </pc:cxnChg>
+        <pc:cxnChg chg="mod">
+          <ac:chgData name="Tyler Place" userId="ea307159bb280439" providerId="LiveId" clId="{09E72B4C-2191-4659-97A9-43CF591626FA}" dt="2024-10-27T21:30:04.386" v="366" actId="14100"/>
+          <ac:cxnSpMkLst>
+            <pc:docMk/>
+            <pc:sldMk cId="1007413632" sldId="265"/>
+            <ac:cxnSpMk id="35" creationId="{19E10E76-5328-5659-9998-EC565662200B}"/>
+          </ac:cxnSpMkLst>
+        </pc:cxnChg>
+      </pc:sldChg>
+      <pc:sldChg chg="addSp delSp modSp new mod ord">
+        <pc:chgData name="Tyler Place" userId="ea307159bb280439" providerId="LiveId" clId="{09E72B4C-2191-4659-97A9-43CF591626FA}" dt="2024-06-01T04:25:10.951" v="344" actId="20577"/>
+        <pc:sldMkLst>
+          <pc:docMk/>
+          <pc:sldMk cId="624876100" sldId="266"/>
+        </pc:sldMkLst>
+        <pc:spChg chg="mod">
+          <ac:chgData name="Tyler Place" userId="ea307159bb280439" providerId="LiveId" clId="{09E72B4C-2191-4659-97A9-43CF591626FA}" dt="2024-06-01T04:14:05.685" v="340" actId="1076"/>
+          <ac:spMkLst>
+            <pc:docMk/>
+            <pc:sldMk cId="624876100" sldId="266"/>
+            <ac:spMk id="2" creationId="{54BDD459-3467-7DD4-729A-001B8B7F906E}"/>
+          </ac:spMkLst>
+        </pc:spChg>
+        <pc:spChg chg="del">
+          <ac:chgData name="Tyler Place" userId="ea307159bb280439" providerId="LiveId" clId="{09E72B4C-2191-4659-97A9-43CF591626FA}" dt="2024-06-01T03:53:36.946" v="189" actId="3680"/>
+          <ac:spMkLst>
+            <pc:docMk/>
+            <pc:sldMk cId="624876100" sldId="266"/>
+            <ac:spMk id="3" creationId="{68D179A7-CA91-25C6-E12F-E4E5A52257A1}"/>
+          </ac:spMkLst>
+        </pc:spChg>
+        <pc:graphicFrameChg chg="add mod ord modGraphic">
+          <ac:chgData name="Tyler Place" userId="ea307159bb280439" providerId="LiveId" clId="{09E72B4C-2191-4659-97A9-43CF591626FA}" dt="2024-06-01T04:25:10.951" v="344" actId="20577"/>
+          <ac:graphicFrameMkLst>
+            <pc:docMk/>
+            <pc:sldMk cId="624876100" sldId="266"/>
+            <ac:graphicFrameMk id="4" creationId="{9EFB89CA-303C-55AC-74A7-EF5C57FBB44D}"/>
+          </ac:graphicFrameMkLst>
+        </pc:graphicFrameChg>
+      </pc:sldChg>
+      <pc:sldChg chg="addSp delSp modSp add mod ord">
+        <pc:chgData name="Tyler Place" userId="ea307159bb280439" providerId="LiveId" clId="{09E72B4C-2191-4659-97A9-43CF591626FA}" dt="2024-10-28T02:21:24.175" v="624" actId="14100"/>
+        <pc:sldMkLst>
+          <pc:docMk/>
+          <pc:sldMk cId="1775727957" sldId="267"/>
+        </pc:sldMkLst>
+        <pc:spChg chg="mod">
+          <ac:chgData name="Tyler Place" userId="ea307159bb280439" providerId="LiveId" clId="{09E72B4C-2191-4659-97A9-43CF591626FA}" dt="2024-10-28T01:00:37.513" v="548" actId="20577"/>
+          <ac:spMkLst>
+            <pc:docMk/>
+            <pc:sldMk cId="1775727957" sldId="267"/>
+            <ac:spMk id="2" creationId="{A5A5364E-C261-C041-5B87-4E662C3C2130}"/>
+          </ac:spMkLst>
+        </pc:spChg>
+        <pc:picChg chg="mod">
+          <ac:chgData name="Tyler Place" userId="ea307159bb280439" providerId="LiveId" clId="{09E72B4C-2191-4659-97A9-43CF591626FA}" dt="2024-10-28T02:09:42.371" v="592" actId="1076"/>
+          <ac:picMkLst>
+            <pc:docMk/>
+            <pc:sldMk cId="1775727957" sldId="267"/>
+            <ac:picMk id="5" creationId="{D50B568E-ABCC-9426-189A-E197A9E1BA94}"/>
+          </ac:picMkLst>
+        </pc:picChg>
+        <pc:cxnChg chg="add del mod">
+          <ac:chgData name="Tyler Place" userId="ea307159bb280439" providerId="LiveId" clId="{09E72B4C-2191-4659-97A9-43CF591626FA}" dt="2024-10-28T01:01:06.330" v="556" actId="478"/>
+          <ac:cxnSpMkLst>
+            <pc:docMk/>
+            <pc:sldMk cId="1775727957" sldId="267"/>
+            <ac:cxnSpMk id="4" creationId="{9688988C-30C0-4DCE-242E-F5AB3064ABC4}"/>
+          </ac:cxnSpMkLst>
+        </pc:cxnChg>
+        <pc:cxnChg chg="add del mod">
+          <ac:chgData name="Tyler Place" userId="ea307159bb280439" providerId="LiveId" clId="{09E72B4C-2191-4659-97A9-43CF591626FA}" dt="2024-10-28T01:01:04.541" v="555" actId="478"/>
+          <ac:cxnSpMkLst>
+            <pc:docMk/>
+            <pc:sldMk cId="1775727957" sldId="267"/>
+            <ac:cxnSpMk id="7" creationId="{8048C20C-134F-C432-9C68-7DB4A8C27527}"/>
+          </ac:cxnSpMkLst>
+        </pc:cxnChg>
+        <pc:cxnChg chg="mod">
+          <ac:chgData name="Tyler Place" userId="ea307159bb280439" providerId="LiveId" clId="{09E72B4C-2191-4659-97A9-43CF591626FA}" dt="2024-10-28T02:15:48.173" v="617" actId="1076"/>
+          <ac:cxnSpMkLst>
+            <pc:docMk/>
+            <pc:sldMk cId="1775727957" sldId="267"/>
+            <ac:cxnSpMk id="9" creationId="{2154432F-A54C-D006-C1CB-5DB35EBDD6CE}"/>
+          </ac:cxnSpMkLst>
+        </pc:cxnChg>
+        <pc:cxnChg chg="mod">
+          <ac:chgData name="Tyler Place" userId="ea307159bb280439" providerId="LiveId" clId="{09E72B4C-2191-4659-97A9-43CF591626FA}" dt="2024-10-28T02:09:49.233" v="593" actId="1076"/>
+          <ac:cxnSpMkLst>
+            <pc:docMk/>
+            <pc:sldMk cId="1775727957" sldId="267"/>
+            <ac:cxnSpMk id="11" creationId="{96C43D7A-6F24-7284-7F8B-FDAFF0122F6F}"/>
+          </ac:cxnSpMkLst>
+        </pc:cxnChg>
+        <pc:cxnChg chg="add mod">
+          <ac:chgData name="Tyler Place" userId="ea307159bb280439" providerId="LiveId" clId="{09E72B4C-2191-4659-97A9-43CF591626FA}" dt="2024-10-28T02:17:10.427" v="621" actId="14100"/>
+          <ac:cxnSpMkLst>
+            <pc:docMk/>
+            <pc:sldMk cId="1775727957" sldId="267"/>
+            <ac:cxnSpMk id="12" creationId="{19232B86-C20E-4053-80CF-E195EC121A95}"/>
+          </ac:cxnSpMkLst>
+        </pc:cxnChg>
+        <pc:cxnChg chg="mod">
+          <ac:chgData name="Tyler Place" userId="ea307159bb280439" providerId="LiveId" clId="{09E72B4C-2191-4659-97A9-43CF591626FA}" dt="2024-10-28T02:09:49.233" v="593" actId="1076"/>
+          <ac:cxnSpMkLst>
+            <pc:docMk/>
+            <pc:sldMk cId="1775727957" sldId="267"/>
+            <ac:cxnSpMk id="13" creationId="{5CF168D5-9502-155C-8ABB-217F0E9B2E76}"/>
+          </ac:cxnSpMkLst>
+        </pc:cxnChg>
+        <pc:cxnChg chg="add mod">
+          <ac:chgData name="Tyler Place" userId="ea307159bb280439" providerId="LiveId" clId="{09E72B4C-2191-4659-97A9-43CF591626FA}" dt="2024-10-28T02:21:21.375" v="623" actId="14100"/>
+          <ac:cxnSpMkLst>
+            <pc:docMk/>
+            <pc:sldMk cId="1775727957" sldId="267"/>
+            <ac:cxnSpMk id="17" creationId="{CC501FC5-A684-7F24-111D-D5A3A3E7686A}"/>
+          </ac:cxnSpMkLst>
+        </pc:cxnChg>
+        <pc:cxnChg chg="mod">
+          <ac:chgData name="Tyler Place" userId="ea307159bb280439" providerId="LiveId" clId="{09E72B4C-2191-4659-97A9-43CF591626FA}" dt="2024-10-28T02:09:49.233" v="593" actId="1076"/>
+          <ac:cxnSpMkLst>
+            <pc:docMk/>
+            <pc:sldMk cId="1775727957" sldId="267"/>
+            <ac:cxnSpMk id="21" creationId="{3C6686F8-D914-7B82-493C-4C3C08FF11A5}"/>
+          </ac:cxnSpMkLst>
+        </pc:cxnChg>
+        <pc:cxnChg chg="mod">
+          <ac:chgData name="Tyler Place" userId="ea307159bb280439" providerId="LiveId" clId="{09E72B4C-2191-4659-97A9-43CF591626FA}" dt="2024-10-28T02:09:49.233" v="593" actId="1076"/>
+          <ac:cxnSpMkLst>
+            <pc:docMk/>
+            <pc:sldMk cId="1775727957" sldId="267"/>
+            <ac:cxnSpMk id="23" creationId="{F2FCFB79-7B00-B18E-FE08-A5894EAC370D}"/>
+          </ac:cxnSpMkLst>
+        </pc:cxnChg>
+        <pc:cxnChg chg="mod">
+          <ac:chgData name="Tyler Place" userId="ea307159bb280439" providerId="LiveId" clId="{09E72B4C-2191-4659-97A9-43CF591626FA}" dt="2024-10-28T02:09:49.233" v="593" actId="1076"/>
+          <ac:cxnSpMkLst>
+            <pc:docMk/>
+            <pc:sldMk cId="1775727957" sldId="267"/>
+            <ac:cxnSpMk id="25" creationId="{3C53476E-7FF4-5B32-7AFF-2C86B1E74BC6}"/>
+          </ac:cxnSpMkLst>
+        </pc:cxnChg>
+        <pc:cxnChg chg="add mod">
+          <ac:chgData name="Tyler Place" userId="ea307159bb280439" providerId="LiveId" clId="{09E72B4C-2191-4659-97A9-43CF591626FA}" dt="2024-10-28T02:21:24.175" v="624" actId="14100"/>
+          <ac:cxnSpMkLst>
+            <pc:docMk/>
+            <pc:sldMk cId="1775727957" sldId="267"/>
+            <ac:cxnSpMk id="26" creationId="{457564AA-8F06-DD55-94E5-AE452DE9C570}"/>
+          </ac:cxnSpMkLst>
+        </pc:cxnChg>
+        <pc:cxnChg chg="mod">
+          <ac:chgData name="Tyler Place" userId="ea307159bb280439" providerId="LiveId" clId="{09E72B4C-2191-4659-97A9-43CF591626FA}" dt="2024-10-28T02:09:49.233" v="593" actId="1076"/>
+          <ac:cxnSpMkLst>
+            <pc:docMk/>
+            <pc:sldMk cId="1775727957" sldId="267"/>
+            <ac:cxnSpMk id="27" creationId="{816903A4-3736-25F2-250C-948484B2A9FF}"/>
+          </ac:cxnSpMkLst>
+        </pc:cxnChg>
+        <pc:cxnChg chg="mod">
+          <ac:chgData name="Tyler Place" userId="ea307159bb280439" providerId="LiveId" clId="{09E72B4C-2191-4659-97A9-43CF591626FA}" dt="2024-10-28T02:09:49.233" v="593" actId="1076"/>
+          <ac:cxnSpMkLst>
+            <pc:docMk/>
+            <pc:sldMk cId="1775727957" sldId="267"/>
+            <ac:cxnSpMk id="29" creationId="{123F83B7-73BE-6CE8-BAF3-F4987DC8E0D4}"/>
+          </ac:cxnSpMkLst>
+        </pc:cxnChg>
+        <pc:cxnChg chg="mod">
+          <ac:chgData name="Tyler Place" userId="ea307159bb280439" providerId="LiveId" clId="{09E72B4C-2191-4659-97A9-43CF591626FA}" dt="2024-10-28T02:09:49.233" v="593" actId="1076"/>
+          <ac:cxnSpMkLst>
+            <pc:docMk/>
+            <pc:sldMk cId="1775727957" sldId="267"/>
+            <ac:cxnSpMk id="31" creationId="{80F5B455-5FA1-CDC7-1958-75470DF4F9D3}"/>
+          </ac:cxnSpMkLst>
+        </pc:cxnChg>
+        <pc:cxnChg chg="mod">
+          <ac:chgData name="Tyler Place" userId="ea307159bb280439" providerId="LiveId" clId="{09E72B4C-2191-4659-97A9-43CF591626FA}" dt="2024-10-28T02:09:49.233" v="593" actId="1076"/>
+          <ac:cxnSpMkLst>
+            <pc:docMk/>
+            <pc:sldMk cId="1775727957" sldId="267"/>
+            <ac:cxnSpMk id="33" creationId="{AA49896F-89FD-5054-2A30-B73727B90006}"/>
+          </ac:cxnSpMkLst>
+        </pc:cxnChg>
+        <pc:cxnChg chg="mod">
+          <ac:chgData name="Tyler Place" userId="ea307159bb280439" providerId="LiveId" clId="{09E72B4C-2191-4659-97A9-43CF591626FA}" dt="2024-10-28T02:15:48.548" v="618" actId="1076"/>
+          <ac:cxnSpMkLst>
+            <pc:docMk/>
+            <pc:sldMk cId="1775727957" sldId="267"/>
+            <ac:cxnSpMk id="35" creationId="{CFC89958-B5EE-C64D-038D-A25A697AB82E}"/>
+          </ac:cxnSpMkLst>
+        </pc:cxnChg>
+        <pc:cxnChg chg="add mod">
+          <ac:chgData name="Tyler Place" userId="ea307159bb280439" providerId="LiveId" clId="{09E72B4C-2191-4659-97A9-43CF591626FA}" dt="2024-10-28T02:15:43.875" v="608" actId="1076"/>
+          <ac:cxnSpMkLst>
+            <pc:docMk/>
+            <pc:sldMk cId="1775727957" sldId="267"/>
+            <ac:cxnSpMk id="43" creationId="{11F7AC1E-EFF1-BAF4-37AD-B0887027296B}"/>
+          </ac:cxnSpMkLst>
+        </pc:cxnChg>
+      </pc:sldChg>
+      <pc:sldChg chg="addSp modSp add del mod ord">
+        <pc:chgData name="Tyler Place" userId="ea307159bb280439" providerId="LiveId" clId="{09E72B4C-2191-4659-97A9-43CF591626FA}" dt="2024-10-28T01:00:29.313" v="541" actId="47"/>
+        <pc:sldMkLst>
+          <pc:docMk/>
+          <pc:sldMk cId="2277696212" sldId="267"/>
+        </pc:sldMkLst>
+        <pc:spChg chg="mod">
+          <ac:chgData name="Tyler Place" userId="ea307159bb280439" providerId="LiveId" clId="{09E72B4C-2191-4659-97A9-43CF591626FA}" dt="2024-10-27T22:22:35.683" v="509" actId="20577"/>
+          <ac:spMkLst>
+            <pc:docMk/>
+            <pc:sldMk cId="2277696212" sldId="267"/>
+            <ac:spMk id="2" creationId="{6D8F6A99-EC86-73D5-AA2E-C104F1A14B29}"/>
+          </ac:spMkLst>
+        </pc:spChg>
+        <pc:picChg chg="mod">
+          <ac:chgData name="Tyler Place" userId="ea307159bb280439" providerId="LiveId" clId="{09E72B4C-2191-4659-97A9-43CF591626FA}" dt="2024-10-27T22:23:26.476" v="525" actId="1076"/>
+          <ac:picMkLst>
+            <pc:docMk/>
+            <pc:sldMk cId="2277696212" sldId="267"/>
+            <ac:picMk id="5" creationId="{B79DB6FA-3E47-5C48-28E3-45F206955B32}"/>
+          </ac:picMkLst>
+        </pc:picChg>
+        <pc:cxnChg chg="add mod">
+          <ac:chgData name="Tyler Place" userId="ea307159bb280439" providerId="LiveId" clId="{09E72B4C-2191-4659-97A9-43CF591626FA}" dt="2024-10-28T00:07:06.007" v="536" actId="14100"/>
+          <ac:cxnSpMkLst>
+            <pc:docMk/>
+            <pc:sldMk cId="2277696212" sldId="267"/>
+            <ac:cxnSpMk id="8" creationId="{35CB1A9E-0EF3-6E79-DE4A-6E1E6B76FABB}"/>
+          </ac:cxnSpMkLst>
+        </pc:cxnChg>
+        <pc:cxnChg chg="mod">
+          <ac:chgData name="Tyler Place" userId="ea307159bb280439" providerId="LiveId" clId="{09E72B4C-2191-4659-97A9-43CF591626FA}" dt="2024-10-27T22:22:53.052" v="511" actId="1076"/>
+          <ac:cxnSpMkLst>
+            <pc:docMk/>
+            <pc:sldMk cId="2277696212" sldId="267"/>
+            <ac:cxnSpMk id="9" creationId="{4981D553-8BB5-DCFF-0392-E2E636E37DD2}"/>
+          </ac:cxnSpMkLst>
+        </pc:cxnChg>
+        <pc:cxnChg chg="mod">
+          <ac:chgData name="Tyler Place" userId="ea307159bb280439" providerId="LiveId" clId="{09E72B4C-2191-4659-97A9-43CF591626FA}" dt="2024-10-27T22:22:49.681" v="510" actId="1076"/>
+          <ac:cxnSpMkLst>
+            <pc:docMk/>
+            <pc:sldMk cId="2277696212" sldId="267"/>
+            <ac:cxnSpMk id="11" creationId="{DBBCC209-DD0B-09B3-18BB-464A94CEA12C}"/>
+          </ac:cxnSpMkLst>
+        </pc:cxnChg>
+        <pc:cxnChg chg="add mod">
+          <ac:chgData name="Tyler Place" userId="ea307159bb280439" providerId="LiveId" clId="{09E72B4C-2191-4659-97A9-43CF591626FA}" dt="2024-10-27T22:25:33.211" v="528" actId="14100"/>
+          <ac:cxnSpMkLst>
+            <pc:docMk/>
+            <pc:sldMk cId="2277696212" sldId="267"/>
+            <ac:cxnSpMk id="12" creationId="{B4D85FC9-C0F6-1B0C-C404-0E12B960EF6B}"/>
+          </ac:cxnSpMkLst>
+        </pc:cxnChg>
+        <pc:cxnChg chg="mod">
+          <ac:chgData name="Tyler Place" userId="ea307159bb280439" providerId="LiveId" clId="{09E72B4C-2191-4659-97A9-43CF591626FA}" dt="2024-10-27T22:22:49.681" v="510" actId="1076"/>
+          <ac:cxnSpMkLst>
+            <pc:docMk/>
+            <pc:sldMk cId="2277696212" sldId="267"/>
+            <ac:cxnSpMk id="13" creationId="{359CEF5F-C83D-1F3F-0280-38661B3DC37C}"/>
+          </ac:cxnSpMkLst>
+        </pc:cxnChg>
+        <pc:cxnChg chg="mod">
+          <ac:chgData name="Tyler Place" userId="ea307159bb280439" providerId="LiveId" clId="{09E72B4C-2191-4659-97A9-43CF591626FA}" dt="2024-10-27T22:22:49.681" v="510" actId="1076"/>
+          <ac:cxnSpMkLst>
+            <pc:docMk/>
+            <pc:sldMk cId="2277696212" sldId="267"/>
+            <ac:cxnSpMk id="21" creationId="{81D215A5-2237-513A-E7DB-0E7EF935EAEC}"/>
+          </ac:cxnSpMkLst>
+        </pc:cxnChg>
+        <pc:cxnChg chg="mod">
+          <ac:chgData name="Tyler Place" userId="ea307159bb280439" providerId="LiveId" clId="{09E72B4C-2191-4659-97A9-43CF591626FA}" dt="2024-10-27T22:26:04.198" v="531" actId="14100"/>
+          <ac:cxnSpMkLst>
+            <pc:docMk/>
+            <pc:sldMk cId="2277696212" sldId="267"/>
+            <ac:cxnSpMk id="23" creationId="{7D722158-D1A5-334C-E8EC-69AF7B665CCA}"/>
+          </ac:cxnSpMkLst>
+        </pc:cxnChg>
+        <pc:cxnChg chg="mod">
+          <ac:chgData name="Tyler Place" userId="ea307159bb280439" providerId="LiveId" clId="{09E72B4C-2191-4659-97A9-43CF591626FA}" dt="2024-10-27T22:26:06.015" v="532" actId="14100"/>
+          <ac:cxnSpMkLst>
+            <pc:docMk/>
+            <pc:sldMk cId="2277696212" sldId="267"/>
+            <ac:cxnSpMk id="25" creationId="{B5B390BA-1434-B802-5239-AC21A2F70505}"/>
+          </ac:cxnSpMkLst>
+        </pc:cxnChg>
+        <pc:cxnChg chg="mod">
+          <ac:chgData name="Tyler Place" userId="ea307159bb280439" providerId="LiveId" clId="{09E72B4C-2191-4659-97A9-43CF591626FA}" dt="2024-10-28T00:07:07.948" v="537" actId="14100"/>
+          <ac:cxnSpMkLst>
+            <pc:docMk/>
+            <pc:sldMk cId="2277696212" sldId="267"/>
+            <ac:cxnSpMk id="27" creationId="{022359B7-5A2F-FBB3-96CC-8778186C55CA}"/>
+          </ac:cxnSpMkLst>
+        </pc:cxnChg>
+        <pc:cxnChg chg="mod">
+          <ac:chgData name="Tyler Place" userId="ea307159bb280439" providerId="LiveId" clId="{09E72B4C-2191-4659-97A9-43CF591626FA}" dt="2024-10-27T22:25:31.423" v="527" actId="14100"/>
+          <ac:cxnSpMkLst>
+            <pc:docMk/>
+            <pc:sldMk cId="2277696212" sldId="267"/>
+            <ac:cxnSpMk id="29" creationId="{6E54C73E-725D-8315-B1B4-E11AA3B5226C}"/>
+          </ac:cxnSpMkLst>
+        </pc:cxnChg>
+        <pc:cxnChg chg="mod">
+          <ac:chgData name="Tyler Place" userId="ea307159bb280439" providerId="LiveId" clId="{09E72B4C-2191-4659-97A9-43CF591626FA}" dt="2024-10-27T22:22:49.681" v="510" actId="1076"/>
+          <ac:cxnSpMkLst>
+            <pc:docMk/>
+            <pc:sldMk cId="2277696212" sldId="267"/>
+            <ac:cxnSpMk id="31" creationId="{87CF8F05-14F1-0554-2341-85E1DB76AE75}"/>
+          </ac:cxnSpMkLst>
+        </pc:cxnChg>
+        <pc:cxnChg chg="add mod">
+          <ac:chgData name="Tyler Place" userId="ea307159bb280439" providerId="LiveId" clId="{09E72B4C-2191-4659-97A9-43CF591626FA}" dt="2024-10-28T00:07:29.598" v="540" actId="14100"/>
+          <ac:cxnSpMkLst>
+            <pc:docMk/>
+            <pc:sldMk cId="2277696212" sldId="267"/>
+            <ac:cxnSpMk id="32" creationId="{41A47044-E2DA-8C55-3CCA-47ECF2FD4BC6}"/>
+          </ac:cxnSpMkLst>
+        </pc:cxnChg>
+        <pc:cxnChg chg="mod">
+          <ac:chgData name="Tyler Place" userId="ea307159bb280439" providerId="LiveId" clId="{09E72B4C-2191-4659-97A9-43CF591626FA}" dt="2024-10-27T22:22:49.681" v="510" actId="1076"/>
+          <ac:cxnSpMkLst>
+            <pc:docMk/>
+            <pc:sldMk cId="2277696212" sldId="267"/>
+            <ac:cxnSpMk id="33" creationId="{55E76037-FB88-3546-7B76-022053F1142C}"/>
+          </ac:cxnSpMkLst>
+        </pc:cxnChg>
+        <pc:cxnChg chg="mod">
+          <ac:chgData name="Tyler Place" userId="ea307159bb280439" providerId="LiveId" clId="{09E72B4C-2191-4659-97A9-43CF591626FA}" dt="2024-10-27T22:22:55.310" v="512" actId="1076"/>
+          <ac:cxnSpMkLst>
+            <pc:docMk/>
+            <pc:sldMk cId="2277696212" sldId="267"/>
+            <ac:cxnSpMk id="35" creationId="{D8458F5A-5CE6-1088-261D-92845E7CB4D2}"/>
+          </ac:cxnSpMkLst>
+        </pc:cxnChg>
+      </pc:sldChg>
+    </pc:docChg>
+  </pc:docChgLst>
+  <pc:docChgLst>
     <pc:chgData name="Tyler Place" userId="ea307159bb280439" providerId="LiveId" clId="{50DF13B2-8172-4AF9-A8B8-BF1E701DDB20}"/>
     <pc:docChg chg="undo custSel addSld delSld modSld sldOrd">
       <pc:chgData name="Tyler Place" userId="ea307159bb280439" providerId="LiveId" clId="{50DF13B2-8172-4AF9-A8B8-BF1E701DDB20}" dt="2024-05-28T22:28:58.034" v="266" actId="11529"/>
@@ -680,1003 +1677,6 @@
             <pc:docMk/>
             <pc:sldMk cId="1206378955" sldId="261"/>
             <ac:cxnSpMk id="33" creationId="{C470E4D4-663E-C2D9-0A69-1FC661B97DA9}"/>
-          </ac:cxnSpMkLst>
-        </pc:cxnChg>
-      </pc:sldChg>
-    </pc:docChg>
-  </pc:docChgLst>
-  <pc:docChgLst>
-    <pc:chgData name="Tyler Place" userId="ea307159bb280439" providerId="LiveId" clId="{09E72B4C-2191-4659-97A9-43CF591626FA}"/>
-    <pc:docChg chg="undo redo custSel addSld delSld modSld sldOrd">
-      <pc:chgData name="Tyler Place" userId="ea307159bb280439" providerId="LiveId" clId="{09E72B4C-2191-4659-97A9-43CF591626FA}" dt="2024-10-28T02:21:24.175" v="624" actId="14100"/>
-      <pc:docMkLst>
-        <pc:docMk/>
-      </pc:docMkLst>
-      <pc:sldChg chg="modSp mod">
-        <pc:chgData name="Tyler Place" userId="ea307159bb280439" providerId="LiveId" clId="{09E72B4C-2191-4659-97A9-43CF591626FA}" dt="2024-10-27T21:45:19.157" v="460" actId="14100"/>
-        <pc:sldMkLst>
-          <pc:docMk/>
-          <pc:sldMk cId="4210613587" sldId="257"/>
-        </pc:sldMkLst>
-        <pc:cxnChg chg="mod">
-          <ac:chgData name="Tyler Place" userId="ea307159bb280439" providerId="LiveId" clId="{09E72B4C-2191-4659-97A9-43CF591626FA}" dt="2024-10-27T21:45:19.157" v="460" actId="14100"/>
-          <ac:cxnSpMkLst>
-            <pc:docMk/>
-            <pc:sldMk cId="4210613587" sldId="257"/>
-            <ac:cxnSpMk id="20" creationId="{6773BAFF-677F-8FA1-E4F1-BDE9443FB9EE}"/>
-          </ac:cxnSpMkLst>
-        </pc:cxnChg>
-        <pc:cxnChg chg="mod">
-          <ac:chgData name="Tyler Place" userId="ea307159bb280439" providerId="LiveId" clId="{09E72B4C-2191-4659-97A9-43CF591626FA}" dt="2024-10-27T21:45:11.636" v="459" actId="14100"/>
-          <ac:cxnSpMkLst>
-            <pc:docMk/>
-            <pc:sldMk cId="4210613587" sldId="257"/>
-            <ac:cxnSpMk id="22" creationId="{9F875B2E-E19A-9A5F-AE17-373EC8FFD782}"/>
-          </ac:cxnSpMkLst>
-        </pc:cxnChg>
-        <pc:cxnChg chg="mod">
-          <ac:chgData name="Tyler Place" userId="ea307159bb280439" providerId="LiveId" clId="{09E72B4C-2191-4659-97A9-43CF591626FA}" dt="2024-10-27T21:33:49.898" v="420" actId="14100"/>
-          <ac:cxnSpMkLst>
-            <pc:docMk/>
-            <pc:sldMk cId="4210613587" sldId="257"/>
-            <ac:cxnSpMk id="25" creationId="{8A3B97BD-1924-C6E1-84C0-C33DA4C35FF2}"/>
-          </ac:cxnSpMkLst>
-        </pc:cxnChg>
-        <pc:cxnChg chg="mod">
-          <ac:chgData name="Tyler Place" userId="ea307159bb280439" providerId="LiveId" clId="{09E72B4C-2191-4659-97A9-43CF591626FA}" dt="2024-10-27T21:33:29.779" v="416" actId="14100"/>
-          <ac:cxnSpMkLst>
-            <pc:docMk/>
-            <pc:sldMk cId="4210613587" sldId="257"/>
-            <ac:cxnSpMk id="27" creationId="{24F9B259-E673-9874-8FB0-A9ABE023209B}"/>
-          </ac:cxnSpMkLst>
-        </pc:cxnChg>
-        <pc:cxnChg chg="mod">
-          <ac:chgData name="Tyler Place" userId="ea307159bb280439" providerId="LiveId" clId="{09E72B4C-2191-4659-97A9-43CF591626FA}" dt="2024-10-27T21:33:26.825" v="414" actId="14100"/>
-          <ac:cxnSpMkLst>
-            <pc:docMk/>
-            <pc:sldMk cId="4210613587" sldId="257"/>
-            <ac:cxnSpMk id="29" creationId="{F21C2797-DA5D-7146-AD52-108E5AFE646A}"/>
-          </ac:cxnSpMkLst>
-        </pc:cxnChg>
-        <pc:cxnChg chg="mod">
-          <ac:chgData name="Tyler Place" userId="ea307159bb280439" providerId="LiveId" clId="{09E72B4C-2191-4659-97A9-43CF591626FA}" dt="2024-10-27T21:33:19.841" v="411" actId="14100"/>
-          <ac:cxnSpMkLst>
-            <pc:docMk/>
-            <pc:sldMk cId="4210613587" sldId="257"/>
-            <ac:cxnSpMk id="31" creationId="{8BDF00CB-E64D-9BB6-3773-2F0460836E6F}"/>
-          </ac:cxnSpMkLst>
-        </pc:cxnChg>
-        <pc:cxnChg chg="mod">
-          <ac:chgData name="Tyler Place" userId="ea307159bb280439" providerId="LiveId" clId="{09E72B4C-2191-4659-97A9-43CF591626FA}" dt="2024-10-27T21:33:23.888" v="413" actId="14100"/>
-          <ac:cxnSpMkLst>
-            <pc:docMk/>
-            <pc:sldMk cId="4210613587" sldId="257"/>
-            <ac:cxnSpMk id="33" creationId="{C470E4D4-663E-C2D9-0A69-1FC661B97DA9}"/>
-          </ac:cxnSpMkLst>
-        </pc:cxnChg>
-      </pc:sldChg>
-      <pc:sldChg chg="modSp mod">
-        <pc:chgData name="Tyler Place" userId="ea307159bb280439" providerId="LiveId" clId="{09E72B4C-2191-4659-97A9-43CF591626FA}" dt="2024-10-27T21:58:40.003" v="484" actId="14100"/>
-        <pc:sldMkLst>
-          <pc:docMk/>
-          <pc:sldMk cId="2059681518" sldId="258"/>
-        </pc:sldMkLst>
-        <pc:cxnChg chg="mod">
-          <ac:chgData name="Tyler Place" userId="ea307159bb280439" providerId="LiveId" clId="{09E72B4C-2191-4659-97A9-43CF591626FA}" dt="2024-10-27T21:55:49.827" v="476" actId="14100"/>
-          <ac:cxnSpMkLst>
-            <pc:docMk/>
-            <pc:sldMk cId="2059681518" sldId="258"/>
-            <ac:cxnSpMk id="20" creationId="{6773BAFF-677F-8FA1-E4F1-BDE9443FB9EE}"/>
-          </ac:cxnSpMkLst>
-        </pc:cxnChg>
-        <pc:cxnChg chg="mod">
-          <ac:chgData name="Tyler Place" userId="ea307159bb280439" providerId="LiveId" clId="{09E72B4C-2191-4659-97A9-43CF591626FA}" dt="2024-10-27T21:31:47.547" v="390" actId="14100"/>
-          <ac:cxnSpMkLst>
-            <pc:docMk/>
-            <pc:sldMk cId="2059681518" sldId="258"/>
-            <ac:cxnSpMk id="22" creationId="{9F875B2E-E19A-9A5F-AE17-373EC8FFD782}"/>
-          </ac:cxnSpMkLst>
-        </pc:cxnChg>
-        <pc:cxnChg chg="mod">
-          <ac:chgData name="Tyler Place" userId="ea307159bb280439" providerId="LiveId" clId="{09E72B4C-2191-4659-97A9-43CF591626FA}" dt="2024-10-27T21:31:11.599" v="384" actId="14100"/>
-          <ac:cxnSpMkLst>
-            <pc:docMk/>
-            <pc:sldMk cId="2059681518" sldId="258"/>
-            <ac:cxnSpMk id="25" creationId="{8A3B97BD-1924-C6E1-84C0-C33DA4C35FF2}"/>
-          </ac:cxnSpMkLst>
-        </pc:cxnChg>
-        <pc:cxnChg chg="mod">
-          <ac:chgData name="Tyler Place" userId="ea307159bb280439" providerId="LiveId" clId="{09E72B4C-2191-4659-97A9-43CF591626FA}" dt="2024-10-27T21:58:37.558" v="483" actId="14100"/>
-          <ac:cxnSpMkLst>
-            <pc:docMk/>
-            <pc:sldMk cId="2059681518" sldId="258"/>
-            <ac:cxnSpMk id="27" creationId="{24F9B259-E673-9874-8FB0-A9ABE023209B}"/>
-          </ac:cxnSpMkLst>
-        </pc:cxnChg>
-        <pc:cxnChg chg="mod">
-          <ac:chgData name="Tyler Place" userId="ea307159bb280439" providerId="LiveId" clId="{09E72B4C-2191-4659-97A9-43CF591626FA}" dt="2024-10-27T21:58:40.003" v="484" actId="14100"/>
-          <ac:cxnSpMkLst>
-            <pc:docMk/>
-            <pc:sldMk cId="2059681518" sldId="258"/>
-            <ac:cxnSpMk id="29" creationId="{F21C2797-DA5D-7146-AD52-108E5AFE646A}"/>
-          </ac:cxnSpMkLst>
-        </pc:cxnChg>
-        <pc:cxnChg chg="mod">
-          <ac:chgData name="Tyler Place" userId="ea307159bb280439" providerId="LiveId" clId="{09E72B4C-2191-4659-97A9-43CF591626FA}" dt="2024-10-27T21:31:18.028" v="386" actId="14100"/>
-          <ac:cxnSpMkLst>
-            <pc:docMk/>
-            <pc:sldMk cId="2059681518" sldId="258"/>
-            <ac:cxnSpMk id="31" creationId="{8BDF00CB-E64D-9BB6-3773-2F0460836E6F}"/>
-          </ac:cxnSpMkLst>
-        </pc:cxnChg>
-        <pc:cxnChg chg="mod">
-          <ac:chgData name="Tyler Place" userId="ea307159bb280439" providerId="LiveId" clId="{09E72B4C-2191-4659-97A9-43CF591626FA}" dt="2024-10-27T21:55:47.827" v="475" actId="14100"/>
-          <ac:cxnSpMkLst>
-            <pc:docMk/>
-            <pc:sldMk cId="2059681518" sldId="258"/>
-            <ac:cxnSpMk id="33" creationId="{C470E4D4-663E-C2D9-0A69-1FC661B97DA9}"/>
-          </ac:cxnSpMkLst>
-        </pc:cxnChg>
-      </pc:sldChg>
-      <pc:sldChg chg="modSp mod">
-        <pc:chgData name="Tyler Place" userId="ea307159bb280439" providerId="LiveId" clId="{09E72B4C-2191-4659-97A9-43CF591626FA}" dt="2024-10-27T21:32:51.316" v="406" actId="14100"/>
-        <pc:sldMkLst>
-          <pc:docMk/>
-          <pc:sldMk cId="3928716435" sldId="259"/>
-        </pc:sldMkLst>
-        <pc:cxnChg chg="mod">
-          <ac:chgData name="Tyler Place" userId="ea307159bb280439" providerId="LiveId" clId="{09E72B4C-2191-4659-97A9-43CF591626FA}" dt="2024-10-27T21:32:16.171" v="394" actId="14100"/>
-          <ac:cxnSpMkLst>
-            <pc:docMk/>
-            <pc:sldMk cId="3928716435" sldId="259"/>
-            <ac:cxnSpMk id="20" creationId="{6773BAFF-677F-8FA1-E4F1-BDE9443FB9EE}"/>
-          </ac:cxnSpMkLst>
-        </pc:cxnChg>
-        <pc:cxnChg chg="mod">
-          <ac:chgData name="Tyler Place" userId="ea307159bb280439" providerId="LiveId" clId="{09E72B4C-2191-4659-97A9-43CF591626FA}" dt="2024-10-27T21:32:13.967" v="393" actId="14100"/>
-          <ac:cxnSpMkLst>
-            <pc:docMk/>
-            <pc:sldMk cId="3928716435" sldId="259"/>
-            <ac:cxnSpMk id="22" creationId="{9F875B2E-E19A-9A5F-AE17-373EC8FFD782}"/>
-          </ac:cxnSpMkLst>
-        </pc:cxnChg>
-        <pc:cxnChg chg="mod">
-          <ac:chgData name="Tyler Place" userId="ea307159bb280439" providerId="LiveId" clId="{09E72B4C-2191-4659-97A9-43CF591626FA}" dt="2024-10-27T21:32:24.155" v="396" actId="14100"/>
-          <ac:cxnSpMkLst>
-            <pc:docMk/>
-            <pc:sldMk cId="3928716435" sldId="259"/>
-            <ac:cxnSpMk id="25" creationId="{8A3B97BD-1924-C6E1-84C0-C33DA4C35FF2}"/>
-          </ac:cxnSpMkLst>
-        </pc:cxnChg>
-        <pc:cxnChg chg="mod">
-          <ac:chgData name="Tyler Place" userId="ea307159bb280439" providerId="LiveId" clId="{09E72B4C-2191-4659-97A9-43CF591626FA}" dt="2024-10-27T21:32:49.368" v="405" actId="14100"/>
-          <ac:cxnSpMkLst>
-            <pc:docMk/>
-            <pc:sldMk cId="3928716435" sldId="259"/>
-            <ac:cxnSpMk id="27" creationId="{24F9B259-E673-9874-8FB0-A9ABE023209B}"/>
-          </ac:cxnSpMkLst>
-        </pc:cxnChg>
-        <pc:cxnChg chg="mod">
-          <ac:chgData name="Tyler Place" userId="ea307159bb280439" providerId="LiveId" clId="{09E72B4C-2191-4659-97A9-43CF591626FA}" dt="2024-10-27T21:32:51.316" v="406" actId="14100"/>
-          <ac:cxnSpMkLst>
-            <pc:docMk/>
-            <pc:sldMk cId="3928716435" sldId="259"/>
-            <ac:cxnSpMk id="29" creationId="{F21C2797-DA5D-7146-AD52-108E5AFE646A}"/>
-          </ac:cxnSpMkLst>
-        </pc:cxnChg>
-        <pc:cxnChg chg="mod">
-          <ac:chgData name="Tyler Place" userId="ea307159bb280439" providerId="LiveId" clId="{09E72B4C-2191-4659-97A9-43CF591626FA}" dt="2024-10-27T21:32:43.641" v="403" actId="14100"/>
-          <ac:cxnSpMkLst>
-            <pc:docMk/>
-            <pc:sldMk cId="3928716435" sldId="259"/>
-            <ac:cxnSpMk id="31" creationId="{8BDF00CB-E64D-9BB6-3773-2F0460836E6F}"/>
-          </ac:cxnSpMkLst>
-        </pc:cxnChg>
-        <pc:cxnChg chg="mod">
-          <ac:chgData name="Tyler Place" userId="ea307159bb280439" providerId="LiveId" clId="{09E72B4C-2191-4659-97A9-43CF591626FA}" dt="2024-10-27T21:32:39.120" v="401" actId="14100"/>
-          <ac:cxnSpMkLst>
-            <pc:docMk/>
-            <pc:sldMk cId="3928716435" sldId="259"/>
-            <ac:cxnSpMk id="33" creationId="{C470E4D4-663E-C2D9-0A69-1FC661B97DA9}"/>
-          </ac:cxnSpMkLst>
-        </pc:cxnChg>
-      </pc:sldChg>
-      <pc:sldChg chg="modSp mod">
-        <pc:chgData name="Tyler Place" userId="ea307159bb280439" providerId="LiveId" clId="{09E72B4C-2191-4659-97A9-43CF591626FA}" dt="2024-10-27T22:03:34.733" v="486" actId="14100"/>
-        <pc:sldMkLst>
-          <pc:docMk/>
-          <pc:sldMk cId="1958241090" sldId="260"/>
-        </pc:sldMkLst>
-        <pc:cxnChg chg="mod">
-          <ac:chgData name="Tyler Place" userId="ea307159bb280439" providerId="LiveId" clId="{09E72B4C-2191-4659-97A9-43CF591626FA}" dt="2024-10-27T21:41:47.327" v="441" actId="14100"/>
-          <ac:cxnSpMkLst>
-            <pc:docMk/>
-            <pc:sldMk cId="1958241090" sldId="260"/>
-            <ac:cxnSpMk id="20" creationId="{6773BAFF-677F-8FA1-E4F1-BDE9443FB9EE}"/>
-          </ac:cxnSpMkLst>
-        </pc:cxnChg>
-        <pc:cxnChg chg="mod">
-          <ac:chgData name="Tyler Place" userId="ea307159bb280439" providerId="LiveId" clId="{09E72B4C-2191-4659-97A9-43CF591626FA}" dt="2024-10-27T21:41:18.435" v="437" actId="14100"/>
-          <ac:cxnSpMkLst>
-            <pc:docMk/>
-            <pc:sldMk cId="1958241090" sldId="260"/>
-            <ac:cxnSpMk id="22" creationId="{9F875B2E-E19A-9A5F-AE17-373EC8FFD782}"/>
-          </ac:cxnSpMkLst>
-        </pc:cxnChg>
-        <pc:cxnChg chg="mod">
-          <ac:chgData name="Tyler Place" userId="ea307159bb280439" providerId="LiveId" clId="{09E72B4C-2191-4659-97A9-43CF591626FA}" dt="2024-10-27T21:41:33.611" v="439" actId="14100"/>
-          <ac:cxnSpMkLst>
-            <pc:docMk/>
-            <pc:sldMk cId="1958241090" sldId="260"/>
-            <ac:cxnSpMk id="25" creationId="{8A3B97BD-1924-C6E1-84C0-C33DA4C35FF2}"/>
-          </ac:cxnSpMkLst>
-        </pc:cxnChg>
-        <pc:cxnChg chg="mod">
-          <ac:chgData name="Tyler Place" userId="ea307159bb280439" providerId="LiveId" clId="{09E72B4C-2191-4659-97A9-43CF591626FA}" dt="2024-10-27T21:41:32.003" v="438" actId="14100"/>
-          <ac:cxnSpMkLst>
-            <pc:docMk/>
-            <pc:sldMk cId="1958241090" sldId="260"/>
-            <ac:cxnSpMk id="27" creationId="{24F9B259-E673-9874-8FB0-A9ABE023209B}"/>
-          </ac:cxnSpMkLst>
-        </pc:cxnChg>
-        <pc:cxnChg chg="mod">
-          <ac:chgData name="Tyler Place" userId="ea307159bb280439" providerId="LiveId" clId="{09E72B4C-2191-4659-97A9-43CF591626FA}" dt="2024-10-27T22:03:32.883" v="485" actId="14100"/>
-          <ac:cxnSpMkLst>
-            <pc:docMk/>
-            <pc:sldMk cId="1958241090" sldId="260"/>
-            <ac:cxnSpMk id="29" creationId="{F21C2797-DA5D-7146-AD52-108E5AFE646A}"/>
-          </ac:cxnSpMkLst>
-        </pc:cxnChg>
-        <pc:cxnChg chg="mod">
-          <ac:chgData name="Tyler Place" userId="ea307159bb280439" providerId="LiveId" clId="{09E72B4C-2191-4659-97A9-43CF591626FA}" dt="2024-10-27T22:03:34.733" v="486" actId="14100"/>
-          <ac:cxnSpMkLst>
-            <pc:docMk/>
-            <pc:sldMk cId="1958241090" sldId="260"/>
-            <ac:cxnSpMk id="31" creationId="{8BDF00CB-E64D-9BB6-3773-2F0460836E6F}"/>
-          </ac:cxnSpMkLst>
-        </pc:cxnChg>
-        <pc:cxnChg chg="mod">
-          <ac:chgData name="Tyler Place" userId="ea307159bb280439" providerId="LiveId" clId="{09E72B4C-2191-4659-97A9-43CF591626FA}" dt="2024-10-27T21:41:45.450" v="440" actId="14100"/>
-          <ac:cxnSpMkLst>
-            <pc:docMk/>
-            <pc:sldMk cId="1958241090" sldId="260"/>
-            <ac:cxnSpMk id="33" creationId="{C470E4D4-663E-C2D9-0A69-1FC661B97DA9}"/>
-          </ac:cxnSpMkLst>
-        </pc:cxnChg>
-      </pc:sldChg>
-      <pc:sldChg chg="modSp mod">
-        <pc:chgData name="Tyler Place" userId="ea307159bb280439" providerId="LiveId" clId="{09E72B4C-2191-4659-97A9-43CF591626FA}" dt="2024-10-27T22:07:01.517" v="494" actId="14100"/>
-        <pc:sldMkLst>
-          <pc:docMk/>
-          <pc:sldMk cId="1206378955" sldId="261"/>
-        </pc:sldMkLst>
-        <pc:cxnChg chg="mod">
-          <ac:chgData name="Tyler Place" userId="ea307159bb280439" providerId="LiveId" clId="{09E72B4C-2191-4659-97A9-43CF591626FA}" dt="2024-10-27T22:07:01.517" v="494" actId="14100"/>
-          <ac:cxnSpMkLst>
-            <pc:docMk/>
-            <pc:sldMk cId="1206378955" sldId="261"/>
-            <ac:cxnSpMk id="20" creationId="{6773BAFF-677F-8FA1-E4F1-BDE9443FB9EE}"/>
-          </ac:cxnSpMkLst>
-        </pc:cxnChg>
-        <pc:cxnChg chg="mod">
-          <ac:chgData name="Tyler Place" userId="ea307159bb280439" providerId="LiveId" clId="{09E72B4C-2191-4659-97A9-43CF591626FA}" dt="2024-10-27T22:06:43.013" v="487" actId="14100"/>
-          <ac:cxnSpMkLst>
-            <pc:docMk/>
-            <pc:sldMk cId="1206378955" sldId="261"/>
-            <ac:cxnSpMk id="22" creationId="{9F875B2E-E19A-9A5F-AE17-373EC8FFD782}"/>
-          </ac:cxnSpMkLst>
-        </pc:cxnChg>
-        <pc:cxnChg chg="mod">
-          <ac:chgData name="Tyler Place" userId="ea307159bb280439" providerId="LiveId" clId="{09E72B4C-2191-4659-97A9-43CF591626FA}" dt="2024-10-27T22:06:44.911" v="488" actId="14100"/>
-          <ac:cxnSpMkLst>
-            <pc:docMk/>
-            <pc:sldMk cId="1206378955" sldId="261"/>
-            <ac:cxnSpMk id="25" creationId="{8A3B97BD-1924-C6E1-84C0-C33DA4C35FF2}"/>
-          </ac:cxnSpMkLst>
-        </pc:cxnChg>
-        <pc:cxnChg chg="mod">
-          <ac:chgData name="Tyler Place" userId="ea307159bb280439" providerId="LiveId" clId="{09E72B4C-2191-4659-97A9-43CF591626FA}" dt="2024-10-27T22:06:49.635" v="490" actId="14100"/>
-          <ac:cxnSpMkLst>
-            <pc:docMk/>
-            <pc:sldMk cId="1206378955" sldId="261"/>
-            <ac:cxnSpMk id="27" creationId="{24F9B259-E673-9874-8FB0-A9ABE023209B}"/>
-          </ac:cxnSpMkLst>
-        </pc:cxnChg>
-        <pc:cxnChg chg="mod">
-          <ac:chgData name="Tyler Place" userId="ea307159bb280439" providerId="LiveId" clId="{09E72B4C-2191-4659-97A9-43CF591626FA}" dt="2024-10-27T22:06:47.638" v="489" actId="14100"/>
-          <ac:cxnSpMkLst>
-            <pc:docMk/>
-            <pc:sldMk cId="1206378955" sldId="261"/>
-            <ac:cxnSpMk id="28" creationId="{03109C14-06D7-0376-9EBA-46A81B08409E}"/>
-          </ac:cxnSpMkLst>
-        </pc:cxnChg>
-        <pc:cxnChg chg="mod">
-          <ac:chgData name="Tyler Place" userId="ea307159bb280439" providerId="LiveId" clId="{09E72B4C-2191-4659-97A9-43CF591626FA}" dt="2024-10-27T22:06:55.143" v="491" actId="14100"/>
-          <ac:cxnSpMkLst>
-            <pc:docMk/>
-            <pc:sldMk cId="1206378955" sldId="261"/>
-            <ac:cxnSpMk id="29" creationId="{F21C2797-DA5D-7146-AD52-108E5AFE646A}"/>
-          </ac:cxnSpMkLst>
-        </pc:cxnChg>
-        <pc:cxnChg chg="mod">
-          <ac:chgData name="Tyler Place" userId="ea307159bb280439" providerId="LiveId" clId="{09E72B4C-2191-4659-97A9-43CF591626FA}" dt="2024-10-27T22:06:57.080" v="492" actId="14100"/>
-          <ac:cxnSpMkLst>
-            <pc:docMk/>
-            <pc:sldMk cId="1206378955" sldId="261"/>
-            <ac:cxnSpMk id="31" creationId="{8BDF00CB-E64D-9BB6-3773-2F0460836E6F}"/>
-          </ac:cxnSpMkLst>
-        </pc:cxnChg>
-        <pc:cxnChg chg="mod">
-          <ac:chgData name="Tyler Place" userId="ea307159bb280439" providerId="LiveId" clId="{09E72B4C-2191-4659-97A9-43CF591626FA}" dt="2024-10-27T22:06:59.702" v="493" actId="14100"/>
-          <ac:cxnSpMkLst>
-            <pc:docMk/>
-            <pc:sldMk cId="1206378955" sldId="261"/>
-            <ac:cxnSpMk id="33" creationId="{C470E4D4-663E-C2D9-0A69-1FC661B97DA9}"/>
-          </ac:cxnSpMkLst>
-        </pc:cxnChg>
-      </pc:sldChg>
-      <pc:sldChg chg="modSp new mod">
-        <pc:chgData name="Tyler Place" userId="ea307159bb280439" providerId="LiveId" clId="{09E72B4C-2191-4659-97A9-43CF591626FA}" dt="2024-05-30T04:07:28.200" v="5" actId="20577"/>
-        <pc:sldMkLst>
-          <pc:docMk/>
-          <pc:sldMk cId="3587196432" sldId="262"/>
-        </pc:sldMkLst>
-        <pc:spChg chg="mod">
-          <ac:chgData name="Tyler Place" userId="ea307159bb280439" providerId="LiveId" clId="{09E72B4C-2191-4659-97A9-43CF591626FA}" dt="2024-05-30T04:07:28.200" v="5" actId="20577"/>
-          <ac:spMkLst>
-            <pc:docMk/>
-            <pc:sldMk cId="3587196432" sldId="262"/>
-            <ac:spMk id="2" creationId="{FB479BB9-98BA-F181-D335-9D9490540DFF}"/>
-          </ac:spMkLst>
-        </pc:spChg>
-      </pc:sldChg>
-      <pc:sldChg chg="addSp delSp modSp new mod">
-        <pc:chgData name="Tyler Place" userId="ea307159bb280439" providerId="LiveId" clId="{09E72B4C-2191-4659-97A9-43CF591626FA}" dt="2024-10-27T21:29:05.730" v="355" actId="14100"/>
-        <pc:sldMkLst>
-          <pc:docMk/>
-          <pc:sldMk cId="3941456667" sldId="263"/>
-        </pc:sldMkLst>
-        <pc:spChg chg="mod">
-          <ac:chgData name="Tyler Place" userId="ea307159bb280439" providerId="LiveId" clId="{09E72B4C-2191-4659-97A9-43CF591626FA}" dt="2024-05-30T04:48:44.989" v="166" actId="404"/>
-          <ac:spMkLst>
-            <pc:docMk/>
-            <pc:sldMk cId="3941456667" sldId="263"/>
-            <ac:spMk id="2" creationId="{78E3A12E-67E9-7B6E-6E67-64645EE8AA0A}"/>
-          </ac:spMkLst>
-        </pc:spChg>
-        <pc:spChg chg="add del">
-          <ac:chgData name="Tyler Place" userId="ea307159bb280439" providerId="LiveId" clId="{09E72B4C-2191-4659-97A9-43CF591626FA}" dt="2024-05-30T04:09:21.736" v="11" actId="478"/>
-          <ac:spMkLst>
-            <pc:docMk/>
-            <pc:sldMk cId="3941456667" sldId="263"/>
-            <ac:spMk id="3" creationId="{463345A4-D1B2-558E-BE72-E97481417C8A}"/>
-          </ac:spMkLst>
-        </pc:spChg>
-        <pc:picChg chg="add del mod">
-          <ac:chgData name="Tyler Place" userId="ea307159bb280439" providerId="LiveId" clId="{09E72B4C-2191-4659-97A9-43CF591626FA}" dt="2024-05-30T04:19:28.769" v="85" actId="14100"/>
-          <ac:picMkLst>
-            <pc:docMk/>
-            <pc:sldMk cId="3941456667" sldId="263"/>
-            <ac:picMk id="5" creationId="{482151EE-733A-DC5F-EF0F-B4F7976E8966}"/>
-          </ac:picMkLst>
-        </pc:picChg>
-        <pc:cxnChg chg="add del">
-          <ac:chgData name="Tyler Place" userId="ea307159bb280439" providerId="LiveId" clId="{09E72B4C-2191-4659-97A9-43CF591626FA}" dt="2024-05-30T04:10:55.122" v="37" actId="11529"/>
-          <ac:cxnSpMkLst>
-            <pc:docMk/>
-            <pc:sldMk cId="3941456667" sldId="263"/>
-            <ac:cxnSpMk id="7" creationId="{ED4EE6D3-530D-9ED3-83CD-3DC2CAF64FBB}"/>
-          </ac:cxnSpMkLst>
-        </pc:cxnChg>
-        <pc:cxnChg chg="add mod">
-          <ac:chgData name="Tyler Place" userId="ea307159bb280439" providerId="LiveId" clId="{09E72B4C-2191-4659-97A9-43CF591626FA}" dt="2024-10-27T21:28:35.644" v="345" actId="14100"/>
-          <ac:cxnSpMkLst>
-            <pc:docMk/>
-            <pc:sldMk cId="3941456667" sldId="263"/>
-            <ac:cxnSpMk id="9" creationId="{6DC65E9D-6E4E-4982-B830-4CEA68316194}"/>
-          </ac:cxnSpMkLst>
-        </pc:cxnChg>
-        <pc:cxnChg chg="add mod">
-          <ac:chgData name="Tyler Place" userId="ea307159bb280439" providerId="LiveId" clId="{09E72B4C-2191-4659-97A9-43CF591626FA}" dt="2024-10-27T21:28:37.719" v="346" actId="14100"/>
-          <ac:cxnSpMkLst>
-            <pc:docMk/>
-            <pc:sldMk cId="3941456667" sldId="263"/>
-            <ac:cxnSpMk id="11" creationId="{F38BEC55-8E77-818A-E49C-F7E8420EBB7B}"/>
-          </ac:cxnSpMkLst>
-        </pc:cxnChg>
-        <pc:cxnChg chg="add mod">
-          <ac:chgData name="Tyler Place" userId="ea307159bb280439" providerId="LiveId" clId="{09E72B4C-2191-4659-97A9-43CF591626FA}" dt="2024-10-27T21:28:50.525" v="350" actId="14100"/>
-          <ac:cxnSpMkLst>
-            <pc:docMk/>
-            <pc:sldMk cId="3941456667" sldId="263"/>
-            <ac:cxnSpMk id="13" creationId="{2D79115C-B29B-E661-B047-9AFE9EE44AB7}"/>
-          </ac:cxnSpMkLst>
-        </pc:cxnChg>
-        <pc:cxnChg chg="add mod">
-          <ac:chgData name="Tyler Place" userId="ea307159bb280439" providerId="LiveId" clId="{09E72B4C-2191-4659-97A9-43CF591626FA}" dt="2024-10-27T21:29:03.737" v="354" actId="14100"/>
-          <ac:cxnSpMkLst>
-            <pc:docMk/>
-            <pc:sldMk cId="3941456667" sldId="263"/>
-            <ac:cxnSpMk id="21" creationId="{9ECAE667-05EC-D218-F92D-031D1CC71844}"/>
-          </ac:cxnSpMkLst>
-        </pc:cxnChg>
-        <pc:cxnChg chg="add mod">
-          <ac:chgData name="Tyler Place" userId="ea307159bb280439" providerId="LiveId" clId="{09E72B4C-2191-4659-97A9-43CF591626FA}" dt="2024-10-27T21:29:05.730" v="355" actId="14100"/>
-          <ac:cxnSpMkLst>
-            <pc:docMk/>
-            <pc:sldMk cId="3941456667" sldId="263"/>
-            <ac:cxnSpMk id="23" creationId="{E530229F-89CE-FE75-CA19-B7E654087376}"/>
-          </ac:cxnSpMkLst>
-        </pc:cxnChg>
-        <pc:cxnChg chg="add mod">
-          <ac:chgData name="Tyler Place" userId="ea307159bb280439" providerId="LiveId" clId="{09E72B4C-2191-4659-97A9-43CF591626FA}" dt="2024-05-30T04:15:59.676" v="83" actId="14100"/>
-          <ac:cxnSpMkLst>
-            <pc:docMk/>
-            <pc:sldMk cId="3941456667" sldId="263"/>
-            <ac:cxnSpMk id="25" creationId="{15298556-20C9-DE82-AD3D-2640DEF38799}"/>
-          </ac:cxnSpMkLst>
-        </pc:cxnChg>
-        <pc:cxnChg chg="add mod">
-          <ac:chgData name="Tyler Place" userId="ea307159bb280439" providerId="LiveId" clId="{09E72B4C-2191-4659-97A9-43CF591626FA}" dt="2024-05-30T04:15:30.118" v="71" actId="14100"/>
-          <ac:cxnSpMkLst>
-            <pc:docMk/>
-            <pc:sldMk cId="3941456667" sldId="263"/>
-            <ac:cxnSpMk id="27" creationId="{3DA3FC97-A09F-0D76-E7DF-CA0E4A514D0E}"/>
-          </ac:cxnSpMkLst>
-        </pc:cxnChg>
-        <pc:cxnChg chg="add mod">
-          <ac:chgData name="Tyler Place" userId="ea307159bb280439" providerId="LiveId" clId="{09E72B4C-2191-4659-97A9-43CF591626FA}" dt="2024-05-30T04:15:24.123" v="69" actId="14100"/>
-          <ac:cxnSpMkLst>
-            <pc:docMk/>
-            <pc:sldMk cId="3941456667" sldId="263"/>
-            <ac:cxnSpMk id="29" creationId="{60F19470-C38F-16CC-A72B-C1CA3DCC0C16}"/>
-          </ac:cxnSpMkLst>
-        </pc:cxnChg>
-        <pc:cxnChg chg="add mod">
-          <ac:chgData name="Tyler Place" userId="ea307159bb280439" providerId="LiveId" clId="{09E72B4C-2191-4659-97A9-43CF591626FA}" dt="2024-10-27T21:28:47.449" v="349" actId="14100"/>
-          <ac:cxnSpMkLst>
-            <pc:docMk/>
-            <pc:sldMk cId="3941456667" sldId="263"/>
-            <ac:cxnSpMk id="31" creationId="{C85AAB79-D294-47D3-6E02-04CA7C85ADF4}"/>
-          </ac:cxnSpMkLst>
-        </pc:cxnChg>
-        <pc:cxnChg chg="add mod">
-          <ac:chgData name="Tyler Place" userId="ea307159bb280439" providerId="LiveId" clId="{09E72B4C-2191-4659-97A9-43CF591626FA}" dt="2024-10-27T21:28:45.821" v="348" actId="14100"/>
-          <ac:cxnSpMkLst>
-            <pc:docMk/>
-            <pc:sldMk cId="3941456667" sldId="263"/>
-            <ac:cxnSpMk id="33" creationId="{9DEC60CB-6830-F13C-6243-D560580965E6}"/>
-          </ac:cxnSpMkLst>
-        </pc:cxnChg>
-        <pc:cxnChg chg="add mod">
-          <ac:chgData name="Tyler Place" userId="ea307159bb280439" providerId="LiveId" clId="{09E72B4C-2191-4659-97A9-43CF591626FA}" dt="2024-10-27T21:28:42.297" v="347" actId="14100"/>
-          <ac:cxnSpMkLst>
-            <pc:docMk/>
-            <pc:sldMk cId="3941456667" sldId="263"/>
-            <ac:cxnSpMk id="35" creationId="{19E10E76-5328-5659-9998-EC565662200B}"/>
-          </ac:cxnSpMkLst>
-        </pc:cxnChg>
-      </pc:sldChg>
-      <pc:sldChg chg="modSp add mod">
-        <pc:chgData name="Tyler Place" userId="ea307159bb280439" providerId="LiveId" clId="{09E72B4C-2191-4659-97A9-43CF591626FA}" dt="2024-10-27T21:29:28.296" v="363" actId="14100"/>
-        <pc:sldMkLst>
-          <pc:docMk/>
-          <pc:sldMk cId="2517153691" sldId="264"/>
-        </pc:sldMkLst>
-        <pc:spChg chg="mod">
-          <ac:chgData name="Tyler Place" userId="ea307159bb280439" providerId="LiveId" clId="{09E72B4C-2191-4659-97A9-43CF591626FA}" dt="2024-05-30T04:48:52.996" v="168" actId="255"/>
-          <ac:spMkLst>
-            <pc:docMk/>
-            <pc:sldMk cId="2517153691" sldId="264"/>
-            <ac:spMk id="2" creationId="{78E3A12E-67E9-7B6E-6E67-64645EE8AA0A}"/>
-          </ac:spMkLst>
-        </pc:spChg>
-        <pc:cxnChg chg="mod">
-          <ac:chgData name="Tyler Place" userId="ea307159bb280439" providerId="LiveId" clId="{09E72B4C-2191-4659-97A9-43CF591626FA}" dt="2024-10-27T21:29:18.359" v="358" actId="14100"/>
-          <ac:cxnSpMkLst>
-            <pc:docMk/>
-            <pc:sldMk cId="2517153691" sldId="264"/>
-            <ac:cxnSpMk id="9" creationId="{6DC65E9D-6E4E-4982-B830-4CEA68316194}"/>
-          </ac:cxnSpMkLst>
-        </pc:cxnChg>
-        <pc:cxnChg chg="mod">
-          <ac:chgData name="Tyler Place" userId="ea307159bb280439" providerId="LiveId" clId="{09E72B4C-2191-4659-97A9-43CF591626FA}" dt="2024-10-27T21:29:20.118" v="359" actId="14100"/>
-          <ac:cxnSpMkLst>
-            <pc:docMk/>
-            <pc:sldMk cId="2517153691" sldId="264"/>
-            <ac:cxnSpMk id="11" creationId="{F38BEC55-8E77-818A-E49C-F7E8420EBB7B}"/>
-          </ac:cxnSpMkLst>
-        </pc:cxnChg>
-        <pc:cxnChg chg="mod">
-          <ac:chgData name="Tyler Place" userId="ea307159bb280439" providerId="LiveId" clId="{09E72B4C-2191-4659-97A9-43CF591626FA}" dt="2024-10-27T21:29:26.363" v="362" actId="14100"/>
-          <ac:cxnSpMkLst>
-            <pc:docMk/>
-            <pc:sldMk cId="2517153691" sldId="264"/>
-            <ac:cxnSpMk id="13" creationId="{2D79115C-B29B-E661-B047-9AFE9EE44AB7}"/>
-          </ac:cxnSpMkLst>
-        </pc:cxnChg>
-        <pc:cxnChg chg="mod">
-          <ac:chgData name="Tyler Place" userId="ea307159bb280439" providerId="LiveId" clId="{09E72B4C-2191-4659-97A9-43CF591626FA}" dt="2024-10-27T21:29:28.296" v="363" actId="14100"/>
-          <ac:cxnSpMkLst>
-            <pc:docMk/>
-            <pc:sldMk cId="2517153691" sldId="264"/>
-            <ac:cxnSpMk id="21" creationId="{9ECAE667-05EC-D218-F92D-031D1CC71844}"/>
-          </ac:cxnSpMkLst>
-        </pc:cxnChg>
-        <pc:cxnChg chg="mod">
-          <ac:chgData name="Tyler Place" userId="ea307159bb280439" providerId="LiveId" clId="{09E72B4C-2191-4659-97A9-43CF591626FA}" dt="2024-05-30T04:22:12.005" v="112" actId="14100"/>
-          <ac:cxnSpMkLst>
-            <pc:docMk/>
-            <pc:sldMk cId="2517153691" sldId="264"/>
-            <ac:cxnSpMk id="23" creationId="{E530229F-89CE-FE75-CA19-B7E654087376}"/>
-          </ac:cxnSpMkLst>
-        </pc:cxnChg>
-        <pc:cxnChg chg="mod">
-          <ac:chgData name="Tyler Place" userId="ea307159bb280439" providerId="LiveId" clId="{09E72B4C-2191-4659-97A9-43CF591626FA}" dt="2024-05-30T04:20:46.194" v="90" actId="14100"/>
-          <ac:cxnSpMkLst>
-            <pc:docMk/>
-            <pc:sldMk cId="2517153691" sldId="264"/>
-            <ac:cxnSpMk id="25" creationId="{15298556-20C9-DE82-AD3D-2640DEF38799}"/>
-          </ac:cxnSpMkLst>
-        </pc:cxnChg>
-        <pc:cxnChg chg="mod">
-          <ac:chgData name="Tyler Place" userId="ea307159bb280439" providerId="LiveId" clId="{09E72B4C-2191-4659-97A9-43CF591626FA}" dt="2024-05-30T04:20:48.786" v="91" actId="14100"/>
-          <ac:cxnSpMkLst>
-            <pc:docMk/>
-            <pc:sldMk cId="2517153691" sldId="264"/>
-            <ac:cxnSpMk id="27" creationId="{3DA3FC97-A09F-0D76-E7DF-CA0E4A514D0E}"/>
-          </ac:cxnSpMkLst>
-        </pc:cxnChg>
-        <pc:cxnChg chg="mod">
-          <ac:chgData name="Tyler Place" userId="ea307159bb280439" providerId="LiveId" clId="{09E72B4C-2191-4659-97A9-43CF591626FA}" dt="2024-10-27T21:29:23.901" v="361" actId="14100"/>
-          <ac:cxnSpMkLst>
-            <pc:docMk/>
-            <pc:sldMk cId="2517153691" sldId="264"/>
-            <ac:cxnSpMk id="31" creationId="{C85AAB79-D294-47D3-6E02-04CA7C85ADF4}"/>
-          </ac:cxnSpMkLst>
-        </pc:cxnChg>
-        <pc:cxnChg chg="mod">
-          <ac:chgData name="Tyler Place" userId="ea307159bb280439" providerId="LiveId" clId="{09E72B4C-2191-4659-97A9-43CF591626FA}" dt="2024-10-27T21:29:22.327" v="360" actId="14100"/>
-          <ac:cxnSpMkLst>
-            <pc:docMk/>
-            <pc:sldMk cId="2517153691" sldId="264"/>
-            <ac:cxnSpMk id="33" creationId="{9DEC60CB-6830-F13C-6243-D560580965E6}"/>
-          </ac:cxnSpMkLst>
-        </pc:cxnChg>
-        <pc:cxnChg chg="mod">
-          <ac:chgData name="Tyler Place" userId="ea307159bb280439" providerId="LiveId" clId="{09E72B4C-2191-4659-97A9-43CF591626FA}" dt="2024-10-27T21:29:14.665" v="356" actId="14100"/>
-          <ac:cxnSpMkLst>
-            <pc:docMk/>
-            <pc:sldMk cId="2517153691" sldId="264"/>
-            <ac:cxnSpMk id="35" creationId="{19E10E76-5328-5659-9998-EC565662200B}"/>
-          </ac:cxnSpMkLst>
-        </pc:cxnChg>
-      </pc:sldChg>
-      <pc:sldChg chg="modSp add mod">
-        <pc:chgData name="Tyler Place" userId="ea307159bb280439" providerId="LiveId" clId="{09E72B4C-2191-4659-97A9-43CF591626FA}" dt="2024-10-27T21:30:40.461" v="376" actId="14100"/>
-        <pc:sldMkLst>
-          <pc:docMk/>
-          <pc:sldMk cId="1007413632" sldId="265"/>
-        </pc:sldMkLst>
-        <pc:spChg chg="mod">
-          <ac:chgData name="Tyler Place" userId="ea307159bb280439" providerId="LiveId" clId="{09E72B4C-2191-4659-97A9-43CF591626FA}" dt="2024-06-01T03:56:49.270" v="337" actId="20577"/>
-          <ac:spMkLst>
-            <pc:docMk/>
-            <pc:sldMk cId="1007413632" sldId="265"/>
-            <ac:spMk id="2" creationId="{78E3A12E-67E9-7B6E-6E67-64645EE8AA0A}"/>
-          </ac:spMkLst>
-        </pc:spChg>
-        <pc:cxnChg chg="mod">
-          <ac:chgData name="Tyler Place" userId="ea307159bb280439" providerId="LiveId" clId="{09E72B4C-2191-4659-97A9-43CF591626FA}" dt="2024-10-27T21:30:00.717" v="364" actId="14100"/>
-          <ac:cxnSpMkLst>
-            <pc:docMk/>
-            <pc:sldMk cId="1007413632" sldId="265"/>
-            <ac:cxnSpMk id="9" creationId="{6DC65E9D-6E4E-4982-B830-4CEA68316194}"/>
-          </ac:cxnSpMkLst>
-        </pc:cxnChg>
-        <pc:cxnChg chg="mod">
-          <ac:chgData name="Tyler Place" userId="ea307159bb280439" providerId="LiveId" clId="{09E72B4C-2191-4659-97A9-43CF591626FA}" dt="2024-10-27T21:30:02.364" v="365" actId="14100"/>
-          <ac:cxnSpMkLst>
-            <pc:docMk/>
-            <pc:sldMk cId="1007413632" sldId="265"/>
-            <ac:cxnSpMk id="11" creationId="{F38BEC55-8E77-818A-E49C-F7E8420EBB7B}"/>
-          </ac:cxnSpMkLst>
-        </pc:cxnChg>
-        <pc:cxnChg chg="mod">
-          <ac:chgData name="Tyler Place" userId="ea307159bb280439" providerId="LiveId" clId="{09E72B4C-2191-4659-97A9-43CF591626FA}" dt="2024-05-30T04:27:47.279" v="116" actId="14100"/>
-          <ac:cxnSpMkLst>
-            <pc:docMk/>
-            <pc:sldMk cId="1007413632" sldId="265"/>
-            <ac:cxnSpMk id="13" creationId="{2D79115C-B29B-E661-B047-9AFE9EE44AB7}"/>
-          </ac:cxnSpMkLst>
-        </pc:cxnChg>
-        <pc:cxnChg chg="mod">
-          <ac:chgData name="Tyler Place" userId="ea307159bb280439" providerId="LiveId" clId="{09E72B4C-2191-4659-97A9-43CF591626FA}" dt="2024-05-30T04:28:13.958" v="126" actId="14100"/>
-          <ac:cxnSpMkLst>
-            <pc:docMk/>
-            <pc:sldMk cId="1007413632" sldId="265"/>
-            <ac:cxnSpMk id="21" creationId="{9ECAE667-05EC-D218-F92D-031D1CC71844}"/>
-          </ac:cxnSpMkLst>
-        </pc:cxnChg>
-        <pc:cxnChg chg="mod">
-          <ac:chgData name="Tyler Place" userId="ea307159bb280439" providerId="LiveId" clId="{09E72B4C-2191-4659-97A9-43CF591626FA}" dt="2024-05-30T04:28:12.083" v="125" actId="14100"/>
-          <ac:cxnSpMkLst>
-            <pc:docMk/>
-            <pc:sldMk cId="1007413632" sldId="265"/>
-            <ac:cxnSpMk id="23" creationId="{E530229F-89CE-FE75-CA19-B7E654087376}"/>
-          </ac:cxnSpMkLst>
-        </pc:cxnChg>
-        <pc:cxnChg chg="mod">
-          <ac:chgData name="Tyler Place" userId="ea307159bb280439" providerId="LiveId" clId="{09E72B4C-2191-4659-97A9-43CF591626FA}" dt="2024-10-27T21:30:23.446" v="373" actId="14100"/>
-          <ac:cxnSpMkLst>
-            <pc:docMk/>
-            <pc:sldMk cId="1007413632" sldId="265"/>
-            <ac:cxnSpMk id="25" creationId="{15298556-20C9-DE82-AD3D-2640DEF38799}"/>
-          </ac:cxnSpMkLst>
-        </pc:cxnChg>
-        <pc:cxnChg chg="mod">
-          <ac:chgData name="Tyler Place" userId="ea307159bb280439" providerId="LiveId" clId="{09E72B4C-2191-4659-97A9-43CF591626FA}" dt="2024-10-27T21:30:40.461" v="376" actId="14100"/>
-          <ac:cxnSpMkLst>
-            <pc:docMk/>
-            <pc:sldMk cId="1007413632" sldId="265"/>
-            <ac:cxnSpMk id="27" creationId="{3DA3FC97-A09F-0D76-E7DF-CA0E4A514D0E}"/>
-          </ac:cxnSpMkLst>
-        </pc:cxnChg>
-        <pc:cxnChg chg="mod">
-          <ac:chgData name="Tyler Place" userId="ea307159bb280439" providerId="LiveId" clId="{09E72B4C-2191-4659-97A9-43CF591626FA}" dt="2024-10-27T21:30:13.838" v="370" actId="14100"/>
-          <ac:cxnSpMkLst>
-            <pc:docMk/>
-            <pc:sldMk cId="1007413632" sldId="265"/>
-            <ac:cxnSpMk id="29" creationId="{60F19470-C38F-16CC-A72B-C1CA3DCC0C16}"/>
-          </ac:cxnSpMkLst>
-        </pc:cxnChg>
-        <pc:cxnChg chg="mod">
-          <ac:chgData name="Tyler Place" userId="ea307159bb280439" providerId="LiveId" clId="{09E72B4C-2191-4659-97A9-43CF591626FA}" dt="2024-10-27T21:30:11.605" v="369" actId="14100"/>
-          <ac:cxnSpMkLst>
-            <pc:docMk/>
-            <pc:sldMk cId="1007413632" sldId="265"/>
-            <ac:cxnSpMk id="31" creationId="{C85AAB79-D294-47D3-6E02-04CA7C85ADF4}"/>
-          </ac:cxnSpMkLst>
-        </pc:cxnChg>
-        <pc:cxnChg chg="mod">
-          <ac:chgData name="Tyler Place" userId="ea307159bb280439" providerId="LiveId" clId="{09E72B4C-2191-4659-97A9-43CF591626FA}" dt="2024-10-27T21:30:07.034" v="367" actId="14100"/>
-          <ac:cxnSpMkLst>
-            <pc:docMk/>
-            <pc:sldMk cId="1007413632" sldId="265"/>
-            <ac:cxnSpMk id="33" creationId="{9DEC60CB-6830-F13C-6243-D560580965E6}"/>
-          </ac:cxnSpMkLst>
-        </pc:cxnChg>
-        <pc:cxnChg chg="mod">
-          <ac:chgData name="Tyler Place" userId="ea307159bb280439" providerId="LiveId" clId="{09E72B4C-2191-4659-97A9-43CF591626FA}" dt="2024-10-27T21:30:04.386" v="366" actId="14100"/>
-          <ac:cxnSpMkLst>
-            <pc:docMk/>
-            <pc:sldMk cId="1007413632" sldId="265"/>
-            <ac:cxnSpMk id="35" creationId="{19E10E76-5328-5659-9998-EC565662200B}"/>
-          </ac:cxnSpMkLst>
-        </pc:cxnChg>
-      </pc:sldChg>
-      <pc:sldChg chg="addSp delSp modSp new mod ord">
-        <pc:chgData name="Tyler Place" userId="ea307159bb280439" providerId="LiveId" clId="{09E72B4C-2191-4659-97A9-43CF591626FA}" dt="2024-06-01T04:25:10.951" v="344" actId="20577"/>
-        <pc:sldMkLst>
-          <pc:docMk/>
-          <pc:sldMk cId="624876100" sldId="266"/>
-        </pc:sldMkLst>
-        <pc:spChg chg="mod">
-          <ac:chgData name="Tyler Place" userId="ea307159bb280439" providerId="LiveId" clId="{09E72B4C-2191-4659-97A9-43CF591626FA}" dt="2024-06-01T04:14:05.685" v="340" actId="1076"/>
-          <ac:spMkLst>
-            <pc:docMk/>
-            <pc:sldMk cId="624876100" sldId="266"/>
-            <ac:spMk id="2" creationId="{54BDD459-3467-7DD4-729A-001B8B7F906E}"/>
-          </ac:spMkLst>
-        </pc:spChg>
-        <pc:spChg chg="del">
-          <ac:chgData name="Tyler Place" userId="ea307159bb280439" providerId="LiveId" clId="{09E72B4C-2191-4659-97A9-43CF591626FA}" dt="2024-06-01T03:53:36.946" v="189" actId="3680"/>
-          <ac:spMkLst>
-            <pc:docMk/>
-            <pc:sldMk cId="624876100" sldId="266"/>
-            <ac:spMk id="3" creationId="{68D179A7-CA91-25C6-E12F-E4E5A52257A1}"/>
-          </ac:spMkLst>
-        </pc:spChg>
-        <pc:graphicFrameChg chg="add mod ord modGraphic">
-          <ac:chgData name="Tyler Place" userId="ea307159bb280439" providerId="LiveId" clId="{09E72B4C-2191-4659-97A9-43CF591626FA}" dt="2024-06-01T04:25:10.951" v="344" actId="20577"/>
-          <ac:graphicFrameMkLst>
-            <pc:docMk/>
-            <pc:sldMk cId="624876100" sldId="266"/>
-            <ac:graphicFrameMk id="4" creationId="{9EFB89CA-303C-55AC-74A7-EF5C57FBB44D}"/>
-          </ac:graphicFrameMkLst>
-        </pc:graphicFrameChg>
-      </pc:sldChg>
-      <pc:sldChg chg="addSp delSp modSp add mod ord">
-        <pc:chgData name="Tyler Place" userId="ea307159bb280439" providerId="LiveId" clId="{09E72B4C-2191-4659-97A9-43CF591626FA}" dt="2024-10-28T02:21:24.175" v="624" actId="14100"/>
-        <pc:sldMkLst>
-          <pc:docMk/>
-          <pc:sldMk cId="1775727957" sldId="267"/>
-        </pc:sldMkLst>
-        <pc:spChg chg="mod">
-          <ac:chgData name="Tyler Place" userId="ea307159bb280439" providerId="LiveId" clId="{09E72B4C-2191-4659-97A9-43CF591626FA}" dt="2024-10-28T01:00:37.513" v="548" actId="20577"/>
-          <ac:spMkLst>
-            <pc:docMk/>
-            <pc:sldMk cId="1775727957" sldId="267"/>
-            <ac:spMk id="2" creationId="{A5A5364E-C261-C041-5B87-4E662C3C2130}"/>
-          </ac:spMkLst>
-        </pc:spChg>
-        <pc:picChg chg="mod">
-          <ac:chgData name="Tyler Place" userId="ea307159bb280439" providerId="LiveId" clId="{09E72B4C-2191-4659-97A9-43CF591626FA}" dt="2024-10-28T02:09:42.371" v="592" actId="1076"/>
-          <ac:picMkLst>
-            <pc:docMk/>
-            <pc:sldMk cId="1775727957" sldId="267"/>
-            <ac:picMk id="5" creationId="{D50B568E-ABCC-9426-189A-E197A9E1BA94}"/>
-          </ac:picMkLst>
-        </pc:picChg>
-        <pc:cxnChg chg="add del mod">
-          <ac:chgData name="Tyler Place" userId="ea307159bb280439" providerId="LiveId" clId="{09E72B4C-2191-4659-97A9-43CF591626FA}" dt="2024-10-28T01:01:06.330" v="556" actId="478"/>
-          <ac:cxnSpMkLst>
-            <pc:docMk/>
-            <pc:sldMk cId="1775727957" sldId="267"/>
-            <ac:cxnSpMk id="4" creationId="{9688988C-30C0-4DCE-242E-F5AB3064ABC4}"/>
-          </ac:cxnSpMkLst>
-        </pc:cxnChg>
-        <pc:cxnChg chg="add del mod">
-          <ac:chgData name="Tyler Place" userId="ea307159bb280439" providerId="LiveId" clId="{09E72B4C-2191-4659-97A9-43CF591626FA}" dt="2024-10-28T01:01:04.541" v="555" actId="478"/>
-          <ac:cxnSpMkLst>
-            <pc:docMk/>
-            <pc:sldMk cId="1775727957" sldId="267"/>
-            <ac:cxnSpMk id="7" creationId="{8048C20C-134F-C432-9C68-7DB4A8C27527}"/>
-          </ac:cxnSpMkLst>
-        </pc:cxnChg>
-        <pc:cxnChg chg="mod">
-          <ac:chgData name="Tyler Place" userId="ea307159bb280439" providerId="LiveId" clId="{09E72B4C-2191-4659-97A9-43CF591626FA}" dt="2024-10-28T02:15:48.173" v="617" actId="1076"/>
-          <ac:cxnSpMkLst>
-            <pc:docMk/>
-            <pc:sldMk cId="1775727957" sldId="267"/>
-            <ac:cxnSpMk id="9" creationId="{2154432F-A54C-D006-C1CB-5DB35EBDD6CE}"/>
-          </ac:cxnSpMkLst>
-        </pc:cxnChg>
-        <pc:cxnChg chg="mod">
-          <ac:chgData name="Tyler Place" userId="ea307159bb280439" providerId="LiveId" clId="{09E72B4C-2191-4659-97A9-43CF591626FA}" dt="2024-10-28T02:09:49.233" v="593" actId="1076"/>
-          <ac:cxnSpMkLst>
-            <pc:docMk/>
-            <pc:sldMk cId="1775727957" sldId="267"/>
-            <ac:cxnSpMk id="11" creationId="{96C43D7A-6F24-7284-7F8B-FDAFF0122F6F}"/>
-          </ac:cxnSpMkLst>
-        </pc:cxnChg>
-        <pc:cxnChg chg="add mod">
-          <ac:chgData name="Tyler Place" userId="ea307159bb280439" providerId="LiveId" clId="{09E72B4C-2191-4659-97A9-43CF591626FA}" dt="2024-10-28T02:17:10.427" v="621" actId="14100"/>
-          <ac:cxnSpMkLst>
-            <pc:docMk/>
-            <pc:sldMk cId="1775727957" sldId="267"/>
-            <ac:cxnSpMk id="12" creationId="{19232B86-C20E-4053-80CF-E195EC121A95}"/>
-          </ac:cxnSpMkLst>
-        </pc:cxnChg>
-        <pc:cxnChg chg="mod">
-          <ac:chgData name="Tyler Place" userId="ea307159bb280439" providerId="LiveId" clId="{09E72B4C-2191-4659-97A9-43CF591626FA}" dt="2024-10-28T02:09:49.233" v="593" actId="1076"/>
-          <ac:cxnSpMkLst>
-            <pc:docMk/>
-            <pc:sldMk cId="1775727957" sldId="267"/>
-            <ac:cxnSpMk id="13" creationId="{5CF168D5-9502-155C-8ABB-217F0E9B2E76}"/>
-          </ac:cxnSpMkLst>
-        </pc:cxnChg>
-        <pc:cxnChg chg="add mod">
-          <ac:chgData name="Tyler Place" userId="ea307159bb280439" providerId="LiveId" clId="{09E72B4C-2191-4659-97A9-43CF591626FA}" dt="2024-10-28T02:21:21.375" v="623" actId="14100"/>
-          <ac:cxnSpMkLst>
-            <pc:docMk/>
-            <pc:sldMk cId="1775727957" sldId="267"/>
-            <ac:cxnSpMk id="17" creationId="{CC501FC5-A684-7F24-111D-D5A3A3E7686A}"/>
-          </ac:cxnSpMkLst>
-        </pc:cxnChg>
-        <pc:cxnChg chg="mod">
-          <ac:chgData name="Tyler Place" userId="ea307159bb280439" providerId="LiveId" clId="{09E72B4C-2191-4659-97A9-43CF591626FA}" dt="2024-10-28T02:09:49.233" v="593" actId="1076"/>
-          <ac:cxnSpMkLst>
-            <pc:docMk/>
-            <pc:sldMk cId="1775727957" sldId="267"/>
-            <ac:cxnSpMk id="21" creationId="{3C6686F8-D914-7B82-493C-4C3C08FF11A5}"/>
-          </ac:cxnSpMkLst>
-        </pc:cxnChg>
-        <pc:cxnChg chg="mod">
-          <ac:chgData name="Tyler Place" userId="ea307159bb280439" providerId="LiveId" clId="{09E72B4C-2191-4659-97A9-43CF591626FA}" dt="2024-10-28T02:09:49.233" v="593" actId="1076"/>
-          <ac:cxnSpMkLst>
-            <pc:docMk/>
-            <pc:sldMk cId="1775727957" sldId="267"/>
-            <ac:cxnSpMk id="23" creationId="{F2FCFB79-7B00-B18E-FE08-A5894EAC370D}"/>
-          </ac:cxnSpMkLst>
-        </pc:cxnChg>
-        <pc:cxnChg chg="mod">
-          <ac:chgData name="Tyler Place" userId="ea307159bb280439" providerId="LiveId" clId="{09E72B4C-2191-4659-97A9-43CF591626FA}" dt="2024-10-28T02:09:49.233" v="593" actId="1076"/>
-          <ac:cxnSpMkLst>
-            <pc:docMk/>
-            <pc:sldMk cId="1775727957" sldId="267"/>
-            <ac:cxnSpMk id="25" creationId="{3C53476E-7FF4-5B32-7AFF-2C86B1E74BC6}"/>
-          </ac:cxnSpMkLst>
-        </pc:cxnChg>
-        <pc:cxnChg chg="add mod">
-          <ac:chgData name="Tyler Place" userId="ea307159bb280439" providerId="LiveId" clId="{09E72B4C-2191-4659-97A9-43CF591626FA}" dt="2024-10-28T02:21:24.175" v="624" actId="14100"/>
-          <ac:cxnSpMkLst>
-            <pc:docMk/>
-            <pc:sldMk cId="1775727957" sldId="267"/>
-            <ac:cxnSpMk id="26" creationId="{457564AA-8F06-DD55-94E5-AE452DE9C570}"/>
-          </ac:cxnSpMkLst>
-        </pc:cxnChg>
-        <pc:cxnChg chg="mod">
-          <ac:chgData name="Tyler Place" userId="ea307159bb280439" providerId="LiveId" clId="{09E72B4C-2191-4659-97A9-43CF591626FA}" dt="2024-10-28T02:09:49.233" v="593" actId="1076"/>
-          <ac:cxnSpMkLst>
-            <pc:docMk/>
-            <pc:sldMk cId="1775727957" sldId="267"/>
-            <ac:cxnSpMk id="27" creationId="{816903A4-3736-25F2-250C-948484B2A9FF}"/>
-          </ac:cxnSpMkLst>
-        </pc:cxnChg>
-        <pc:cxnChg chg="mod">
-          <ac:chgData name="Tyler Place" userId="ea307159bb280439" providerId="LiveId" clId="{09E72B4C-2191-4659-97A9-43CF591626FA}" dt="2024-10-28T02:09:49.233" v="593" actId="1076"/>
-          <ac:cxnSpMkLst>
-            <pc:docMk/>
-            <pc:sldMk cId="1775727957" sldId="267"/>
-            <ac:cxnSpMk id="29" creationId="{123F83B7-73BE-6CE8-BAF3-F4987DC8E0D4}"/>
-          </ac:cxnSpMkLst>
-        </pc:cxnChg>
-        <pc:cxnChg chg="mod">
-          <ac:chgData name="Tyler Place" userId="ea307159bb280439" providerId="LiveId" clId="{09E72B4C-2191-4659-97A9-43CF591626FA}" dt="2024-10-28T02:09:49.233" v="593" actId="1076"/>
-          <ac:cxnSpMkLst>
-            <pc:docMk/>
-            <pc:sldMk cId="1775727957" sldId="267"/>
-            <ac:cxnSpMk id="31" creationId="{80F5B455-5FA1-CDC7-1958-75470DF4F9D3}"/>
-          </ac:cxnSpMkLst>
-        </pc:cxnChg>
-        <pc:cxnChg chg="mod">
-          <ac:chgData name="Tyler Place" userId="ea307159bb280439" providerId="LiveId" clId="{09E72B4C-2191-4659-97A9-43CF591626FA}" dt="2024-10-28T02:09:49.233" v="593" actId="1076"/>
-          <ac:cxnSpMkLst>
-            <pc:docMk/>
-            <pc:sldMk cId="1775727957" sldId="267"/>
-            <ac:cxnSpMk id="33" creationId="{AA49896F-89FD-5054-2A30-B73727B90006}"/>
-          </ac:cxnSpMkLst>
-        </pc:cxnChg>
-        <pc:cxnChg chg="mod">
-          <ac:chgData name="Tyler Place" userId="ea307159bb280439" providerId="LiveId" clId="{09E72B4C-2191-4659-97A9-43CF591626FA}" dt="2024-10-28T02:15:48.548" v="618" actId="1076"/>
-          <ac:cxnSpMkLst>
-            <pc:docMk/>
-            <pc:sldMk cId="1775727957" sldId="267"/>
-            <ac:cxnSpMk id="35" creationId="{CFC89958-B5EE-C64D-038D-A25A697AB82E}"/>
-          </ac:cxnSpMkLst>
-        </pc:cxnChg>
-        <pc:cxnChg chg="add mod">
-          <ac:chgData name="Tyler Place" userId="ea307159bb280439" providerId="LiveId" clId="{09E72B4C-2191-4659-97A9-43CF591626FA}" dt="2024-10-28T02:15:43.875" v="608" actId="1076"/>
-          <ac:cxnSpMkLst>
-            <pc:docMk/>
-            <pc:sldMk cId="1775727957" sldId="267"/>
-            <ac:cxnSpMk id="43" creationId="{11F7AC1E-EFF1-BAF4-37AD-B0887027296B}"/>
-          </ac:cxnSpMkLst>
-        </pc:cxnChg>
-      </pc:sldChg>
-      <pc:sldChg chg="addSp modSp add del mod ord">
-        <pc:chgData name="Tyler Place" userId="ea307159bb280439" providerId="LiveId" clId="{09E72B4C-2191-4659-97A9-43CF591626FA}" dt="2024-10-28T01:00:29.313" v="541" actId="47"/>
-        <pc:sldMkLst>
-          <pc:docMk/>
-          <pc:sldMk cId="2277696212" sldId="267"/>
-        </pc:sldMkLst>
-        <pc:spChg chg="mod">
-          <ac:chgData name="Tyler Place" userId="ea307159bb280439" providerId="LiveId" clId="{09E72B4C-2191-4659-97A9-43CF591626FA}" dt="2024-10-27T22:22:35.683" v="509" actId="20577"/>
-          <ac:spMkLst>
-            <pc:docMk/>
-            <pc:sldMk cId="2277696212" sldId="267"/>
-            <ac:spMk id="2" creationId="{6D8F6A99-EC86-73D5-AA2E-C104F1A14B29}"/>
-          </ac:spMkLst>
-        </pc:spChg>
-        <pc:picChg chg="mod">
-          <ac:chgData name="Tyler Place" userId="ea307159bb280439" providerId="LiveId" clId="{09E72B4C-2191-4659-97A9-43CF591626FA}" dt="2024-10-27T22:23:26.476" v="525" actId="1076"/>
-          <ac:picMkLst>
-            <pc:docMk/>
-            <pc:sldMk cId="2277696212" sldId="267"/>
-            <ac:picMk id="5" creationId="{B79DB6FA-3E47-5C48-28E3-45F206955B32}"/>
-          </ac:picMkLst>
-        </pc:picChg>
-        <pc:cxnChg chg="add mod">
-          <ac:chgData name="Tyler Place" userId="ea307159bb280439" providerId="LiveId" clId="{09E72B4C-2191-4659-97A9-43CF591626FA}" dt="2024-10-28T00:07:06.007" v="536" actId="14100"/>
-          <ac:cxnSpMkLst>
-            <pc:docMk/>
-            <pc:sldMk cId="2277696212" sldId="267"/>
-            <ac:cxnSpMk id="8" creationId="{35CB1A9E-0EF3-6E79-DE4A-6E1E6B76FABB}"/>
-          </ac:cxnSpMkLst>
-        </pc:cxnChg>
-        <pc:cxnChg chg="mod">
-          <ac:chgData name="Tyler Place" userId="ea307159bb280439" providerId="LiveId" clId="{09E72B4C-2191-4659-97A9-43CF591626FA}" dt="2024-10-27T22:22:53.052" v="511" actId="1076"/>
-          <ac:cxnSpMkLst>
-            <pc:docMk/>
-            <pc:sldMk cId="2277696212" sldId="267"/>
-            <ac:cxnSpMk id="9" creationId="{4981D553-8BB5-DCFF-0392-E2E636E37DD2}"/>
-          </ac:cxnSpMkLst>
-        </pc:cxnChg>
-        <pc:cxnChg chg="mod">
-          <ac:chgData name="Tyler Place" userId="ea307159bb280439" providerId="LiveId" clId="{09E72B4C-2191-4659-97A9-43CF591626FA}" dt="2024-10-27T22:22:49.681" v="510" actId="1076"/>
-          <ac:cxnSpMkLst>
-            <pc:docMk/>
-            <pc:sldMk cId="2277696212" sldId="267"/>
-            <ac:cxnSpMk id="11" creationId="{DBBCC209-DD0B-09B3-18BB-464A94CEA12C}"/>
-          </ac:cxnSpMkLst>
-        </pc:cxnChg>
-        <pc:cxnChg chg="add mod">
-          <ac:chgData name="Tyler Place" userId="ea307159bb280439" providerId="LiveId" clId="{09E72B4C-2191-4659-97A9-43CF591626FA}" dt="2024-10-27T22:25:33.211" v="528" actId="14100"/>
-          <ac:cxnSpMkLst>
-            <pc:docMk/>
-            <pc:sldMk cId="2277696212" sldId="267"/>
-            <ac:cxnSpMk id="12" creationId="{B4D85FC9-C0F6-1B0C-C404-0E12B960EF6B}"/>
-          </ac:cxnSpMkLst>
-        </pc:cxnChg>
-        <pc:cxnChg chg="mod">
-          <ac:chgData name="Tyler Place" userId="ea307159bb280439" providerId="LiveId" clId="{09E72B4C-2191-4659-97A9-43CF591626FA}" dt="2024-10-27T22:22:49.681" v="510" actId="1076"/>
-          <ac:cxnSpMkLst>
-            <pc:docMk/>
-            <pc:sldMk cId="2277696212" sldId="267"/>
-            <ac:cxnSpMk id="13" creationId="{359CEF5F-C83D-1F3F-0280-38661B3DC37C}"/>
-          </ac:cxnSpMkLst>
-        </pc:cxnChg>
-        <pc:cxnChg chg="mod">
-          <ac:chgData name="Tyler Place" userId="ea307159bb280439" providerId="LiveId" clId="{09E72B4C-2191-4659-97A9-43CF591626FA}" dt="2024-10-27T22:22:49.681" v="510" actId="1076"/>
-          <ac:cxnSpMkLst>
-            <pc:docMk/>
-            <pc:sldMk cId="2277696212" sldId="267"/>
-            <ac:cxnSpMk id="21" creationId="{81D215A5-2237-513A-E7DB-0E7EF935EAEC}"/>
-          </ac:cxnSpMkLst>
-        </pc:cxnChg>
-        <pc:cxnChg chg="mod">
-          <ac:chgData name="Tyler Place" userId="ea307159bb280439" providerId="LiveId" clId="{09E72B4C-2191-4659-97A9-43CF591626FA}" dt="2024-10-27T22:26:04.198" v="531" actId="14100"/>
-          <ac:cxnSpMkLst>
-            <pc:docMk/>
-            <pc:sldMk cId="2277696212" sldId="267"/>
-            <ac:cxnSpMk id="23" creationId="{7D722158-D1A5-334C-E8EC-69AF7B665CCA}"/>
-          </ac:cxnSpMkLst>
-        </pc:cxnChg>
-        <pc:cxnChg chg="mod">
-          <ac:chgData name="Tyler Place" userId="ea307159bb280439" providerId="LiveId" clId="{09E72B4C-2191-4659-97A9-43CF591626FA}" dt="2024-10-27T22:26:06.015" v="532" actId="14100"/>
-          <ac:cxnSpMkLst>
-            <pc:docMk/>
-            <pc:sldMk cId="2277696212" sldId="267"/>
-            <ac:cxnSpMk id="25" creationId="{B5B390BA-1434-B802-5239-AC21A2F70505}"/>
-          </ac:cxnSpMkLst>
-        </pc:cxnChg>
-        <pc:cxnChg chg="mod">
-          <ac:chgData name="Tyler Place" userId="ea307159bb280439" providerId="LiveId" clId="{09E72B4C-2191-4659-97A9-43CF591626FA}" dt="2024-10-28T00:07:07.948" v="537" actId="14100"/>
-          <ac:cxnSpMkLst>
-            <pc:docMk/>
-            <pc:sldMk cId="2277696212" sldId="267"/>
-            <ac:cxnSpMk id="27" creationId="{022359B7-5A2F-FBB3-96CC-8778186C55CA}"/>
-          </ac:cxnSpMkLst>
-        </pc:cxnChg>
-        <pc:cxnChg chg="mod">
-          <ac:chgData name="Tyler Place" userId="ea307159bb280439" providerId="LiveId" clId="{09E72B4C-2191-4659-97A9-43CF591626FA}" dt="2024-10-27T22:25:31.423" v="527" actId="14100"/>
-          <ac:cxnSpMkLst>
-            <pc:docMk/>
-            <pc:sldMk cId="2277696212" sldId="267"/>
-            <ac:cxnSpMk id="29" creationId="{6E54C73E-725D-8315-B1B4-E11AA3B5226C}"/>
-          </ac:cxnSpMkLst>
-        </pc:cxnChg>
-        <pc:cxnChg chg="mod">
-          <ac:chgData name="Tyler Place" userId="ea307159bb280439" providerId="LiveId" clId="{09E72B4C-2191-4659-97A9-43CF591626FA}" dt="2024-10-27T22:22:49.681" v="510" actId="1076"/>
-          <ac:cxnSpMkLst>
-            <pc:docMk/>
-            <pc:sldMk cId="2277696212" sldId="267"/>
-            <ac:cxnSpMk id="31" creationId="{87CF8F05-14F1-0554-2341-85E1DB76AE75}"/>
-          </ac:cxnSpMkLst>
-        </pc:cxnChg>
-        <pc:cxnChg chg="add mod">
-          <ac:chgData name="Tyler Place" userId="ea307159bb280439" providerId="LiveId" clId="{09E72B4C-2191-4659-97A9-43CF591626FA}" dt="2024-10-28T00:07:29.598" v="540" actId="14100"/>
-          <ac:cxnSpMkLst>
-            <pc:docMk/>
-            <pc:sldMk cId="2277696212" sldId="267"/>
-            <ac:cxnSpMk id="32" creationId="{41A47044-E2DA-8C55-3CCA-47ECF2FD4BC6}"/>
-          </ac:cxnSpMkLst>
-        </pc:cxnChg>
-        <pc:cxnChg chg="mod">
-          <ac:chgData name="Tyler Place" userId="ea307159bb280439" providerId="LiveId" clId="{09E72B4C-2191-4659-97A9-43CF591626FA}" dt="2024-10-27T22:22:49.681" v="510" actId="1076"/>
-          <ac:cxnSpMkLst>
-            <pc:docMk/>
-            <pc:sldMk cId="2277696212" sldId="267"/>
-            <ac:cxnSpMk id="33" creationId="{55E76037-FB88-3546-7B76-022053F1142C}"/>
-          </ac:cxnSpMkLst>
-        </pc:cxnChg>
-        <pc:cxnChg chg="mod">
-          <ac:chgData name="Tyler Place" userId="ea307159bb280439" providerId="LiveId" clId="{09E72B4C-2191-4659-97A9-43CF591626FA}" dt="2024-10-27T22:22:55.310" v="512" actId="1076"/>
-          <ac:cxnSpMkLst>
-            <pc:docMk/>
-            <pc:sldMk cId="2277696212" sldId="267"/>
-            <ac:cxnSpMk id="35" creationId="{D8458F5A-5CE6-1088-261D-92845E7CB4D2}"/>
           </ac:cxnSpMkLst>
         </pc:cxnChg>
       </pc:sldChg>
@@ -1832,7 +1832,7 @@
           <a:p>
             <a:fld id="{2F8BC3AA-0B2A-4816-B48E-A936338D1737}" type="datetimeFigureOut">
               <a:rPr lang="en-US" smtClean="0"/>
-              <a:t>10/27/2024</a:t>
+              <a:t>1/1/2025</a:t>
             </a:fld>
             <a:endParaRPr lang="en-US"/>
           </a:p>
@@ -2030,7 +2030,7 @@
           <a:p>
             <a:fld id="{2F8BC3AA-0B2A-4816-B48E-A936338D1737}" type="datetimeFigureOut">
               <a:rPr lang="en-US" smtClean="0"/>
-              <a:t>10/27/2024</a:t>
+              <a:t>1/1/2025</a:t>
             </a:fld>
             <a:endParaRPr lang="en-US"/>
           </a:p>
@@ -2238,7 +2238,7 @@
           <a:p>
             <a:fld id="{2F8BC3AA-0B2A-4816-B48E-A936338D1737}" type="datetimeFigureOut">
               <a:rPr lang="en-US" smtClean="0"/>
-              <a:t>10/27/2024</a:t>
+              <a:t>1/1/2025</a:t>
             </a:fld>
             <a:endParaRPr lang="en-US"/>
           </a:p>
@@ -2436,7 +2436,7 @@
           <a:p>
             <a:fld id="{2F8BC3AA-0B2A-4816-B48E-A936338D1737}" type="datetimeFigureOut">
               <a:rPr lang="en-US" smtClean="0"/>
-              <a:t>10/27/2024</a:t>
+              <a:t>1/1/2025</a:t>
             </a:fld>
             <a:endParaRPr lang="en-US"/>
           </a:p>
@@ -2711,7 +2711,7 @@
           <a:p>
             <a:fld id="{2F8BC3AA-0B2A-4816-B48E-A936338D1737}" type="datetimeFigureOut">
               <a:rPr lang="en-US" smtClean="0"/>
-              <a:t>10/27/2024</a:t>
+              <a:t>1/1/2025</a:t>
             </a:fld>
             <a:endParaRPr lang="en-US"/>
           </a:p>
@@ -2976,7 +2976,7 @@
           <a:p>
             <a:fld id="{2F8BC3AA-0B2A-4816-B48E-A936338D1737}" type="datetimeFigureOut">
               <a:rPr lang="en-US" smtClean="0"/>
-              <a:t>10/27/2024</a:t>
+              <a:t>1/1/2025</a:t>
             </a:fld>
             <a:endParaRPr lang="en-US"/>
           </a:p>
@@ -3388,7 +3388,7 @@
           <a:p>
             <a:fld id="{2F8BC3AA-0B2A-4816-B48E-A936338D1737}" type="datetimeFigureOut">
               <a:rPr lang="en-US" smtClean="0"/>
-              <a:t>10/27/2024</a:t>
+              <a:t>1/1/2025</a:t>
             </a:fld>
             <a:endParaRPr lang="en-US"/>
           </a:p>
@@ -3529,7 +3529,7 @@
           <a:p>
             <a:fld id="{2F8BC3AA-0B2A-4816-B48E-A936338D1737}" type="datetimeFigureOut">
               <a:rPr lang="en-US" smtClean="0"/>
-              <a:t>10/27/2024</a:t>
+              <a:t>1/1/2025</a:t>
             </a:fld>
             <a:endParaRPr lang="en-US"/>
           </a:p>
@@ -3642,7 +3642,7 @@
           <a:p>
             <a:fld id="{2F8BC3AA-0B2A-4816-B48E-A936338D1737}" type="datetimeFigureOut">
               <a:rPr lang="en-US" smtClean="0"/>
-              <a:t>10/27/2024</a:t>
+              <a:t>1/1/2025</a:t>
             </a:fld>
             <a:endParaRPr lang="en-US"/>
           </a:p>
@@ -3953,7 +3953,7 @@
           <a:p>
             <a:fld id="{2F8BC3AA-0B2A-4816-B48E-A936338D1737}" type="datetimeFigureOut">
               <a:rPr lang="en-US" smtClean="0"/>
-              <a:t>10/27/2024</a:t>
+              <a:t>1/1/2025</a:t>
             </a:fld>
             <a:endParaRPr lang="en-US"/>
           </a:p>
@@ -4241,7 +4241,7 @@
           <a:p>
             <a:fld id="{2F8BC3AA-0B2A-4816-B48E-A936338D1737}" type="datetimeFigureOut">
               <a:rPr lang="en-US" smtClean="0"/>
-              <a:t>10/27/2024</a:t>
+              <a:t>1/1/2025</a:t>
             </a:fld>
             <a:endParaRPr lang="en-US"/>
           </a:p>
@@ -4482,7 +4482,7 @@
           <a:p>
             <a:fld id="{2F8BC3AA-0B2A-4816-B48E-A936338D1737}" type="datetimeFigureOut">
               <a:rPr lang="en-US" smtClean="0"/>
-              <a:t>10/27/2024</a:t>
+              <a:t>1/1/2025</a:t>
             </a:fld>
             <a:endParaRPr lang="en-US"/>
           </a:p>
@@ -7321,8 +7321,8 @@
         </p:nvCxnSpPr>
         <p:spPr>
           <a:xfrm flipV="1">
-            <a:off x="6210677" y="1689813"/>
-            <a:ext cx="1697190" cy="3452555"/>
+            <a:off x="5833533" y="1689813"/>
+            <a:ext cx="2074334" cy="4253787"/>
           </a:xfrm>
           <a:prstGeom prst="line">
             <a:avLst/>
@@ -7359,8 +7359,8 @@
         </p:nvCxnSpPr>
         <p:spPr>
           <a:xfrm flipV="1">
-            <a:off x="7907867" y="1689813"/>
-            <a:ext cx="1703061" cy="25819"/>
+            <a:off x="7907867" y="863600"/>
+            <a:ext cx="851530" cy="852032"/>
           </a:xfrm>
           <a:prstGeom prst="line">
             <a:avLst/>
@@ -7398,7 +7398,7 @@
         <p:spPr>
           <a:xfrm>
             <a:off x="9610928" y="1689813"/>
-            <a:ext cx="1678743" cy="3452555"/>
+            <a:ext cx="2115405" cy="4253787"/>
           </a:xfrm>
           <a:prstGeom prst="line">
             <a:avLst/>
@@ -7435,8 +7435,8 @@
         </p:nvCxnSpPr>
         <p:spPr>
           <a:xfrm flipH="1">
-            <a:off x="10031240" y="5142368"/>
-            <a:ext cx="1258431" cy="0"/>
+            <a:off x="10414000" y="5943600"/>
+            <a:ext cx="1312333" cy="25400"/>
           </a:xfrm>
           <a:prstGeom prst="line">
             <a:avLst/>
@@ -7474,7 +7474,7 @@
         <p:spPr>
           <a:xfrm flipH="1" flipV="1">
             <a:off x="8759397" y="2589291"/>
-            <a:ext cx="1271843" cy="2553077"/>
+            <a:ext cx="1654603" cy="3354309"/>
           </a:xfrm>
           <a:prstGeom prst="line">
             <a:avLst/>
@@ -7511,8 +7511,8 @@
         </p:nvCxnSpPr>
         <p:spPr>
           <a:xfrm flipH="1">
-            <a:off x="7496269" y="2589291"/>
-            <a:ext cx="1263128" cy="2553077"/>
+            <a:off x="7086600" y="2589291"/>
+            <a:ext cx="1672797" cy="3379709"/>
           </a:xfrm>
           <a:prstGeom prst="line">
             <a:avLst/>
@@ -7549,8 +7549,46 @@
         </p:nvCxnSpPr>
         <p:spPr>
           <a:xfrm flipH="1">
-            <a:off x="6210677" y="5142368"/>
-            <a:ext cx="1285592" cy="0"/>
+            <a:off x="5833533" y="5943600"/>
+            <a:ext cx="1253067" cy="0"/>
+          </a:xfrm>
+          <a:prstGeom prst="line">
+            <a:avLst/>
+          </a:prstGeom>
+        </p:spPr>
+        <p:style>
+          <a:lnRef idx="2">
+            <a:schemeClr val="accent1"/>
+          </a:lnRef>
+          <a:fillRef idx="0">
+            <a:schemeClr val="accent1"/>
+          </a:fillRef>
+          <a:effectRef idx="1">
+            <a:schemeClr val="accent1"/>
+          </a:effectRef>
+          <a:fontRef idx="minor">
+            <a:schemeClr val="tx1"/>
+          </a:fontRef>
+        </p:style>
+      </p:cxnSp>
+      <p:cxnSp>
+        <p:nvCxnSpPr>
+          <p:cNvPr id="4" name="Straight Connector 3">
+            <a:extLst>
+              <a:ext uri="{FF2B5EF4-FFF2-40B4-BE49-F238E27FC236}">
+                <a16:creationId xmlns:a16="http://schemas.microsoft.com/office/drawing/2014/main" id="{BCFC4A43-7B60-4160-4CB2-E880B1A3505A}"/>
+              </a:ext>
+            </a:extLst>
+          </p:cNvPr>
+          <p:cNvCxnSpPr>
+            <a:cxnSpLocks/>
+          </p:cNvCxnSpPr>
+          <p:nvPr/>
+        </p:nvCxnSpPr>
+        <p:spPr>
+          <a:xfrm flipH="1" flipV="1">
+            <a:off x="8759397" y="863600"/>
+            <a:ext cx="851531" cy="826213"/>
           </a:xfrm>
           <a:prstGeom prst="line">
             <a:avLst/>

</xml_diff>